<commit_message>
Edited word of PowerPoint
</commit_message>
<xml_diff>
--- a/BankPresentation.pptx
+++ b/BankPresentation.pptx
@@ -15,7 +15,7 @@
     <p:sldId id="262" r:id="rId10"/>
   </p:sldIdLst>
   <p:sldSz cx="9144000" cy="5143500"/>
-  <p:notesSz cx="6858000" cy="9144000"/>
+  <p:notesSz cx="7772400" cy="10058400"/>
 </p:presentation>
 </file>
 
@@ -60,7 +60,7 @@
       </p:grpSpPr>
       <p:sp>
         <p:nvSpPr>
-          <p:cNvPr id="28" name="PlaceHolder 1"/>
+          <p:cNvPr id="27" name="PlaceHolder 1"/>
           <p:cNvSpPr>
             <a:spLocks noGrp="1"/>
           </p:cNvSpPr>
@@ -70,8 +70,8 @@
         </p:nvSpPr>
         <p:spPr>
           <a:xfrm>
-            <a:off x="729360" y="1318680"/>
-            <a:ext cx="7688520" cy="534960"/>
+            <a:off x="729360" y="1156680"/>
+            <a:ext cx="7688160" cy="858960"/>
           </a:xfrm>
           <a:prstGeom prst="rect">
             <a:avLst/>
@@ -82,18 +82,16 @@
             <a:spAutoFit/>
           </a:bodyPr>
           <a:p>
-            <a:endParaRPr b="0" lang="en-US" sz="1400" spc="-1" strike="noStrike">
-              <a:solidFill>
-                <a:srgbClr val="000000"/>
-              </a:solidFill>
-              <a:latin typeface="Arial"/>
-            </a:endParaRPr>
-          </a:p>
-        </p:txBody>
-      </p:sp>
-      <p:sp>
-        <p:nvSpPr>
-          <p:cNvPr id="29" name="PlaceHolder 2"/>
+            <a:pPr algn="ctr"/>
+            <a:endParaRPr b="0" lang="en-US" sz="4400" spc="-1" strike="noStrike">
+              <a:latin typeface="Arial"/>
+            </a:endParaRPr>
+          </a:p>
+        </p:txBody>
+      </p:sp>
+      <p:sp>
+        <p:nvSpPr>
+          <p:cNvPr id="28" name="PlaceHolder 2"/>
           <p:cNvSpPr>
             <a:spLocks noGrp="1"/>
           </p:cNvSpPr>
@@ -104,7 +102,7 @@
         <p:spPr>
           <a:xfrm>
             <a:off x="729360" y="2079000"/>
-            <a:ext cx="7688520" cy="1078200"/>
+            <a:ext cx="7688160" cy="1078200"/>
           </a:xfrm>
           <a:prstGeom prst="rect">
             <a:avLst/>
@@ -115,18 +113,15 @@
             <a:normAutofit/>
           </a:bodyPr>
           <a:p>
-            <a:endParaRPr b="0" lang="en-US" sz="1400" spc="-1" strike="noStrike">
-              <a:solidFill>
-                <a:srgbClr val="000000"/>
-              </a:solidFill>
-              <a:latin typeface="Arial"/>
-            </a:endParaRPr>
-          </a:p>
-        </p:txBody>
-      </p:sp>
-      <p:sp>
-        <p:nvSpPr>
-          <p:cNvPr id="30" name="PlaceHolder 3"/>
+            <a:endParaRPr b="0" lang="en-US" sz="3200" spc="-1" strike="noStrike">
+              <a:latin typeface="Arial"/>
+            </a:endParaRPr>
+          </a:p>
+        </p:txBody>
+      </p:sp>
+      <p:sp>
+        <p:nvSpPr>
+          <p:cNvPr id="29" name="PlaceHolder 3"/>
           <p:cNvSpPr>
             <a:spLocks noGrp="1"/>
           </p:cNvSpPr>
@@ -137,7 +132,7 @@
         <p:spPr>
           <a:xfrm>
             <a:off x="729360" y="3260160"/>
-            <a:ext cx="7688520" cy="1078200"/>
+            <a:ext cx="7688160" cy="1078200"/>
           </a:xfrm>
           <a:prstGeom prst="rect">
             <a:avLst/>
@@ -148,10 +143,7 @@
             <a:normAutofit/>
           </a:bodyPr>
           <a:p>
-            <a:endParaRPr b="0" lang="en-US" sz="1400" spc="-1" strike="noStrike">
-              <a:solidFill>
-                <a:srgbClr val="000000"/>
-              </a:solidFill>
+            <a:endParaRPr b="0" lang="en-US" sz="3200" spc="-1" strike="noStrike">
               <a:latin typeface="Arial"/>
             </a:endParaRPr>
           </a:p>
@@ -181,7 +173,7 @@
       </p:grpSpPr>
       <p:sp>
         <p:nvSpPr>
-          <p:cNvPr id="31" name="PlaceHolder 1"/>
+          <p:cNvPr id="30" name="PlaceHolder 1"/>
           <p:cNvSpPr>
             <a:spLocks noGrp="1"/>
           </p:cNvSpPr>
@@ -191,8 +183,8 @@
         </p:nvSpPr>
         <p:spPr>
           <a:xfrm>
-            <a:off x="729360" y="1318680"/>
-            <a:ext cx="7688520" cy="534960"/>
+            <a:off x="729360" y="1156680"/>
+            <a:ext cx="7688160" cy="858960"/>
           </a:xfrm>
           <a:prstGeom prst="rect">
             <a:avLst/>
@@ -203,18 +195,16 @@
             <a:spAutoFit/>
           </a:bodyPr>
           <a:p>
-            <a:endParaRPr b="0" lang="en-US" sz="1400" spc="-1" strike="noStrike">
-              <a:solidFill>
-                <a:srgbClr val="000000"/>
-              </a:solidFill>
-              <a:latin typeface="Arial"/>
-            </a:endParaRPr>
-          </a:p>
-        </p:txBody>
-      </p:sp>
-      <p:sp>
-        <p:nvSpPr>
-          <p:cNvPr id="32" name="PlaceHolder 2"/>
+            <a:pPr algn="ctr"/>
+            <a:endParaRPr b="0" lang="en-US" sz="4400" spc="-1" strike="noStrike">
+              <a:latin typeface="Arial"/>
+            </a:endParaRPr>
+          </a:p>
+        </p:txBody>
+      </p:sp>
+      <p:sp>
+        <p:nvSpPr>
+          <p:cNvPr id="31" name="PlaceHolder 2"/>
           <p:cNvSpPr>
             <a:spLocks noGrp="1"/>
           </p:cNvSpPr>
@@ -225,7 +215,7 @@
         <p:spPr>
           <a:xfrm>
             <a:off x="729360" y="2079000"/>
-            <a:ext cx="3751920" cy="1078200"/>
+            <a:ext cx="3751560" cy="1078200"/>
           </a:xfrm>
           <a:prstGeom prst="rect">
             <a:avLst/>
@@ -236,18 +226,15 @@
             <a:normAutofit/>
           </a:bodyPr>
           <a:p>
-            <a:endParaRPr b="0" lang="en-US" sz="1400" spc="-1" strike="noStrike">
-              <a:solidFill>
-                <a:srgbClr val="000000"/>
-              </a:solidFill>
-              <a:latin typeface="Arial"/>
-            </a:endParaRPr>
-          </a:p>
-        </p:txBody>
-      </p:sp>
-      <p:sp>
-        <p:nvSpPr>
-          <p:cNvPr id="33" name="PlaceHolder 3"/>
+            <a:endParaRPr b="0" lang="en-US" sz="3200" spc="-1" strike="noStrike">
+              <a:latin typeface="Arial"/>
+            </a:endParaRPr>
+          </a:p>
+        </p:txBody>
+      </p:sp>
+      <p:sp>
+        <p:nvSpPr>
+          <p:cNvPr id="32" name="PlaceHolder 3"/>
           <p:cNvSpPr>
             <a:spLocks noGrp="1"/>
           </p:cNvSpPr>
@@ -257,8 +244,8 @@
         </p:nvSpPr>
         <p:spPr>
           <a:xfrm>
-            <a:off x="4669200" y="2079000"/>
-            <a:ext cx="3751920" cy="1078200"/>
+            <a:off x="4668840" y="2079000"/>
+            <a:ext cx="3751560" cy="1078200"/>
           </a:xfrm>
           <a:prstGeom prst="rect">
             <a:avLst/>
@@ -269,18 +256,15 @@
             <a:normAutofit/>
           </a:bodyPr>
           <a:p>
-            <a:endParaRPr b="0" lang="en-US" sz="1400" spc="-1" strike="noStrike">
-              <a:solidFill>
-                <a:srgbClr val="000000"/>
-              </a:solidFill>
-              <a:latin typeface="Arial"/>
-            </a:endParaRPr>
-          </a:p>
-        </p:txBody>
-      </p:sp>
-      <p:sp>
-        <p:nvSpPr>
-          <p:cNvPr id="34" name="PlaceHolder 4"/>
+            <a:endParaRPr b="0" lang="en-US" sz="3200" spc="-1" strike="noStrike">
+              <a:latin typeface="Arial"/>
+            </a:endParaRPr>
+          </a:p>
+        </p:txBody>
+      </p:sp>
+      <p:sp>
+        <p:nvSpPr>
+          <p:cNvPr id="33" name="PlaceHolder 4"/>
           <p:cNvSpPr>
             <a:spLocks noGrp="1"/>
           </p:cNvSpPr>
@@ -291,7 +275,7 @@
         <p:spPr>
           <a:xfrm>
             <a:off x="729360" y="3260160"/>
-            <a:ext cx="3751920" cy="1078200"/>
+            <a:ext cx="3751560" cy="1078200"/>
           </a:xfrm>
           <a:prstGeom prst="rect">
             <a:avLst/>
@@ -302,18 +286,15 @@
             <a:normAutofit/>
           </a:bodyPr>
           <a:p>
-            <a:endParaRPr b="0" lang="en-US" sz="1400" spc="-1" strike="noStrike">
-              <a:solidFill>
-                <a:srgbClr val="000000"/>
-              </a:solidFill>
-              <a:latin typeface="Arial"/>
-            </a:endParaRPr>
-          </a:p>
-        </p:txBody>
-      </p:sp>
-      <p:sp>
-        <p:nvSpPr>
-          <p:cNvPr id="35" name="PlaceHolder 5"/>
+            <a:endParaRPr b="0" lang="en-US" sz="3200" spc="-1" strike="noStrike">
+              <a:latin typeface="Arial"/>
+            </a:endParaRPr>
+          </a:p>
+        </p:txBody>
+      </p:sp>
+      <p:sp>
+        <p:nvSpPr>
+          <p:cNvPr id="34" name="PlaceHolder 5"/>
           <p:cNvSpPr>
             <a:spLocks noGrp="1"/>
           </p:cNvSpPr>
@@ -323,8 +304,8 @@
         </p:nvSpPr>
         <p:spPr>
           <a:xfrm>
-            <a:off x="4669200" y="3260160"/>
-            <a:ext cx="3751920" cy="1078200"/>
+            <a:off x="4668840" y="3260160"/>
+            <a:ext cx="3751560" cy="1078200"/>
           </a:xfrm>
           <a:prstGeom prst="rect">
             <a:avLst/>
@@ -335,10 +316,7 @@
             <a:normAutofit/>
           </a:bodyPr>
           <a:p>
-            <a:endParaRPr b="0" lang="en-US" sz="1400" spc="-1" strike="noStrike">
-              <a:solidFill>
-                <a:srgbClr val="000000"/>
-              </a:solidFill>
+            <a:endParaRPr b="0" lang="en-US" sz="3200" spc="-1" strike="noStrike">
               <a:latin typeface="Arial"/>
             </a:endParaRPr>
           </a:p>
@@ -368,7 +346,7 @@
       </p:grpSpPr>
       <p:sp>
         <p:nvSpPr>
-          <p:cNvPr id="36" name="PlaceHolder 1"/>
+          <p:cNvPr id="35" name="PlaceHolder 1"/>
           <p:cNvSpPr>
             <a:spLocks noGrp="1"/>
           </p:cNvSpPr>
@@ -378,8 +356,8 @@
         </p:nvSpPr>
         <p:spPr>
           <a:xfrm>
-            <a:off x="729360" y="1318680"/>
-            <a:ext cx="7688520" cy="534960"/>
+            <a:off x="729360" y="1156680"/>
+            <a:ext cx="7688160" cy="858960"/>
           </a:xfrm>
           <a:prstGeom prst="rect">
             <a:avLst/>
@@ -390,18 +368,16 @@
             <a:spAutoFit/>
           </a:bodyPr>
           <a:p>
-            <a:endParaRPr b="0" lang="en-US" sz="1400" spc="-1" strike="noStrike">
-              <a:solidFill>
-                <a:srgbClr val="000000"/>
-              </a:solidFill>
-              <a:latin typeface="Arial"/>
-            </a:endParaRPr>
-          </a:p>
-        </p:txBody>
-      </p:sp>
-      <p:sp>
-        <p:nvSpPr>
-          <p:cNvPr id="37" name="PlaceHolder 2"/>
+            <a:pPr algn="ctr"/>
+            <a:endParaRPr b="0" lang="en-US" sz="4400" spc="-1" strike="noStrike">
+              <a:latin typeface="Arial"/>
+            </a:endParaRPr>
+          </a:p>
+        </p:txBody>
+      </p:sp>
+      <p:sp>
+        <p:nvSpPr>
+          <p:cNvPr id="36" name="PlaceHolder 2"/>
           <p:cNvSpPr>
             <a:spLocks noGrp="1"/>
           </p:cNvSpPr>
@@ -423,18 +399,15 @@
             <a:normAutofit/>
           </a:bodyPr>
           <a:p>
-            <a:endParaRPr b="0" lang="en-US" sz="1400" spc="-1" strike="noStrike">
-              <a:solidFill>
-                <a:srgbClr val="000000"/>
-              </a:solidFill>
-              <a:latin typeface="Arial"/>
-            </a:endParaRPr>
-          </a:p>
-        </p:txBody>
-      </p:sp>
-      <p:sp>
-        <p:nvSpPr>
-          <p:cNvPr id="38" name="PlaceHolder 3"/>
+            <a:endParaRPr b="0" lang="en-US" sz="3200" spc="-1" strike="noStrike">
+              <a:latin typeface="Arial"/>
+            </a:endParaRPr>
+          </a:p>
+        </p:txBody>
+      </p:sp>
+      <p:sp>
+        <p:nvSpPr>
+          <p:cNvPr id="37" name="PlaceHolder 3"/>
           <p:cNvSpPr>
             <a:spLocks noGrp="1"/>
           </p:cNvSpPr>
@@ -456,18 +429,15 @@
             <a:normAutofit/>
           </a:bodyPr>
           <a:p>
-            <a:endParaRPr b="0" lang="en-US" sz="1400" spc="-1" strike="noStrike">
-              <a:solidFill>
-                <a:srgbClr val="000000"/>
-              </a:solidFill>
-              <a:latin typeface="Arial"/>
-            </a:endParaRPr>
-          </a:p>
-        </p:txBody>
-      </p:sp>
-      <p:sp>
-        <p:nvSpPr>
-          <p:cNvPr id="39" name="PlaceHolder 4"/>
+            <a:endParaRPr b="0" lang="en-US" sz="3200" spc="-1" strike="noStrike">
+              <a:latin typeface="Arial"/>
+            </a:endParaRPr>
+          </a:p>
+        </p:txBody>
+      </p:sp>
+      <p:sp>
+        <p:nvSpPr>
+          <p:cNvPr id="38" name="PlaceHolder 4"/>
           <p:cNvSpPr>
             <a:spLocks noGrp="1"/>
           </p:cNvSpPr>
@@ -489,18 +459,15 @@
             <a:normAutofit/>
           </a:bodyPr>
           <a:p>
-            <a:endParaRPr b="0" lang="en-US" sz="1400" spc="-1" strike="noStrike">
-              <a:solidFill>
-                <a:srgbClr val="000000"/>
-              </a:solidFill>
-              <a:latin typeface="Arial"/>
-            </a:endParaRPr>
-          </a:p>
-        </p:txBody>
-      </p:sp>
-      <p:sp>
-        <p:nvSpPr>
-          <p:cNvPr id="40" name="PlaceHolder 5"/>
+            <a:endParaRPr b="0" lang="en-US" sz="3200" spc="-1" strike="noStrike">
+              <a:latin typeface="Arial"/>
+            </a:endParaRPr>
+          </a:p>
+        </p:txBody>
+      </p:sp>
+      <p:sp>
+        <p:nvSpPr>
+          <p:cNvPr id="39" name="PlaceHolder 5"/>
           <p:cNvSpPr>
             <a:spLocks noGrp="1"/>
           </p:cNvSpPr>
@@ -522,18 +489,15 @@
             <a:normAutofit/>
           </a:bodyPr>
           <a:p>
-            <a:endParaRPr b="0" lang="en-US" sz="1400" spc="-1" strike="noStrike">
-              <a:solidFill>
-                <a:srgbClr val="000000"/>
-              </a:solidFill>
-              <a:latin typeface="Arial"/>
-            </a:endParaRPr>
-          </a:p>
-        </p:txBody>
-      </p:sp>
-      <p:sp>
-        <p:nvSpPr>
-          <p:cNvPr id="41" name="PlaceHolder 6"/>
+            <a:endParaRPr b="0" lang="en-US" sz="3200" spc="-1" strike="noStrike">
+              <a:latin typeface="Arial"/>
+            </a:endParaRPr>
+          </a:p>
+        </p:txBody>
+      </p:sp>
+      <p:sp>
+        <p:nvSpPr>
+          <p:cNvPr id="40" name="PlaceHolder 6"/>
           <p:cNvSpPr>
             <a:spLocks noGrp="1"/>
           </p:cNvSpPr>
@@ -555,18 +519,15 @@
             <a:normAutofit/>
           </a:bodyPr>
           <a:p>
-            <a:endParaRPr b="0" lang="en-US" sz="1400" spc="-1" strike="noStrike">
-              <a:solidFill>
-                <a:srgbClr val="000000"/>
-              </a:solidFill>
-              <a:latin typeface="Arial"/>
-            </a:endParaRPr>
-          </a:p>
-        </p:txBody>
-      </p:sp>
-      <p:sp>
-        <p:nvSpPr>
-          <p:cNvPr id="42" name="PlaceHolder 7"/>
+            <a:endParaRPr b="0" lang="en-US" sz="3200" spc="-1" strike="noStrike">
+              <a:latin typeface="Arial"/>
+            </a:endParaRPr>
+          </a:p>
+        </p:txBody>
+      </p:sp>
+      <p:sp>
+        <p:nvSpPr>
+          <p:cNvPr id="41" name="PlaceHolder 7"/>
           <p:cNvSpPr>
             <a:spLocks noGrp="1"/>
           </p:cNvSpPr>
@@ -588,10 +549,7 @@
             <a:normAutofit/>
           </a:bodyPr>
           <a:p>
-            <a:endParaRPr b="0" lang="en-US" sz="1400" spc="-1" strike="noStrike">
-              <a:solidFill>
-                <a:srgbClr val="000000"/>
-              </a:solidFill>
+            <a:endParaRPr b="0" lang="en-US" sz="3200" spc="-1" strike="noStrike">
               <a:latin typeface="Arial"/>
             </a:endParaRPr>
           </a:p>
@@ -643,7 +601,7 @@
       </p:grpSpPr>
       <p:sp>
         <p:nvSpPr>
-          <p:cNvPr id="50" name="PlaceHolder 1"/>
+          <p:cNvPr id="48" name="PlaceHolder 1"/>
           <p:cNvSpPr>
             <a:spLocks noGrp="1"/>
           </p:cNvSpPr>
@@ -653,8 +611,8 @@
         </p:nvSpPr>
         <p:spPr>
           <a:xfrm>
-            <a:off x="729360" y="1318680"/>
-            <a:ext cx="7688520" cy="534960"/>
+            <a:off x="729360" y="1156680"/>
+            <a:ext cx="7688160" cy="858960"/>
           </a:xfrm>
           <a:prstGeom prst="rect">
             <a:avLst/>
@@ -665,18 +623,16 @@
             <a:spAutoFit/>
           </a:bodyPr>
           <a:p>
-            <a:endParaRPr b="0" lang="en-US" sz="1400" spc="-1" strike="noStrike">
-              <a:solidFill>
-                <a:srgbClr val="000000"/>
-              </a:solidFill>
-              <a:latin typeface="Arial"/>
-            </a:endParaRPr>
-          </a:p>
-        </p:txBody>
-      </p:sp>
-      <p:sp>
-        <p:nvSpPr>
-          <p:cNvPr id="51" name="PlaceHolder 2"/>
+            <a:pPr algn="ctr"/>
+            <a:endParaRPr b="0" lang="en-US" sz="4400" spc="-1" strike="noStrike">
+              <a:latin typeface="Arial"/>
+            </a:endParaRPr>
+          </a:p>
+        </p:txBody>
+      </p:sp>
+      <p:sp>
+        <p:nvSpPr>
+          <p:cNvPr id="49" name="PlaceHolder 2"/>
           <p:cNvSpPr>
             <a:spLocks noGrp="1"/>
           </p:cNvSpPr>
@@ -687,7 +643,7 @@
         <p:spPr>
           <a:xfrm>
             <a:off x="729360" y="2079000"/>
-            <a:ext cx="7688520" cy="2260800"/>
+            <a:ext cx="7688160" cy="2260440"/>
           </a:xfrm>
           <a:prstGeom prst="rect">
             <a:avLst/>
@@ -729,7 +685,7 @@
       </p:grpSpPr>
       <p:sp>
         <p:nvSpPr>
-          <p:cNvPr id="52" name="PlaceHolder 1"/>
+          <p:cNvPr id="50" name="PlaceHolder 1"/>
           <p:cNvSpPr>
             <a:spLocks noGrp="1"/>
           </p:cNvSpPr>
@@ -739,8 +695,8 @@
         </p:nvSpPr>
         <p:spPr>
           <a:xfrm>
-            <a:off x="729360" y="1318680"/>
-            <a:ext cx="7688520" cy="534960"/>
+            <a:off x="729360" y="1156680"/>
+            <a:ext cx="7688160" cy="858960"/>
           </a:xfrm>
           <a:prstGeom prst="rect">
             <a:avLst/>
@@ -751,18 +707,16 @@
             <a:spAutoFit/>
           </a:bodyPr>
           <a:p>
-            <a:endParaRPr b="0" lang="en-US" sz="1400" spc="-1" strike="noStrike">
-              <a:solidFill>
-                <a:srgbClr val="000000"/>
-              </a:solidFill>
-              <a:latin typeface="Arial"/>
-            </a:endParaRPr>
-          </a:p>
-        </p:txBody>
-      </p:sp>
-      <p:sp>
-        <p:nvSpPr>
-          <p:cNvPr id="53" name="PlaceHolder 2"/>
+            <a:pPr algn="ctr"/>
+            <a:endParaRPr b="0" lang="en-US" sz="4400" spc="-1" strike="noStrike">
+              <a:latin typeface="Arial"/>
+            </a:endParaRPr>
+          </a:p>
+        </p:txBody>
+      </p:sp>
+      <p:sp>
+        <p:nvSpPr>
+          <p:cNvPr id="51" name="PlaceHolder 2"/>
           <p:cNvSpPr>
             <a:spLocks noGrp="1"/>
           </p:cNvSpPr>
@@ -773,7 +727,7 @@
         <p:spPr>
           <a:xfrm>
             <a:off x="729360" y="2079000"/>
-            <a:ext cx="7688520" cy="2260800"/>
+            <a:ext cx="7688160" cy="2260440"/>
           </a:xfrm>
           <a:prstGeom prst="rect">
             <a:avLst/>
@@ -784,10 +738,7 @@
             <a:normAutofit/>
           </a:bodyPr>
           <a:p>
-            <a:endParaRPr b="0" lang="en-US" sz="1400" spc="-1" strike="noStrike">
-              <a:solidFill>
-                <a:srgbClr val="000000"/>
-              </a:solidFill>
+            <a:endParaRPr b="0" lang="en-US" sz="3200" spc="-1" strike="noStrike">
               <a:latin typeface="Arial"/>
             </a:endParaRPr>
           </a:p>
@@ -817,7 +768,7 @@
       </p:grpSpPr>
       <p:sp>
         <p:nvSpPr>
-          <p:cNvPr id="54" name="PlaceHolder 1"/>
+          <p:cNvPr id="52" name="PlaceHolder 1"/>
           <p:cNvSpPr>
             <a:spLocks noGrp="1"/>
           </p:cNvSpPr>
@@ -827,8 +778,8 @@
         </p:nvSpPr>
         <p:spPr>
           <a:xfrm>
-            <a:off x="729360" y="1318680"/>
-            <a:ext cx="7688520" cy="534960"/>
+            <a:off x="729360" y="1156680"/>
+            <a:ext cx="7688160" cy="858960"/>
           </a:xfrm>
           <a:prstGeom prst="rect">
             <a:avLst/>
@@ -839,18 +790,16 @@
             <a:spAutoFit/>
           </a:bodyPr>
           <a:p>
-            <a:endParaRPr b="0" lang="en-US" sz="1400" spc="-1" strike="noStrike">
-              <a:solidFill>
-                <a:srgbClr val="000000"/>
-              </a:solidFill>
-              <a:latin typeface="Arial"/>
-            </a:endParaRPr>
-          </a:p>
-        </p:txBody>
-      </p:sp>
-      <p:sp>
-        <p:nvSpPr>
-          <p:cNvPr id="55" name="PlaceHolder 2"/>
+            <a:pPr algn="ctr"/>
+            <a:endParaRPr b="0" lang="en-US" sz="4400" spc="-1" strike="noStrike">
+              <a:latin typeface="Arial"/>
+            </a:endParaRPr>
+          </a:p>
+        </p:txBody>
+      </p:sp>
+      <p:sp>
+        <p:nvSpPr>
+          <p:cNvPr id="53" name="PlaceHolder 2"/>
           <p:cNvSpPr>
             <a:spLocks noGrp="1"/>
           </p:cNvSpPr>
@@ -861,7 +810,7 @@
         <p:spPr>
           <a:xfrm>
             <a:off x="729360" y="2079000"/>
-            <a:ext cx="3751920" cy="2260800"/>
+            <a:ext cx="3751560" cy="2260440"/>
           </a:xfrm>
           <a:prstGeom prst="rect">
             <a:avLst/>
@@ -872,18 +821,15 @@
             <a:normAutofit/>
           </a:bodyPr>
           <a:p>
-            <a:endParaRPr b="0" lang="en-US" sz="1400" spc="-1" strike="noStrike">
-              <a:solidFill>
-                <a:srgbClr val="000000"/>
-              </a:solidFill>
-              <a:latin typeface="Arial"/>
-            </a:endParaRPr>
-          </a:p>
-        </p:txBody>
-      </p:sp>
-      <p:sp>
-        <p:nvSpPr>
-          <p:cNvPr id="56" name="PlaceHolder 3"/>
+            <a:endParaRPr b="0" lang="en-US" sz="3200" spc="-1" strike="noStrike">
+              <a:latin typeface="Arial"/>
+            </a:endParaRPr>
+          </a:p>
+        </p:txBody>
+      </p:sp>
+      <p:sp>
+        <p:nvSpPr>
+          <p:cNvPr id="54" name="PlaceHolder 3"/>
           <p:cNvSpPr>
             <a:spLocks noGrp="1"/>
           </p:cNvSpPr>
@@ -893,8 +839,8 @@
         </p:nvSpPr>
         <p:spPr>
           <a:xfrm>
-            <a:off x="4669200" y="2079000"/>
-            <a:ext cx="3751920" cy="2260800"/>
+            <a:off x="4668840" y="2079000"/>
+            <a:ext cx="3751560" cy="2260440"/>
           </a:xfrm>
           <a:prstGeom prst="rect">
             <a:avLst/>
@@ -905,10 +851,7 @@
             <a:normAutofit/>
           </a:bodyPr>
           <a:p>
-            <a:endParaRPr b="0" lang="en-US" sz="1400" spc="-1" strike="noStrike">
-              <a:solidFill>
-                <a:srgbClr val="000000"/>
-              </a:solidFill>
+            <a:endParaRPr b="0" lang="en-US" sz="3200" spc="-1" strike="noStrike">
               <a:latin typeface="Arial"/>
             </a:endParaRPr>
           </a:p>
@@ -938,7 +881,7 @@
       </p:grpSpPr>
       <p:sp>
         <p:nvSpPr>
-          <p:cNvPr id="57" name="PlaceHolder 1"/>
+          <p:cNvPr id="55" name="PlaceHolder 1"/>
           <p:cNvSpPr>
             <a:spLocks noGrp="1"/>
           </p:cNvSpPr>
@@ -948,8 +891,8 @@
         </p:nvSpPr>
         <p:spPr>
           <a:xfrm>
-            <a:off x="729360" y="1318680"/>
-            <a:ext cx="7688520" cy="534960"/>
+            <a:off x="729360" y="1156680"/>
+            <a:ext cx="7688160" cy="858960"/>
           </a:xfrm>
           <a:prstGeom prst="rect">
             <a:avLst/>
@@ -960,10 +903,8 @@
             <a:spAutoFit/>
           </a:bodyPr>
           <a:p>
-            <a:endParaRPr b="0" lang="en-US" sz="1400" spc="-1" strike="noStrike">
-              <a:solidFill>
-                <a:srgbClr val="000000"/>
-              </a:solidFill>
+            <a:pPr algn="ctr"/>
+            <a:endParaRPr b="0" lang="en-US" sz="4400" spc="-1" strike="noStrike">
               <a:latin typeface="Arial"/>
             </a:endParaRPr>
           </a:p>
@@ -993,7 +934,7 @@
       </p:grpSpPr>
       <p:sp>
         <p:nvSpPr>
-          <p:cNvPr id="58" name="PlaceHolder 1"/>
+          <p:cNvPr id="56" name="PlaceHolder 1"/>
           <p:cNvSpPr>
             <a:spLocks noGrp="1"/>
           </p:cNvSpPr>
@@ -1003,8 +944,8 @@
         </p:nvSpPr>
         <p:spPr>
           <a:xfrm>
-            <a:off x="729360" y="1318680"/>
-            <a:ext cx="7688520" cy="2481120"/>
+            <a:off x="729360" y="1156680"/>
+            <a:ext cx="7688160" cy="3983040"/>
           </a:xfrm>
           <a:prstGeom prst="rect">
             <a:avLst/>
@@ -1046,7 +987,7 @@
       </p:grpSpPr>
       <p:sp>
         <p:nvSpPr>
-          <p:cNvPr id="59" name="PlaceHolder 1"/>
+          <p:cNvPr id="57" name="PlaceHolder 1"/>
           <p:cNvSpPr>
             <a:spLocks noGrp="1"/>
           </p:cNvSpPr>
@@ -1056,8 +997,8 @@
         </p:nvSpPr>
         <p:spPr>
           <a:xfrm>
-            <a:off x="729360" y="1318680"/>
-            <a:ext cx="7688520" cy="534960"/>
+            <a:off x="729360" y="1156680"/>
+            <a:ext cx="7688160" cy="858960"/>
           </a:xfrm>
           <a:prstGeom prst="rect">
             <a:avLst/>
@@ -1068,18 +1009,16 @@
             <a:spAutoFit/>
           </a:bodyPr>
           <a:p>
-            <a:endParaRPr b="0" lang="en-US" sz="1400" spc="-1" strike="noStrike">
-              <a:solidFill>
-                <a:srgbClr val="000000"/>
-              </a:solidFill>
-              <a:latin typeface="Arial"/>
-            </a:endParaRPr>
-          </a:p>
-        </p:txBody>
-      </p:sp>
-      <p:sp>
-        <p:nvSpPr>
-          <p:cNvPr id="60" name="PlaceHolder 2"/>
+            <a:pPr algn="ctr"/>
+            <a:endParaRPr b="0" lang="en-US" sz="4400" spc="-1" strike="noStrike">
+              <a:latin typeface="Arial"/>
+            </a:endParaRPr>
+          </a:p>
+        </p:txBody>
+      </p:sp>
+      <p:sp>
+        <p:nvSpPr>
+          <p:cNvPr id="58" name="PlaceHolder 2"/>
           <p:cNvSpPr>
             <a:spLocks noGrp="1"/>
           </p:cNvSpPr>
@@ -1090,7 +1029,7 @@
         <p:spPr>
           <a:xfrm>
             <a:off x="729360" y="2079000"/>
-            <a:ext cx="3751920" cy="1078200"/>
+            <a:ext cx="3751560" cy="1078200"/>
           </a:xfrm>
           <a:prstGeom prst="rect">
             <a:avLst/>
@@ -1101,18 +1040,15 @@
             <a:normAutofit/>
           </a:bodyPr>
           <a:p>
-            <a:endParaRPr b="0" lang="en-US" sz="1400" spc="-1" strike="noStrike">
-              <a:solidFill>
-                <a:srgbClr val="000000"/>
-              </a:solidFill>
-              <a:latin typeface="Arial"/>
-            </a:endParaRPr>
-          </a:p>
-        </p:txBody>
-      </p:sp>
-      <p:sp>
-        <p:nvSpPr>
-          <p:cNvPr id="61" name="PlaceHolder 3"/>
+            <a:endParaRPr b="0" lang="en-US" sz="3200" spc="-1" strike="noStrike">
+              <a:latin typeface="Arial"/>
+            </a:endParaRPr>
+          </a:p>
+        </p:txBody>
+      </p:sp>
+      <p:sp>
+        <p:nvSpPr>
+          <p:cNvPr id="59" name="PlaceHolder 3"/>
           <p:cNvSpPr>
             <a:spLocks noGrp="1"/>
           </p:cNvSpPr>
@@ -1122,8 +1058,8 @@
         </p:nvSpPr>
         <p:spPr>
           <a:xfrm>
-            <a:off x="4669200" y="2079000"/>
-            <a:ext cx="3751920" cy="2260800"/>
+            <a:off x="4668840" y="2079000"/>
+            <a:ext cx="3751560" cy="2260440"/>
           </a:xfrm>
           <a:prstGeom prst="rect">
             <a:avLst/>
@@ -1134,18 +1070,15 @@
             <a:normAutofit/>
           </a:bodyPr>
           <a:p>
-            <a:endParaRPr b="0" lang="en-US" sz="1400" spc="-1" strike="noStrike">
-              <a:solidFill>
-                <a:srgbClr val="000000"/>
-              </a:solidFill>
-              <a:latin typeface="Arial"/>
-            </a:endParaRPr>
-          </a:p>
-        </p:txBody>
-      </p:sp>
-      <p:sp>
-        <p:nvSpPr>
-          <p:cNvPr id="62" name="PlaceHolder 4"/>
+            <a:endParaRPr b="0" lang="en-US" sz="3200" spc="-1" strike="noStrike">
+              <a:latin typeface="Arial"/>
+            </a:endParaRPr>
+          </a:p>
+        </p:txBody>
+      </p:sp>
+      <p:sp>
+        <p:nvSpPr>
+          <p:cNvPr id="60" name="PlaceHolder 4"/>
           <p:cNvSpPr>
             <a:spLocks noGrp="1"/>
           </p:cNvSpPr>
@@ -1156,7 +1089,7 @@
         <p:spPr>
           <a:xfrm>
             <a:off x="729360" y="3260160"/>
-            <a:ext cx="3751920" cy="1078200"/>
+            <a:ext cx="3751560" cy="1078200"/>
           </a:xfrm>
           <a:prstGeom prst="rect">
             <a:avLst/>
@@ -1167,10 +1100,7 @@
             <a:normAutofit/>
           </a:bodyPr>
           <a:p>
-            <a:endParaRPr b="0" lang="en-US" sz="1400" spc="-1" strike="noStrike">
-              <a:solidFill>
-                <a:srgbClr val="000000"/>
-              </a:solidFill>
+            <a:endParaRPr b="0" lang="en-US" sz="3200" spc="-1" strike="noStrike">
               <a:latin typeface="Arial"/>
             </a:endParaRPr>
           </a:p>
@@ -1200,7 +1130,7 @@
       </p:grpSpPr>
       <p:sp>
         <p:nvSpPr>
-          <p:cNvPr id="7" name="PlaceHolder 1"/>
+          <p:cNvPr id="6" name="PlaceHolder 1"/>
           <p:cNvSpPr>
             <a:spLocks noGrp="1"/>
           </p:cNvSpPr>
@@ -1210,8 +1140,8 @@
         </p:nvSpPr>
         <p:spPr>
           <a:xfrm>
-            <a:off x="729360" y="1318680"/>
-            <a:ext cx="7688520" cy="534960"/>
+            <a:off x="729360" y="1156680"/>
+            <a:ext cx="7688160" cy="858960"/>
           </a:xfrm>
           <a:prstGeom prst="rect">
             <a:avLst/>
@@ -1222,18 +1152,16 @@
             <a:spAutoFit/>
           </a:bodyPr>
           <a:p>
-            <a:endParaRPr b="0" lang="en-US" sz="1400" spc="-1" strike="noStrike">
-              <a:solidFill>
-                <a:srgbClr val="000000"/>
-              </a:solidFill>
-              <a:latin typeface="Arial"/>
-            </a:endParaRPr>
-          </a:p>
-        </p:txBody>
-      </p:sp>
-      <p:sp>
-        <p:nvSpPr>
-          <p:cNvPr id="8" name="PlaceHolder 2"/>
+            <a:pPr algn="ctr"/>
+            <a:endParaRPr b="0" lang="en-US" sz="4400" spc="-1" strike="noStrike">
+              <a:latin typeface="Arial"/>
+            </a:endParaRPr>
+          </a:p>
+        </p:txBody>
+      </p:sp>
+      <p:sp>
+        <p:nvSpPr>
+          <p:cNvPr id="7" name="PlaceHolder 2"/>
           <p:cNvSpPr>
             <a:spLocks noGrp="1"/>
           </p:cNvSpPr>
@@ -1244,7 +1172,7 @@
         <p:spPr>
           <a:xfrm>
             <a:off x="729360" y="2079000"/>
-            <a:ext cx="7688520" cy="2260800"/>
+            <a:ext cx="7688160" cy="2260440"/>
           </a:xfrm>
           <a:prstGeom prst="rect">
             <a:avLst/>
@@ -1286,7 +1214,7 @@
       </p:grpSpPr>
       <p:sp>
         <p:nvSpPr>
-          <p:cNvPr id="63" name="PlaceHolder 1"/>
+          <p:cNvPr id="61" name="PlaceHolder 1"/>
           <p:cNvSpPr>
             <a:spLocks noGrp="1"/>
           </p:cNvSpPr>
@@ -1296,8 +1224,8 @@
         </p:nvSpPr>
         <p:spPr>
           <a:xfrm>
-            <a:off x="729360" y="1318680"/>
-            <a:ext cx="7688520" cy="534960"/>
+            <a:off x="729360" y="1156680"/>
+            <a:ext cx="7688160" cy="858960"/>
           </a:xfrm>
           <a:prstGeom prst="rect">
             <a:avLst/>
@@ -1308,18 +1236,16 @@
             <a:spAutoFit/>
           </a:bodyPr>
           <a:p>
-            <a:endParaRPr b="0" lang="en-US" sz="1400" spc="-1" strike="noStrike">
-              <a:solidFill>
-                <a:srgbClr val="000000"/>
-              </a:solidFill>
-              <a:latin typeface="Arial"/>
-            </a:endParaRPr>
-          </a:p>
-        </p:txBody>
-      </p:sp>
-      <p:sp>
-        <p:nvSpPr>
-          <p:cNvPr id="64" name="PlaceHolder 2"/>
+            <a:pPr algn="ctr"/>
+            <a:endParaRPr b="0" lang="en-US" sz="4400" spc="-1" strike="noStrike">
+              <a:latin typeface="Arial"/>
+            </a:endParaRPr>
+          </a:p>
+        </p:txBody>
+      </p:sp>
+      <p:sp>
+        <p:nvSpPr>
+          <p:cNvPr id="62" name="PlaceHolder 2"/>
           <p:cNvSpPr>
             <a:spLocks noGrp="1"/>
           </p:cNvSpPr>
@@ -1330,7 +1256,7 @@
         <p:spPr>
           <a:xfrm>
             <a:off x="729360" y="2079000"/>
-            <a:ext cx="3751920" cy="2260800"/>
+            <a:ext cx="3751560" cy="2260440"/>
           </a:xfrm>
           <a:prstGeom prst="rect">
             <a:avLst/>
@@ -1341,18 +1267,15 @@
             <a:normAutofit/>
           </a:bodyPr>
           <a:p>
-            <a:endParaRPr b="0" lang="en-US" sz="1400" spc="-1" strike="noStrike">
-              <a:solidFill>
-                <a:srgbClr val="000000"/>
-              </a:solidFill>
-              <a:latin typeface="Arial"/>
-            </a:endParaRPr>
-          </a:p>
-        </p:txBody>
-      </p:sp>
-      <p:sp>
-        <p:nvSpPr>
-          <p:cNvPr id="65" name="PlaceHolder 3"/>
+            <a:endParaRPr b="0" lang="en-US" sz="3200" spc="-1" strike="noStrike">
+              <a:latin typeface="Arial"/>
+            </a:endParaRPr>
+          </a:p>
+        </p:txBody>
+      </p:sp>
+      <p:sp>
+        <p:nvSpPr>
+          <p:cNvPr id="63" name="PlaceHolder 3"/>
           <p:cNvSpPr>
             <a:spLocks noGrp="1"/>
           </p:cNvSpPr>
@@ -1362,8 +1285,8 @@
         </p:nvSpPr>
         <p:spPr>
           <a:xfrm>
-            <a:off x="4669200" y="2079000"/>
-            <a:ext cx="3751920" cy="1078200"/>
+            <a:off x="4668840" y="2079000"/>
+            <a:ext cx="3751560" cy="1078200"/>
           </a:xfrm>
           <a:prstGeom prst="rect">
             <a:avLst/>
@@ -1374,18 +1297,15 @@
             <a:normAutofit/>
           </a:bodyPr>
           <a:p>
-            <a:endParaRPr b="0" lang="en-US" sz="1400" spc="-1" strike="noStrike">
-              <a:solidFill>
-                <a:srgbClr val="000000"/>
-              </a:solidFill>
-              <a:latin typeface="Arial"/>
-            </a:endParaRPr>
-          </a:p>
-        </p:txBody>
-      </p:sp>
-      <p:sp>
-        <p:nvSpPr>
-          <p:cNvPr id="66" name="PlaceHolder 4"/>
+            <a:endParaRPr b="0" lang="en-US" sz="3200" spc="-1" strike="noStrike">
+              <a:latin typeface="Arial"/>
+            </a:endParaRPr>
+          </a:p>
+        </p:txBody>
+      </p:sp>
+      <p:sp>
+        <p:nvSpPr>
+          <p:cNvPr id="64" name="PlaceHolder 4"/>
           <p:cNvSpPr>
             <a:spLocks noGrp="1"/>
           </p:cNvSpPr>
@@ -1395,8 +1315,8 @@
         </p:nvSpPr>
         <p:spPr>
           <a:xfrm>
-            <a:off x="4669200" y="3260160"/>
-            <a:ext cx="3751920" cy="1078200"/>
+            <a:off x="4668840" y="3260160"/>
+            <a:ext cx="3751560" cy="1078200"/>
           </a:xfrm>
           <a:prstGeom prst="rect">
             <a:avLst/>
@@ -1407,10 +1327,7 @@
             <a:normAutofit/>
           </a:bodyPr>
           <a:p>
-            <a:endParaRPr b="0" lang="en-US" sz="1400" spc="-1" strike="noStrike">
-              <a:solidFill>
-                <a:srgbClr val="000000"/>
-              </a:solidFill>
+            <a:endParaRPr b="0" lang="en-US" sz="3200" spc="-1" strike="noStrike">
               <a:latin typeface="Arial"/>
             </a:endParaRPr>
           </a:p>
@@ -1440,7 +1357,7 @@
       </p:grpSpPr>
       <p:sp>
         <p:nvSpPr>
-          <p:cNvPr id="67" name="PlaceHolder 1"/>
+          <p:cNvPr id="65" name="PlaceHolder 1"/>
           <p:cNvSpPr>
             <a:spLocks noGrp="1"/>
           </p:cNvSpPr>
@@ -1450,8 +1367,8 @@
         </p:nvSpPr>
         <p:spPr>
           <a:xfrm>
-            <a:off x="729360" y="1318680"/>
-            <a:ext cx="7688520" cy="534960"/>
+            <a:off x="729360" y="1156680"/>
+            <a:ext cx="7688160" cy="858960"/>
           </a:xfrm>
           <a:prstGeom prst="rect">
             <a:avLst/>
@@ -1462,18 +1379,16 @@
             <a:spAutoFit/>
           </a:bodyPr>
           <a:p>
-            <a:endParaRPr b="0" lang="en-US" sz="1400" spc="-1" strike="noStrike">
-              <a:solidFill>
-                <a:srgbClr val="000000"/>
-              </a:solidFill>
-              <a:latin typeface="Arial"/>
-            </a:endParaRPr>
-          </a:p>
-        </p:txBody>
-      </p:sp>
-      <p:sp>
-        <p:nvSpPr>
-          <p:cNvPr id="68" name="PlaceHolder 2"/>
+            <a:pPr algn="ctr"/>
+            <a:endParaRPr b="0" lang="en-US" sz="4400" spc="-1" strike="noStrike">
+              <a:latin typeface="Arial"/>
+            </a:endParaRPr>
+          </a:p>
+        </p:txBody>
+      </p:sp>
+      <p:sp>
+        <p:nvSpPr>
+          <p:cNvPr id="66" name="PlaceHolder 2"/>
           <p:cNvSpPr>
             <a:spLocks noGrp="1"/>
           </p:cNvSpPr>
@@ -1484,7 +1399,7 @@
         <p:spPr>
           <a:xfrm>
             <a:off x="729360" y="2079000"/>
-            <a:ext cx="3751920" cy="1078200"/>
+            <a:ext cx="3751560" cy="1078200"/>
           </a:xfrm>
           <a:prstGeom prst="rect">
             <a:avLst/>
@@ -1495,18 +1410,15 @@
             <a:normAutofit/>
           </a:bodyPr>
           <a:p>
-            <a:endParaRPr b="0" lang="en-US" sz="1400" spc="-1" strike="noStrike">
-              <a:solidFill>
-                <a:srgbClr val="000000"/>
-              </a:solidFill>
-              <a:latin typeface="Arial"/>
-            </a:endParaRPr>
-          </a:p>
-        </p:txBody>
-      </p:sp>
-      <p:sp>
-        <p:nvSpPr>
-          <p:cNvPr id="69" name="PlaceHolder 3"/>
+            <a:endParaRPr b="0" lang="en-US" sz="3200" spc="-1" strike="noStrike">
+              <a:latin typeface="Arial"/>
+            </a:endParaRPr>
+          </a:p>
+        </p:txBody>
+      </p:sp>
+      <p:sp>
+        <p:nvSpPr>
+          <p:cNvPr id="67" name="PlaceHolder 3"/>
           <p:cNvSpPr>
             <a:spLocks noGrp="1"/>
           </p:cNvSpPr>
@@ -1516,8 +1428,8 @@
         </p:nvSpPr>
         <p:spPr>
           <a:xfrm>
-            <a:off x="4669200" y="2079000"/>
-            <a:ext cx="3751920" cy="1078200"/>
+            <a:off x="4668840" y="2079000"/>
+            <a:ext cx="3751560" cy="1078200"/>
           </a:xfrm>
           <a:prstGeom prst="rect">
             <a:avLst/>
@@ -1528,18 +1440,15 @@
             <a:normAutofit/>
           </a:bodyPr>
           <a:p>
-            <a:endParaRPr b="0" lang="en-US" sz="1400" spc="-1" strike="noStrike">
-              <a:solidFill>
-                <a:srgbClr val="000000"/>
-              </a:solidFill>
-              <a:latin typeface="Arial"/>
-            </a:endParaRPr>
-          </a:p>
-        </p:txBody>
-      </p:sp>
-      <p:sp>
-        <p:nvSpPr>
-          <p:cNvPr id="70" name="PlaceHolder 4"/>
+            <a:endParaRPr b="0" lang="en-US" sz="3200" spc="-1" strike="noStrike">
+              <a:latin typeface="Arial"/>
+            </a:endParaRPr>
+          </a:p>
+        </p:txBody>
+      </p:sp>
+      <p:sp>
+        <p:nvSpPr>
+          <p:cNvPr id="68" name="PlaceHolder 4"/>
           <p:cNvSpPr>
             <a:spLocks noGrp="1"/>
           </p:cNvSpPr>
@@ -1550,7 +1459,7 @@
         <p:spPr>
           <a:xfrm>
             <a:off x="729360" y="3260160"/>
-            <a:ext cx="7688520" cy="1078200"/>
+            <a:ext cx="7688160" cy="1078200"/>
           </a:xfrm>
           <a:prstGeom prst="rect">
             <a:avLst/>
@@ -1561,10 +1470,7 @@
             <a:normAutofit/>
           </a:bodyPr>
           <a:p>
-            <a:endParaRPr b="0" lang="en-US" sz="1400" spc="-1" strike="noStrike">
-              <a:solidFill>
-                <a:srgbClr val="000000"/>
-              </a:solidFill>
+            <a:endParaRPr b="0" lang="en-US" sz="3200" spc="-1" strike="noStrike">
               <a:latin typeface="Arial"/>
             </a:endParaRPr>
           </a:p>
@@ -1594,7 +1500,7 @@
       </p:grpSpPr>
       <p:sp>
         <p:nvSpPr>
-          <p:cNvPr id="71" name="PlaceHolder 1"/>
+          <p:cNvPr id="69" name="PlaceHolder 1"/>
           <p:cNvSpPr>
             <a:spLocks noGrp="1"/>
           </p:cNvSpPr>
@@ -1604,8 +1510,8 @@
         </p:nvSpPr>
         <p:spPr>
           <a:xfrm>
-            <a:off x="729360" y="1318680"/>
-            <a:ext cx="7688520" cy="534960"/>
+            <a:off x="729360" y="1156680"/>
+            <a:ext cx="7688160" cy="858960"/>
           </a:xfrm>
           <a:prstGeom prst="rect">
             <a:avLst/>
@@ -1616,18 +1522,16 @@
             <a:spAutoFit/>
           </a:bodyPr>
           <a:p>
-            <a:endParaRPr b="0" lang="en-US" sz="1400" spc="-1" strike="noStrike">
-              <a:solidFill>
-                <a:srgbClr val="000000"/>
-              </a:solidFill>
-              <a:latin typeface="Arial"/>
-            </a:endParaRPr>
-          </a:p>
-        </p:txBody>
-      </p:sp>
-      <p:sp>
-        <p:nvSpPr>
-          <p:cNvPr id="72" name="PlaceHolder 2"/>
+            <a:pPr algn="ctr"/>
+            <a:endParaRPr b="0" lang="en-US" sz="4400" spc="-1" strike="noStrike">
+              <a:latin typeface="Arial"/>
+            </a:endParaRPr>
+          </a:p>
+        </p:txBody>
+      </p:sp>
+      <p:sp>
+        <p:nvSpPr>
+          <p:cNvPr id="70" name="PlaceHolder 2"/>
           <p:cNvSpPr>
             <a:spLocks noGrp="1"/>
           </p:cNvSpPr>
@@ -1638,7 +1542,7 @@
         <p:spPr>
           <a:xfrm>
             <a:off x="729360" y="2079000"/>
-            <a:ext cx="7688520" cy="1078200"/>
+            <a:ext cx="7688160" cy="1078200"/>
           </a:xfrm>
           <a:prstGeom prst="rect">
             <a:avLst/>
@@ -1649,18 +1553,15 @@
             <a:normAutofit/>
           </a:bodyPr>
           <a:p>
-            <a:endParaRPr b="0" lang="en-US" sz="1400" spc="-1" strike="noStrike">
-              <a:solidFill>
-                <a:srgbClr val="000000"/>
-              </a:solidFill>
-              <a:latin typeface="Arial"/>
-            </a:endParaRPr>
-          </a:p>
-        </p:txBody>
-      </p:sp>
-      <p:sp>
-        <p:nvSpPr>
-          <p:cNvPr id="73" name="PlaceHolder 3"/>
+            <a:endParaRPr b="0" lang="en-US" sz="3200" spc="-1" strike="noStrike">
+              <a:latin typeface="Arial"/>
+            </a:endParaRPr>
+          </a:p>
+        </p:txBody>
+      </p:sp>
+      <p:sp>
+        <p:nvSpPr>
+          <p:cNvPr id="71" name="PlaceHolder 3"/>
           <p:cNvSpPr>
             <a:spLocks noGrp="1"/>
           </p:cNvSpPr>
@@ -1671,7 +1572,7 @@
         <p:spPr>
           <a:xfrm>
             <a:off x="729360" y="3260160"/>
-            <a:ext cx="7688520" cy="1078200"/>
+            <a:ext cx="7688160" cy="1078200"/>
           </a:xfrm>
           <a:prstGeom prst="rect">
             <a:avLst/>
@@ -1682,10 +1583,7 @@
             <a:normAutofit/>
           </a:bodyPr>
           <a:p>
-            <a:endParaRPr b="0" lang="en-US" sz="1400" spc="-1" strike="noStrike">
-              <a:solidFill>
-                <a:srgbClr val="000000"/>
-              </a:solidFill>
+            <a:endParaRPr b="0" lang="en-US" sz="3200" spc="-1" strike="noStrike">
               <a:latin typeface="Arial"/>
             </a:endParaRPr>
           </a:p>
@@ -1715,7 +1613,7 @@
       </p:grpSpPr>
       <p:sp>
         <p:nvSpPr>
-          <p:cNvPr id="74" name="PlaceHolder 1"/>
+          <p:cNvPr id="72" name="PlaceHolder 1"/>
           <p:cNvSpPr>
             <a:spLocks noGrp="1"/>
           </p:cNvSpPr>
@@ -1725,8 +1623,8 @@
         </p:nvSpPr>
         <p:spPr>
           <a:xfrm>
-            <a:off x="729360" y="1318680"/>
-            <a:ext cx="7688520" cy="534960"/>
+            <a:off x="729360" y="1156680"/>
+            <a:ext cx="7688160" cy="858960"/>
           </a:xfrm>
           <a:prstGeom prst="rect">
             <a:avLst/>
@@ -1737,18 +1635,16 @@
             <a:spAutoFit/>
           </a:bodyPr>
           <a:p>
-            <a:endParaRPr b="0" lang="en-US" sz="1400" spc="-1" strike="noStrike">
-              <a:solidFill>
-                <a:srgbClr val="000000"/>
-              </a:solidFill>
-              <a:latin typeface="Arial"/>
-            </a:endParaRPr>
-          </a:p>
-        </p:txBody>
-      </p:sp>
-      <p:sp>
-        <p:nvSpPr>
-          <p:cNvPr id="75" name="PlaceHolder 2"/>
+            <a:pPr algn="ctr"/>
+            <a:endParaRPr b="0" lang="en-US" sz="4400" spc="-1" strike="noStrike">
+              <a:latin typeface="Arial"/>
+            </a:endParaRPr>
+          </a:p>
+        </p:txBody>
+      </p:sp>
+      <p:sp>
+        <p:nvSpPr>
+          <p:cNvPr id="73" name="PlaceHolder 2"/>
           <p:cNvSpPr>
             <a:spLocks noGrp="1"/>
           </p:cNvSpPr>
@@ -1759,7 +1655,7 @@
         <p:spPr>
           <a:xfrm>
             <a:off x="729360" y="2079000"/>
-            <a:ext cx="3751920" cy="1078200"/>
+            <a:ext cx="3751560" cy="1078200"/>
           </a:xfrm>
           <a:prstGeom prst="rect">
             <a:avLst/>
@@ -1770,18 +1666,15 @@
             <a:normAutofit/>
           </a:bodyPr>
           <a:p>
-            <a:endParaRPr b="0" lang="en-US" sz="1400" spc="-1" strike="noStrike">
-              <a:solidFill>
-                <a:srgbClr val="000000"/>
-              </a:solidFill>
-              <a:latin typeface="Arial"/>
-            </a:endParaRPr>
-          </a:p>
-        </p:txBody>
-      </p:sp>
-      <p:sp>
-        <p:nvSpPr>
-          <p:cNvPr id="76" name="PlaceHolder 3"/>
+            <a:endParaRPr b="0" lang="en-US" sz="3200" spc="-1" strike="noStrike">
+              <a:latin typeface="Arial"/>
+            </a:endParaRPr>
+          </a:p>
+        </p:txBody>
+      </p:sp>
+      <p:sp>
+        <p:nvSpPr>
+          <p:cNvPr id="74" name="PlaceHolder 3"/>
           <p:cNvSpPr>
             <a:spLocks noGrp="1"/>
           </p:cNvSpPr>
@@ -1791,8 +1684,8 @@
         </p:nvSpPr>
         <p:spPr>
           <a:xfrm>
-            <a:off x="4669200" y="2079000"/>
-            <a:ext cx="3751920" cy="1078200"/>
+            <a:off x="4668840" y="2079000"/>
+            <a:ext cx="3751560" cy="1078200"/>
           </a:xfrm>
           <a:prstGeom prst="rect">
             <a:avLst/>
@@ -1803,18 +1696,15 @@
             <a:normAutofit/>
           </a:bodyPr>
           <a:p>
-            <a:endParaRPr b="0" lang="en-US" sz="1400" spc="-1" strike="noStrike">
-              <a:solidFill>
-                <a:srgbClr val="000000"/>
-              </a:solidFill>
-              <a:latin typeface="Arial"/>
-            </a:endParaRPr>
-          </a:p>
-        </p:txBody>
-      </p:sp>
-      <p:sp>
-        <p:nvSpPr>
-          <p:cNvPr id="77" name="PlaceHolder 4"/>
+            <a:endParaRPr b="0" lang="en-US" sz="3200" spc="-1" strike="noStrike">
+              <a:latin typeface="Arial"/>
+            </a:endParaRPr>
+          </a:p>
+        </p:txBody>
+      </p:sp>
+      <p:sp>
+        <p:nvSpPr>
+          <p:cNvPr id="75" name="PlaceHolder 4"/>
           <p:cNvSpPr>
             <a:spLocks noGrp="1"/>
           </p:cNvSpPr>
@@ -1825,7 +1715,7 @@
         <p:spPr>
           <a:xfrm>
             <a:off x="729360" y="3260160"/>
-            <a:ext cx="3751920" cy="1078200"/>
+            <a:ext cx="3751560" cy="1078200"/>
           </a:xfrm>
           <a:prstGeom prst="rect">
             <a:avLst/>
@@ -1836,18 +1726,15 @@
             <a:normAutofit/>
           </a:bodyPr>
           <a:p>
-            <a:endParaRPr b="0" lang="en-US" sz="1400" spc="-1" strike="noStrike">
-              <a:solidFill>
-                <a:srgbClr val="000000"/>
-              </a:solidFill>
-              <a:latin typeface="Arial"/>
-            </a:endParaRPr>
-          </a:p>
-        </p:txBody>
-      </p:sp>
-      <p:sp>
-        <p:nvSpPr>
-          <p:cNvPr id="78" name="PlaceHolder 5"/>
+            <a:endParaRPr b="0" lang="en-US" sz="3200" spc="-1" strike="noStrike">
+              <a:latin typeface="Arial"/>
+            </a:endParaRPr>
+          </a:p>
+        </p:txBody>
+      </p:sp>
+      <p:sp>
+        <p:nvSpPr>
+          <p:cNvPr id="76" name="PlaceHolder 5"/>
           <p:cNvSpPr>
             <a:spLocks noGrp="1"/>
           </p:cNvSpPr>
@@ -1857,8 +1744,8 @@
         </p:nvSpPr>
         <p:spPr>
           <a:xfrm>
-            <a:off x="4669200" y="3260160"/>
-            <a:ext cx="3751920" cy="1078200"/>
+            <a:off x="4668840" y="3260160"/>
+            <a:ext cx="3751560" cy="1078200"/>
           </a:xfrm>
           <a:prstGeom prst="rect">
             <a:avLst/>
@@ -1869,10 +1756,7 @@
             <a:normAutofit/>
           </a:bodyPr>
           <a:p>
-            <a:endParaRPr b="0" lang="en-US" sz="1400" spc="-1" strike="noStrike">
-              <a:solidFill>
-                <a:srgbClr val="000000"/>
-              </a:solidFill>
+            <a:endParaRPr b="0" lang="en-US" sz="3200" spc="-1" strike="noStrike">
               <a:latin typeface="Arial"/>
             </a:endParaRPr>
           </a:p>
@@ -1902,7 +1786,7 @@
       </p:grpSpPr>
       <p:sp>
         <p:nvSpPr>
-          <p:cNvPr id="79" name="PlaceHolder 1"/>
+          <p:cNvPr id="77" name="PlaceHolder 1"/>
           <p:cNvSpPr>
             <a:spLocks noGrp="1"/>
           </p:cNvSpPr>
@@ -1912,8 +1796,8 @@
         </p:nvSpPr>
         <p:spPr>
           <a:xfrm>
-            <a:off x="729360" y="1318680"/>
-            <a:ext cx="7688520" cy="534960"/>
+            <a:off x="729360" y="1156680"/>
+            <a:ext cx="7688160" cy="858960"/>
           </a:xfrm>
           <a:prstGeom prst="rect">
             <a:avLst/>
@@ -1924,18 +1808,16 @@
             <a:spAutoFit/>
           </a:bodyPr>
           <a:p>
-            <a:endParaRPr b="0" lang="en-US" sz="1400" spc="-1" strike="noStrike">
-              <a:solidFill>
-                <a:srgbClr val="000000"/>
-              </a:solidFill>
-              <a:latin typeface="Arial"/>
-            </a:endParaRPr>
-          </a:p>
-        </p:txBody>
-      </p:sp>
-      <p:sp>
-        <p:nvSpPr>
-          <p:cNvPr id="80" name="PlaceHolder 2"/>
+            <a:pPr algn="ctr"/>
+            <a:endParaRPr b="0" lang="en-US" sz="4400" spc="-1" strike="noStrike">
+              <a:latin typeface="Arial"/>
+            </a:endParaRPr>
+          </a:p>
+        </p:txBody>
+      </p:sp>
+      <p:sp>
+        <p:nvSpPr>
+          <p:cNvPr id="78" name="PlaceHolder 2"/>
           <p:cNvSpPr>
             <a:spLocks noGrp="1"/>
           </p:cNvSpPr>
@@ -1957,18 +1839,15 @@
             <a:normAutofit/>
           </a:bodyPr>
           <a:p>
-            <a:endParaRPr b="0" lang="en-US" sz="1400" spc="-1" strike="noStrike">
-              <a:solidFill>
-                <a:srgbClr val="000000"/>
-              </a:solidFill>
-              <a:latin typeface="Arial"/>
-            </a:endParaRPr>
-          </a:p>
-        </p:txBody>
-      </p:sp>
-      <p:sp>
-        <p:nvSpPr>
-          <p:cNvPr id="81" name="PlaceHolder 3"/>
+            <a:endParaRPr b="0" lang="en-US" sz="3200" spc="-1" strike="noStrike">
+              <a:latin typeface="Arial"/>
+            </a:endParaRPr>
+          </a:p>
+        </p:txBody>
+      </p:sp>
+      <p:sp>
+        <p:nvSpPr>
+          <p:cNvPr id="79" name="PlaceHolder 3"/>
           <p:cNvSpPr>
             <a:spLocks noGrp="1"/>
           </p:cNvSpPr>
@@ -1990,18 +1869,15 @@
             <a:normAutofit/>
           </a:bodyPr>
           <a:p>
-            <a:endParaRPr b="0" lang="en-US" sz="1400" spc="-1" strike="noStrike">
-              <a:solidFill>
-                <a:srgbClr val="000000"/>
-              </a:solidFill>
-              <a:latin typeface="Arial"/>
-            </a:endParaRPr>
-          </a:p>
-        </p:txBody>
-      </p:sp>
-      <p:sp>
-        <p:nvSpPr>
-          <p:cNvPr id="82" name="PlaceHolder 4"/>
+            <a:endParaRPr b="0" lang="en-US" sz="3200" spc="-1" strike="noStrike">
+              <a:latin typeface="Arial"/>
+            </a:endParaRPr>
+          </a:p>
+        </p:txBody>
+      </p:sp>
+      <p:sp>
+        <p:nvSpPr>
+          <p:cNvPr id="80" name="PlaceHolder 4"/>
           <p:cNvSpPr>
             <a:spLocks noGrp="1"/>
           </p:cNvSpPr>
@@ -2023,18 +1899,15 @@
             <a:normAutofit/>
           </a:bodyPr>
           <a:p>
-            <a:endParaRPr b="0" lang="en-US" sz="1400" spc="-1" strike="noStrike">
-              <a:solidFill>
-                <a:srgbClr val="000000"/>
-              </a:solidFill>
-              <a:latin typeface="Arial"/>
-            </a:endParaRPr>
-          </a:p>
-        </p:txBody>
-      </p:sp>
-      <p:sp>
-        <p:nvSpPr>
-          <p:cNvPr id="83" name="PlaceHolder 5"/>
+            <a:endParaRPr b="0" lang="en-US" sz="3200" spc="-1" strike="noStrike">
+              <a:latin typeface="Arial"/>
+            </a:endParaRPr>
+          </a:p>
+        </p:txBody>
+      </p:sp>
+      <p:sp>
+        <p:nvSpPr>
+          <p:cNvPr id="81" name="PlaceHolder 5"/>
           <p:cNvSpPr>
             <a:spLocks noGrp="1"/>
           </p:cNvSpPr>
@@ -2056,18 +1929,15 @@
             <a:normAutofit/>
           </a:bodyPr>
           <a:p>
-            <a:endParaRPr b="0" lang="en-US" sz="1400" spc="-1" strike="noStrike">
-              <a:solidFill>
-                <a:srgbClr val="000000"/>
-              </a:solidFill>
-              <a:latin typeface="Arial"/>
-            </a:endParaRPr>
-          </a:p>
-        </p:txBody>
-      </p:sp>
-      <p:sp>
-        <p:nvSpPr>
-          <p:cNvPr id="84" name="PlaceHolder 6"/>
+            <a:endParaRPr b="0" lang="en-US" sz="3200" spc="-1" strike="noStrike">
+              <a:latin typeface="Arial"/>
+            </a:endParaRPr>
+          </a:p>
+        </p:txBody>
+      </p:sp>
+      <p:sp>
+        <p:nvSpPr>
+          <p:cNvPr id="82" name="PlaceHolder 6"/>
           <p:cNvSpPr>
             <a:spLocks noGrp="1"/>
           </p:cNvSpPr>
@@ -2089,18 +1959,15 @@
             <a:normAutofit/>
           </a:bodyPr>
           <a:p>
-            <a:endParaRPr b="0" lang="en-US" sz="1400" spc="-1" strike="noStrike">
-              <a:solidFill>
-                <a:srgbClr val="000000"/>
-              </a:solidFill>
-              <a:latin typeface="Arial"/>
-            </a:endParaRPr>
-          </a:p>
-        </p:txBody>
-      </p:sp>
-      <p:sp>
-        <p:nvSpPr>
-          <p:cNvPr id="85" name="PlaceHolder 7"/>
+            <a:endParaRPr b="0" lang="en-US" sz="3200" spc="-1" strike="noStrike">
+              <a:latin typeface="Arial"/>
+            </a:endParaRPr>
+          </a:p>
+        </p:txBody>
+      </p:sp>
+      <p:sp>
+        <p:nvSpPr>
+          <p:cNvPr id="83" name="PlaceHolder 7"/>
           <p:cNvSpPr>
             <a:spLocks noGrp="1"/>
           </p:cNvSpPr>
@@ -2122,10 +1989,7 @@
             <a:normAutofit/>
           </a:bodyPr>
           <a:p>
-            <a:endParaRPr b="0" lang="en-US" sz="1400" spc="-1" strike="noStrike">
-              <a:solidFill>
-                <a:srgbClr val="000000"/>
-              </a:solidFill>
+            <a:endParaRPr b="0" lang="en-US" sz="3200" spc="-1" strike="noStrike">
               <a:latin typeface="Arial"/>
             </a:endParaRPr>
           </a:p>
@@ -2155,7 +2019,7 @@
       </p:grpSpPr>
       <p:sp>
         <p:nvSpPr>
-          <p:cNvPr id="9" name="PlaceHolder 1"/>
+          <p:cNvPr id="8" name="PlaceHolder 1"/>
           <p:cNvSpPr>
             <a:spLocks noGrp="1"/>
           </p:cNvSpPr>
@@ -2165,8 +2029,8 @@
         </p:nvSpPr>
         <p:spPr>
           <a:xfrm>
-            <a:off x="729360" y="1318680"/>
-            <a:ext cx="7688520" cy="534960"/>
+            <a:off x="729360" y="1156680"/>
+            <a:ext cx="7688160" cy="858960"/>
           </a:xfrm>
           <a:prstGeom prst="rect">
             <a:avLst/>
@@ -2177,18 +2041,16 @@
             <a:spAutoFit/>
           </a:bodyPr>
           <a:p>
-            <a:endParaRPr b="0" lang="en-US" sz="1400" spc="-1" strike="noStrike">
-              <a:solidFill>
-                <a:srgbClr val="000000"/>
-              </a:solidFill>
-              <a:latin typeface="Arial"/>
-            </a:endParaRPr>
-          </a:p>
-        </p:txBody>
-      </p:sp>
-      <p:sp>
-        <p:nvSpPr>
-          <p:cNvPr id="10" name="PlaceHolder 2"/>
+            <a:pPr algn="ctr"/>
+            <a:endParaRPr b="0" lang="en-US" sz="4400" spc="-1" strike="noStrike">
+              <a:latin typeface="Arial"/>
+            </a:endParaRPr>
+          </a:p>
+        </p:txBody>
+      </p:sp>
+      <p:sp>
+        <p:nvSpPr>
+          <p:cNvPr id="9" name="PlaceHolder 2"/>
           <p:cNvSpPr>
             <a:spLocks noGrp="1"/>
           </p:cNvSpPr>
@@ -2199,7 +2061,7 @@
         <p:spPr>
           <a:xfrm>
             <a:off x="729360" y="2079000"/>
-            <a:ext cx="7688520" cy="2260800"/>
+            <a:ext cx="7688160" cy="2260440"/>
           </a:xfrm>
           <a:prstGeom prst="rect">
             <a:avLst/>
@@ -2210,10 +2072,7 @@
             <a:normAutofit/>
           </a:bodyPr>
           <a:p>
-            <a:endParaRPr b="0" lang="en-US" sz="1400" spc="-1" strike="noStrike">
-              <a:solidFill>
-                <a:srgbClr val="000000"/>
-              </a:solidFill>
+            <a:endParaRPr b="0" lang="en-US" sz="3200" spc="-1" strike="noStrike">
               <a:latin typeface="Arial"/>
             </a:endParaRPr>
           </a:p>
@@ -2243,7 +2102,7 @@
       </p:grpSpPr>
       <p:sp>
         <p:nvSpPr>
-          <p:cNvPr id="11" name="PlaceHolder 1"/>
+          <p:cNvPr id="10" name="PlaceHolder 1"/>
           <p:cNvSpPr>
             <a:spLocks noGrp="1"/>
           </p:cNvSpPr>
@@ -2253,8 +2112,8 @@
         </p:nvSpPr>
         <p:spPr>
           <a:xfrm>
-            <a:off x="729360" y="1318680"/>
-            <a:ext cx="7688520" cy="534960"/>
+            <a:off x="729360" y="1156680"/>
+            <a:ext cx="7688160" cy="858960"/>
           </a:xfrm>
           <a:prstGeom prst="rect">
             <a:avLst/>
@@ -2265,18 +2124,16 @@
             <a:spAutoFit/>
           </a:bodyPr>
           <a:p>
-            <a:endParaRPr b="0" lang="en-US" sz="1400" spc="-1" strike="noStrike">
-              <a:solidFill>
-                <a:srgbClr val="000000"/>
-              </a:solidFill>
-              <a:latin typeface="Arial"/>
-            </a:endParaRPr>
-          </a:p>
-        </p:txBody>
-      </p:sp>
-      <p:sp>
-        <p:nvSpPr>
-          <p:cNvPr id="12" name="PlaceHolder 2"/>
+            <a:pPr algn="ctr"/>
+            <a:endParaRPr b="0" lang="en-US" sz="4400" spc="-1" strike="noStrike">
+              <a:latin typeface="Arial"/>
+            </a:endParaRPr>
+          </a:p>
+        </p:txBody>
+      </p:sp>
+      <p:sp>
+        <p:nvSpPr>
+          <p:cNvPr id="11" name="PlaceHolder 2"/>
           <p:cNvSpPr>
             <a:spLocks noGrp="1"/>
           </p:cNvSpPr>
@@ -2287,7 +2144,7 @@
         <p:spPr>
           <a:xfrm>
             <a:off x="729360" y="2079000"/>
-            <a:ext cx="3751920" cy="2260800"/>
+            <a:ext cx="3751560" cy="2260440"/>
           </a:xfrm>
           <a:prstGeom prst="rect">
             <a:avLst/>
@@ -2298,18 +2155,15 @@
             <a:normAutofit/>
           </a:bodyPr>
           <a:p>
-            <a:endParaRPr b="0" lang="en-US" sz="1400" spc="-1" strike="noStrike">
-              <a:solidFill>
-                <a:srgbClr val="000000"/>
-              </a:solidFill>
-              <a:latin typeface="Arial"/>
-            </a:endParaRPr>
-          </a:p>
-        </p:txBody>
-      </p:sp>
-      <p:sp>
-        <p:nvSpPr>
-          <p:cNvPr id="13" name="PlaceHolder 3"/>
+            <a:endParaRPr b="0" lang="en-US" sz="3200" spc="-1" strike="noStrike">
+              <a:latin typeface="Arial"/>
+            </a:endParaRPr>
+          </a:p>
+        </p:txBody>
+      </p:sp>
+      <p:sp>
+        <p:nvSpPr>
+          <p:cNvPr id="12" name="PlaceHolder 3"/>
           <p:cNvSpPr>
             <a:spLocks noGrp="1"/>
           </p:cNvSpPr>
@@ -2319,8 +2173,8 @@
         </p:nvSpPr>
         <p:spPr>
           <a:xfrm>
-            <a:off x="4669200" y="2079000"/>
-            <a:ext cx="3751920" cy="2260800"/>
+            <a:off x="4668840" y="2079000"/>
+            <a:ext cx="3751560" cy="2260440"/>
           </a:xfrm>
           <a:prstGeom prst="rect">
             <a:avLst/>
@@ -2331,10 +2185,7 @@
             <a:normAutofit/>
           </a:bodyPr>
           <a:p>
-            <a:endParaRPr b="0" lang="en-US" sz="1400" spc="-1" strike="noStrike">
-              <a:solidFill>
-                <a:srgbClr val="000000"/>
-              </a:solidFill>
+            <a:endParaRPr b="0" lang="en-US" sz="3200" spc="-1" strike="noStrike">
               <a:latin typeface="Arial"/>
             </a:endParaRPr>
           </a:p>
@@ -2364,7 +2215,7 @@
       </p:grpSpPr>
       <p:sp>
         <p:nvSpPr>
-          <p:cNvPr id="14" name="PlaceHolder 1"/>
+          <p:cNvPr id="13" name="PlaceHolder 1"/>
           <p:cNvSpPr>
             <a:spLocks noGrp="1"/>
           </p:cNvSpPr>
@@ -2374,8 +2225,8 @@
         </p:nvSpPr>
         <p:spPr>
           <a:xfrm>
-            <a:off x="729360" y="1318680"/>
-            <a:ext cx="7688520" cy="534960"/>
+            <a:off x="729360" y="1156680"/>
+            <a:ext cx="7688160" cy="858960"/>
           </a:xfrm>
           <a:prstGeom prst="rect">
             <a:avLst/>
@@ -2386,10 +2237,8 @@
             <a:spAutoFit/>
           </a:bodyPr>
           <a:p>
-            <a:endParaRPr b="0" lang="en-US" sz="1400" spc="-1" strike="noStrike">
-              <a:solidFill>
-                <a:srgbClr val="000000"/>
-              </a:solidFill>
+            <a:pPr algn="ctr"/>
+            <a:endParaRPr b="0" lang="en-US" sz="4400" spc="-1" strike="noStrike">
               <a:latin typeface="Arial"/>
             </a:endParaRPr>
           </a:p>
@@ -2419,7 +2268,7 @@
       </p:grpSpPr>
       <p:sp>
         <p:nvSpPr>
-          <p:cNvPr id="15" name="PlaceHolder 1"/>
+          <p:cNvPr id="14" name="PlaceHolder 1"/>
           <p:cNvSpPr>
             <a:spLocks noGrp="1"/>
           </p:cNvSpPr>
@@ -2429,8 +2278,8 @@
         </p:nvSpPr>
         <p:spPr>
           <a:xfrm>
-            <a:off x="729360" y="1318680"/>
-            <a:ext cx="7688520" cy="2481120"/>
+            <a:off x="729360" y="1156680"/>
+            <a:ext cx="7688160" cy="3983040"/>
           </a:xfrm>
           <a:prstGeom prst="rect">
             <a:avLst/>
@@ -2472,7 +2321,7 @@
       </p:grpSpPr>
       <p:sp>
         <p:nvSpPr>
-          <p:cNvPr id="16" name="PlaceHolder 1"/>
+          <p:cNvPr id="15" name="PlaceHolder 1"/>
           <p:cNvSpPr>
             <a:spLocks noGrp="1"/>
           </p:cNvSpPr>
@@ -2482,8 +2331,8 @@
         </p:nvSpPr>
         <p:spPr>
           <a:xfrm>
-            <a:off x="729360" y="1318680"/>
-            <a:ext cx="7688520" cy="534960"/>
+            <a:off x="729360" y="1156680"/>
+            <a:ext cx="7688160" cy="858960"/>
           </a:xfrm>
           <a:prstGeom prst="rect">
             <a:avLst/>
@@ -2494,18 +2343,16 @@
             <a:spAutoFit/>
           </a:bodyPr>
           <a:p>
-            <a:endParaRPr b="0" lang="en-US" sz="1400" spc="-1" strike="noStrike">
-              <a:solidFill>
-                <a:srgbClr val="000000"/>
-              </a:solidFill>
-              <a:latin typeface="Arial"/>
-            </a:endParaRPr>
-          </a:p>
-        </p:txBody>
-      </p:sp>
-      <p:sp>
-        <p:nvSpPr>
-          <p:cNvPr id="17" name="PlaceHolder 2"/>
+            <a:pPr algn="ctr"/>
+            <a:endParaRPr b="0" lang="en-US" sz="4400" spc="-1" strike="noStrike">
+              <a:latin typeface="Arial"/>
+            </a:endParaRPr>
+          </a:p>
+        </p:txBody>
+      </p:sp>
+      <p:sp>
+        <p:nvSpPr>
+          <p:cNvPr id="16" name="PlaceHolder 2"/>
           <p:cNvSpPr>
             <a:spLocks noGrp="1"/>
           </p:cNvSpPr>
@@ -2516,7 +2363,7 @@
         <p:spPr>
           <a:xfrm>
             <a:off x="729360" y="2079000"/>
-            <a:ext cx="3751920" cy="1078200"/>
+            <a:ext cx="3751560" cy="1078200"/>
           </a:xfrm>
           <a:prstGeom prst="rect">
             <a:avLst/>
@@ -2527,18 +2374,15 @@
             <a:normAutofit/>
           </a:bodyPr>
           <a:p>
-            <a:endParaRPr b="0" lang="en-US" sz="1400" spc="-1" strike="noStrike">
-              <a:solidFill>
-                <a:srgbClr val="000000"/>
-              </a:solidFill>
-              <a:latin typeface="Arial"/>
-            </a:endParaRPr>
-          </a:p>
-        </p:txBody>
-      </p:sp>
-      <p:sp>
-        <p:nvSpPr>
-          <p:cNvPr id="18" name="PlaceHolder 3"/>
+            <a:endParaRPr b="0" lang="en-US" sz="3200" spc="-1" strike="noStrike">
+              <a:latin typeface="Arial"/>
+            </a:endParaRPr>
+          </a:p>
+        </p:txBody>
+      </p:sp>
+      <p:sp>
+        <p:nvSpPr>
+          <p:cNvPr id="17" name="PlaceHolder 3"/>
           <p:cNvSpPr>
             <a:spLocks noGrp="1"/>
           </p:cNvSpPr>
@@ -2548,8 +2392,8 @@
         </p:nvSpPr>
         <p:spPr>
           <a:xfrm>
-            <a:off x="4669200" y="2079000"/>
-            <a:ext cx="3751920" cy="2260800"/>
+            <a:off x="4668840" y="2079000"/>
+            <a:ext cx="3751560" cy="2260440"/>
           </a:xfrm>
           <a:prstGeom prst="rect">
             <a:avLst/>
@@ -2560,18 +2404,15 @@
             <a:normAutofit/>
           </a:bodyPr>
           <a:p>
-            <a:endParaRPr b="0" lang="en-US" sz="1400" spc="-1" strike="noStrike">
-              <a:solidFill>
-                <a:srgbClr val="000000"/>
-              </a:solidFill>
-              <a:latin typeface="Arial"/>
-            </a:endParaRPr>
-          </a:p>
-        </p:txBody>
-      </p:sp>
-      <p:sp>
-        <p:nvSpPr>
-          <p:cNvPr id="19" name="PlaceHolder 4"/>
+            <a:endParaRPr b="0" lang="en-US" sz="3200" spc="-1" strike="noStrike">
+              <a:latin typeface="Arial"/>
+            </a:endParaRPr>
+          </a:p>
+        </p:txBody>
+      </p:sp>
+      <p:sp>
+        <p:nvSpPr>
+          <p:cNvPr id="18" name="PlaceHolder 4"/>
           <p:cNvSpPr>
             <a:spLocks noGrp="1"/>
           </p:cNvSpPr>
@@ -2582,7 +2423,7 @@
         <p:spPr>
           <a:xfrm>
             <a:off x="729360" y="3260160"/>
-            <a:ext cx="3751920" cy="1078200"/>
+            <a:ext cx="3751560" cy="1078200"/>
           </a:xfrm>
           <a:prstGeom prst="rect">
             <a:avLst/>
@@ -2593,10 +2434,7 @@
             <a:normAutofit/>
           </a:bodyPr>
           <a:p>
-            <a:endParaRPr b="0" lang="en-US" sz="1400" spc="-1" strike="noStrike">
-              <a:solidFill>
-                <a:srgbClr val="000000"/>
-              </a:solidFill>
+            <a:endParaRPr b="0" lang="en-US" sz="3200" spc="-1" strike="noStrike">
               <a:latin typeface="Arial"/>
             </a:endParaRPr>
           </a:p>
@@ -2626,7 +2464,7 @@
       </p:grpSpPr>
       <p:sp>
         <p:nvSpPr>
-          <p:cNvPr id="20" name="PlaceHolder 1"/>
+          <p:cNvPr id="19" name="PlaceHolder 1"/>
           <p:cNvSpPr>
             <a:spLocks noGrp="1"/>
           </p:cNvSpPr>
@@ -2636,8 +2474,8 @@
         </p:nvSpPr>
         <p:spPr>
           <a:xfrm>
-            <a:off x="729360" y="1318680"/>
-            <a:ext cx="7688520" cy="534960"/>
+            <a:off x="729360" y="1156680"/>
+            <a:ext cx="7688160" cy="858960"/>
           </a:xfrm>
           <a:prstGeom prst="rect">
             <a:avLst/>
@@ -2648,18 +2486,16 @@
             <a:spAutoFit/>
           </a:bodyPr>
           <a:p>
-            <a:endParaRPr b="0" lang="en-US" sz="1400" spc="-1" strike="noStrike">
-              <a:solidFill>
-                <a:srgbClr val="000000"/>
-              </a:solidFill>
-              <a:latin typeface="Arial"/>
-            </a:endParaRPr>
-          </a:p>
-        </p:txBody>
-      </p:sp>
-      <p:sp>
-        <p:nvSpPr>
-          <p:cNvPr id="21" name="PlaceHolder 2"/>
+            <a:pPr algn="ctr"/>
+            <a:endParaRPr b="0" lang="en-US" sz="4400" spc="-1" strike="noStrike">
+              <a:latin typeface="Arial"/>
+            </a:endParaRPr>
+          </a:p>
+        </p:txBody>
+      </p:sp>
+      <p:sp>
+        <p:nvSpPr>
+          <p:cNvPr id="20" name="PlaceHolder 2"/>
           <p:cNvSpPr>
             <a:spLocks noGrp="1"/>
           </p:cNvSpPr>
@@ -2670,7 +2506,7 @@
         <p:spPr>
           <a:xfrm>
             <a:off x="729360" y="2079000"/>
-            <a:ext cx="3751920" cy="2260800"/>
+            <a:ext cx="3751560" cy="2260440"/>
           </a:xfrm>
           <a:prstGeom prst="rect">
             <a:avLst/>
@@ -2681,18 +2517,15 @@
             <a:normAutofit/>
           </a:bodyPr>
           <a:p>
-            <a:endParaRPr b="0" lang="en-US" sz="1400" spc="-1" strike="noStrike">
-              <a:solidFill>
-                <a:srgbClr val="000000"/>
-              </a:solidFill>
-              <a:latin typeface="Arial"/>
-            </a:endParaRPr>
-          </a:p>
-        </p:txBody>
-      </p:sp>
-      <p:sp>
-        <p:nvSpPr>
-          <p:cNvPr id="22" name="PlaceHolder 3"/>
+            <a:endParaRPr b="0" lang="en-US" sz="3200" spc="-1" strike="noStrike">
+              <a:latin typeface="Arial"/>
+            </a:endParaRPr>
+          </a:p>
+        </p:txBody>
+      </p:sp>
+      <p:sp>
+        <p:nvSpPr>
+          <p:cNvPr id="21" name="PlaceHolder 3"/>
           <p:cNvSpPr>
             <a:spLocks noGrp="1"/>
           </p:cNvSpPr>
@@ -2702,8 +2535,8 @@
         </p:nvSpPr>
         <p:spPr>
           <a:xfrm>
-            <a:off x="4669200" y="2079000"/>
-            <a:ext cx="3751920" cy="1078200"/>
+            <a:off x="4668840" y="2079000"/>
+            <a:ext cx="3751560" cy="1078200"/>
           </a:xfrm>
           <a:prstGeom prst="rect">
             <a:avLst/>
@@ -2714,18 +2547,15 @@
             <a:normAutofit/>
           </a:bodyPr>
           <a:p>
-            <a:endParaRPr b="0" lang="en-US" sz="1400" spc="-1" strike="noStrike">
-              <a:solidFill>
-                <a:srgbClr val="000000"/>
-              </a:solidFill>
-              <a:latin typeface="Arial"/>
-            </a:endParaRPr>
-          </a:p>
-        </p:txBody>
-      </p:sp>
-      <p:sp>
-        <p:nvSpPr>
-          <p:cNvPr id="23" name="PlaceHolder 4"/>
+            <a:endParaRPr b="0" lang="en-US" sz="3200" spc="-1" strike="noStrike">
+              <a:latin typeface="Arial"/>
+            </a:endParaRPr>
+          </a:p>
+        </p:txBody>
+      </p:sp>
+      <p:sp>
+        <p:nvSpPr>
+          <p:cNvPr id="22" name="PlaceHolder 4"/>
           <p:cNvSpPr>
             <a:spLocks noGrp="1"/>
           </p:cNvSpPr>
@@ -2735,8 +2565,8 @@
         </p:nvSpPr>
         <p:spPr>
           <a:xfrm>
-            <a:off x="4669200" y="3260160"/>
-            <a:ext cx="3751920" cy="1078200"/>
+            <a:off x="4668840" y="3260160"/>
+            <a:ext cx="3751560" cy="1078200"/>
           </a:xfrm>
           <a:prstGeom prst="rect">
             <a:avLst/>
@@ -2747,10 +2577,7 @@
             <a:normAutofit/>
           </a:bodyPr>
           <a:p>
-            <a:endParaRPr b="0" lang="en-US" sz="1400" spc="-1" strike="noStrike">
-              <a:solidFill>
-                <a:srgbClr val="000000"/>
-              </a:solidFill>
+            <a:endParaRPr b="0" lang="en-US" sz="3200" spc="-1" strike="noStrike">
               <a:latin typeface="Arial"/>
             </a:endParaRPr>
           </a:p>
@@ -2780,7 +2607,7 @@
       </p:grpSpPr>
       <p:sp>
         <p:nvSpPr>
-          <p:cNvPr id="24" name="PlaceHolder 1"/>
+          <p:cNvPr id="23" name="PlaceHolder 1"/>
           <p:cNvSpPr>
             <a:spLocks noGrp="1"/>
           </p:cNvSpPr>
@@ -2790,8 +2617,8 @@
         </p:nvSpPr>
         <p:spPr>
           <a:xfrm>
-            <a:off x="729360" y="1318680"/>
-            <a:ext cx="7688520" cy="534960"/>
+            <a:off x="729360" y="1156680"/>
+            <a:ext cx="7688160" cy="858960"/>
           </a:xfrm>
           <a:prstGeom prst="rect">
             <a:avLst/>
@@ -2802,18 +2629,16 @@
             <a:spAutoFit/>
           </a:bodyPr>
           <a:p>
-            <a:endParaRPr b="0" lang="en-US" sz="1400" spc="-1" strike="noStrike">
-              <a:solidFill>
-                <a:srgbClr val="000000"/>
-              </a:solidFill>
-              <a:latin typeface="Arial"/>
-            </a:endParaRPr>
-          </a:p>
-        </p:txBody>
-      </p:sp>
-      <p:sp>
-        <p:nvSpPr>
-          <p:cNvPr id="25" name="PlaceHolder 2"/>
+            <a:pPr algn="ctr"/>
+            <a:endParaRPr b="0" lang="en-US" sz="4400" spc="-1" strike="noStrike">
+              <a:latin typeface="Arial"/>
+            </a:endParaRPr>
+          </a:p>
+        </p:txBody>
+      </p:sp>
+      <p:sp>
+        <p:nvSpPr>
+          <p:cNvPr id="24" name="PlaceHolder 2"/>
           <p:cNvSpPr>
             <a:spLocks noGrp="1"/>
           </p:cNvSpPr>
@@ -2824,7 +2649,7 @@
         <p:spPr>
           <a:xfrm>
             <a:off x="729360" y="2079000"/>
-            <a:ext cx="3751920" cy="1078200"/>
+            <a:ext cx="3751560" cy="1078200"/>
           </a:xfrm>
           <a:prstGeom prst="rect">
             <a:avLst/>
@@ -2835,18 +2660,15 @@
             <a:normAutofit/>
           </a:bodyPr>
           <a:p>
-            <a:endParaRPr b="0" lang="en-US" sz="1400" spc="-1" strike="noStrike">
-              <a:solidFill>
-                <a:srgbClr val="000000"/>
-              </a:solidFill>
-              <a:latin typeface="Arial"/>
-            </a:endParaRPr>
-          </a:p>
-        </p:txBody>
-      </p:sp>
-      <p:sp>
-        <p:nvSpPr>
-          <p:cNvPr id="26" name="PlaceHolder 3"/>
+            <a:endParaRPr b="0" lang="en-US" sz="3200" spc="-1" strike="noStrike">
+              <a:latin typeface="Arial"/>
+            </a:endParaRPr>
+          </a:p>
+        </p:txBody>
+      </p:sp>
+      <p:sp>
+        <p:nvSpPr>
+          <p:cNvPr id="25" name="PlaceHolder 3"/>
           <p:cNvSpPr>
             <a:spLocks noGrp="1"/>
           </p:cNvSpPr>
@@ -2856,8 +2678,8 @@
         </p:nvSpPr>
         <p:spPr>
           <a:xfrm>
-            <a:off x="4669200" y="2079000"/>
-            <a:ext cx="3751920" cy="1078200"/>
+            <a:off x="4668840" y="2079000"/>
+            <a:ext cx="3751560" cy="1078200"/>
           </a:xfrm>
           <a:prstGeom prst="rect">
             <a:avLst/>
@@ -2868,18 +2690,15 @@
             <a:normAutofit/>
           </a:bodyPr>
           <a:p>
-            <a:endParaRPr b="0" lang="en-US" sz="1400" spc="-1" strike="noStrike">
-              <a:solidFill>
-                <a:srgbClr val="000000"/>
-              </a:solidFill>
-              <a:latin typeface="Arial"/>
-            </a:endParaRPr>
-          </a:p>
-        </p:txBody>
-      </p:sp>
-      <p:sp>
-        <p:nvSpPr>
-          <p:cNvPr id="27" name="PlaceHolder 4"/>
+            <a:endParaRPr b="0" lang="en-US" sz="3200" spc="-1" strike="noStrike">
+              <a:latin typeface="Arial"/>
+            </a:endParaRPr>
+          </a:p>
+        </p:txBody>
+      </p:sp>
+      <p:sp>
+        <p:nvSpPr>
+          <p:cNvPr id="26" name="PlaceHolder 4"/>
           <p:cNvSpPr>
             <a:spLocks noGrp="1"/>
           </p:cNvSpPr>
@@ -2890,7 +2709,7 @@
         <p:spPr>
           <a:xfrm>
             <a:off x="729360" y="3260160"/>
-            <a:ext cx="7688520" cy="1078200"/>
+            <a:ext cx="7688160" cy="1078200"/>
           </a:xfrm>
           <a:prstGeom prst="rect">
             <a:avLst/>
@@ -2901,10 +2720,7 @@
             <a:normAutofit/>
           </a:bodyPr>
           <a:p>
-            <a:endParaRPr b="0" lang="en-US" sz="1400" spc="-1" strike="noStrike">
-              <a:solidFill>
-                <a:srgbClr val="000000"/>
-              </a:solidFill>
+            <a:endParaRPr b="0" lang="en-US" sz="3200" spc="-1" strike="noStrike">
               <a:latin typeface="Arial"/>
             </a:endParaRPr>
           </a:p>
@@ -2948,7 +2764,7 @@
         <p:spPr>
           <a:xfrm>
             <a:off x="0" y="0"/>
-            <a:ext cx="9143640" cy="487440"/>
+            <a:ext cx="9143280" cy="487080"/>
           </a:xfrm>
           <a:prstGeom prst="rect">
             <a:avLst/>
@@ -2976,9 +2792,9 @@
         <p:grpSpPr>
           <a:xfrm>
             <a:off x="830520" y="1191600"/>
-            <a:ext cx="745200" cy="45360"/>
+            <a:ext cx="744840" cy="45000"/>
             <a:chOff x="830520" y="1191600"/>
-            <a:chExt cx="745200" cy="45360"/>
+            <a:chExt cx="744840" cy="45000"/>
           </a:xfrm>
         </p:grpSpPr>
         <p:sp>
@@ -2990,7 +2806,7 @@
           <p:spPr>
             <a:xfrm rot="16200000">
               <a:off x="1366560" y="1027800"/>
-              <a:ext cx="45360" cy="372600"/>
+              <a:ext cx="45000" cy="372240"/>
             </a:xfrm>
             <a:prstGeom prst="rect">
               <a:avLst/>
@@ -3018,7 +2834,7 @@
           <p:spPr>
             <a:xfrm rot="16200000">
               <a:off x="995400" y="1026360"/>
-              <a:ext cx="45360" cy="375480"/>
+              <a:ext cx="45000" cy="375120"/>
             </a:xfrm>
             <a:prstGeom prst="rect">
               <a:avLst/>
@@ -3050,31 +2866,25 @@
         </p:nvSpPr>
         <p:spPr>
           <a:xfrm>
-            <a:off x="729360" y="1322280"/>
-            <a:ext cx="7687800" cy="1664280"/>
-          </a:xfrm>
-          <a:prstGeom prst="rect">
-            <a:avLst/>
-          </a:prstGeom>
-        </p:spPr>
-        <p:txBody>
-          <a:bodyPr tIns="91440" bIns="91440">
-            <a:noAutofit/>
+            <a:off x="729360" y="1156680"/>
+            <a:ext cx="7688160" cy="858960"/>
+          </a:xfrm>
+          <a:prstGeom prst="rect">
+            <a:avLst/>
+          </a:prstGeom>
+        </p:spPr>
+        <p:txBody>
+          <a:bodyPr lIns="0" rIns="0" tIns="0" bIns="0" anchor="ctr">
+            <a:spAutoFit/>
           </a:bodyPr>
           <a:p>
             <a:r>
-              <a:rPr b="0" lang="en-US" sz="4200" spc="-1" strike="noStrike">
-                <a:solidFill>
-                  <a:srgbClr val="000000"/>
-                </a:solidFill>
+              <a:rPr b="0" lang="en-US" sz="1800" spc="-1" strike="noStrike">
                 <a:latin typeface="Arial"/>
               </a:rPr>
               <a:t>Click to edit the title text format</a:t>
             </a:r>
-            <a:endParaRPr b="0" lang="en-US" sz="4200" spc="-1" strike="noStrike">
-              <a:solidFill>
-                <a:srgbClr val="000000"/>
-              </a:solidFill>
+            <a:endParaRPr b="0" lang="en-US" sz="1800" spc="-1" strike="noStrike">
               <a:latin typeface="Arial"/>
             </a:endParaRPr>
           </a:p>
@@ -3083,51 +2893,6 @@
       <p:sp>
         <p:nvSpPr>
           <p:cNvPr id="5" name="PlaceHolder 6"/>
-          <p:cNvSpPr>
-            <a:spLocks noGrp="1"/>
-          </p:cNvSpPr>
-          <p:nvPr>
-            <p:ph type="sldNum"/>
-          </p:nvPr>
-        </p:nvSpPr>
-        <p:spPr>
-          <a:xfrm>
-            <a:off x="8536320" y="4749840"/>
-            <a:ext cx="548280" cy="393120"/>
-          </a:xfrm>
-          <a:prstGeom prst="rect">
-            <a:avLst/>
-          </a:prstGeom>
-        </p:spPr>
-        <p:txBody>
-          <a:bodyPr tIns="91440" bIns="91440" anchor="ctr">
-            <a:noAutofit/>
-          </a:bodyPr>
-          <a:p>
-            <a:pPr algn="r">
-              <a:lnSpc>
-                <a:spcPct val="100000"/>
-              </a:lnSpc>
-            </a:pPr>
-            <a:fld id="{3675DC8D-542D-4D39-A555-5A5462CEF76D}" type="slidenum">
-              <a:rPr b="0" lang="en-US" sz="1000" spc="-1" strike="noStrike">
-                <a:solidFill>
-                  <a:srgbClr val="595959"/>
-                </a:solidFill>
-                <a:latin typeface="Lato"/>
-                <a:ea typeface="Lato"/>
-              </a:rPr>
-              <a:t>&lt;number&gt;</a:t>
-            </a:fld>
-            <a:endParaRPr b="0" lang="en-US" sz="1000" spc="-1" strike="noStrike">
-              <a:latin typeface="Times New Roman"/>
-            </a:endParaRPr>
-          </a:p>
-        </p:txBody>
-      </p:sp>
-      <p:sp>
-        <p:nvSpPr>
-          <p:cNvPr id="6" name="PlaceHolder 7"/>
           <p:cNvSpPr>
             <a:spLocks noGrp="1"/>
           </p:cNvSpPr>
@@ -3161,18 +2926,12 @@
               <a:buChar char=""/>
             </a:pPr>
             <a:r>
-              <a:rPr b="0" lang="en-US" sz="1400" spc="-1" strike="noStrike">
-                <a:solidFill>
-                  <a:srgbClr val="000000"/>
-                </a:solidFill>
+              <a:rPr b="0" lang="en-US" sz="3200" spc="-1" strike="noStrike">
                 <a:latin typeface="Arial"/>
               </a:rPr>
               <a:t>Click to edit the outline text format</a:t>
             </a:r>
-            <a:endParaRPr b="0" lang="en-US" sz="1400" spc="-1" strike="noStrike">
-              <a:solidFill>
-                <a:srgbClr val="000000"/>
-              </a:solidFill>
+            <a:endParaRPr b="0" lang="en-US" sz="3200" spc="-1" strike="noStrike">
               <a:latin typeface="Arial"/>
             </a:endParaRPr>
           </a:p>
@@ -3189,18 +2948,12 @@
               <a:buChar char=""/>
             </a:pPr>
             <a:r>
-              <a:rPr b="0" lang="en-US" sz="1400" spc="-1" strike="noStrike">
-                <a:solidFill>
-                  <a:srgbClr val="000000"/>
-                </a:solidFill>
+              <a:rPr b="0" lang="en-US" sz="2800" spc="-1" strike="noStrike">
                 <a:latin typeface="Arial"/>
               </a:rPr>
               <a:t>Second Outline Level</a:t>
             </a:r>
-            <a:endParaRPr b="0" lang="en-US" sz="1400" spc="-1" strike="noStrike">
-              <a:solidFill>
-                <a:srgbClr val="000000"/>
-              </a:solidFill>
+            <a:endParaRPr b="0" lang="en-US" sz="2800" spc="-1" strike="noStrike">
               <a:latin typeface="Arial"/>
             </a:endParaRPr>
           </a:p>
@@ -3217,18 +2970,12 @@
               <a:buChar char=""/>
             </a:pPr>
             <a:r>
-              <a:rPr b="0" lang="en-US" sz="1400" spc="-1" strike="noStrike">
-                <a:solidFill>
-                  <a:srgbClr val="000000"/>
-                </a:solidFill>
+              <a:rPr b="0" lang="en-US" sz="2400" spc="-1" strike="noStrike">
                 <a:latin typeface="Arial"/>
               </a:rPr>
               <a:t>Third Outline Level</a:t>
             </a:r>
-            <a:endParaRPr b="0" lang="en-US" sz="1400" spc="-1" strike="noStrike">
-              <a:solidFill>
-                <a:srgbClr val="000000"/>
-              </a:solidFill>
+            <a:endParaRPr b="0" lang="en-US" sz="2400" spc="-1" strike="noStrike">
               <a:latin typeface="Arial"/>
             </a:endParaRPr>
           </a:p>
@@ -3245,18 +2992,12 @@
               <a:buChar char=""/>
             </a:pPr>
             <a:r>
-              <a:rPr b="0" lang="en-US" sz="1400" spc="-1" strike="noStrike">
-                <a:solidFill>
-                  <a:srgbClr val="000000"/>
-                </a:solidFill>
+              <a:rPr b="0" lang="en-US" sz="2000" spc="-1" strike="noStrike">
                 <a:latin typeface="Arial"/>
               </a:rPr>
               <a:t>Fourth Outline Level</a:t>
             </a:r>
-            <a:endParaRPr b="0" lang="en-US" sz="1400" spc="-1" strike="noStrike">
-              <a:solidFill>
-                <a:srgbClr val="000000"/>
-              </a:solidFill>
+            <a:endParaRPr b="0" lang="en-US" sz="2000" spc="-1" strike="noStrike">
               <a:latin typeface="Arial"/>
             </a:endParaRPr>
           </a:p>
@@ -3274,17 +3015,11 @@
             </a:pPr>
             <a:r>
               <a:rPr b="0" lang="en-US" sz="2000" spc="-1" strike="noStrike">
-                <a:solidFill>
-                  <a:srgbClr val="000000"/>
-                </a:solidFill>
                 <a:latin typeface="Arial"/>
               </a:rPr>
               <a:t>Fifth Outline Level</a:t>
             </a:r>
             <a:endParaRPr b="0" lang="en-US" sz="2000" spc="-1" strike="noStrike">
-              <a:solidFill>
-                <a:srgbClr val="000000"/>
-              </a:solidFill>
               <a:latin typeface="Arial"/>
             </a:endParaRPr>
           </a:p>
@@ -3302,17 +3037,11 @@
             </a:pPr>
             <a:r>
               <a:rPr b="0" lang="en-US" sz="2000" spc="-1" strike="noStrike">
-                <a:solidFill>
-                  <a:srgbClr val="000000"/>
-                </a:solidFill>
                 <a:latin typeface="Arial"/>
               </a:rPr>
               <a:t>Sixth Outline Level</a:t>
             </a:r>
             <a:endParaRPr b="0" lang="en-US" sz="2000" spc="-1" strike="noStrike">
-              <a:solidFill>
-                <a:srgbClr val="000000"/>
-              </a:solidFill>
               <a:latin typeface="Arial"/>
             </a:endParaRPr>
           </a:p>
@@ -3330,17 +3059,11 @@
             </a:pPr>
             <a:r>
               <a:rPr b="0" lang="en-US" sz="2000" spc="-1" strike="noStrike">
-                <a:solidFill>
-                  <a:srgbClr val="000000"/>
-                </a:solidFill>
                 <a:latin typeface="Arial"/>
               </a:rPr>
               <a:t>Seventh Outline Level</a:t>
             </a:r>
             <a:endParaRPr b="0" lang="en-US" sz="2000" spc="-1" strike="noStrike">
-              <a:solidFill>
-                <a:srgbClr val="000000"/>
-              </a:solidFill>
               <a:latin typeface="Arial"/>
             </a:endParaRPr>
           </a:p>
@@ -3392,14 +3115,14 @@
       </p:grpSpPr>
       <p:sp>
         <p:nvSpPr>
-          <p:cNvPr id="43" name="CustomShape 1"/>
+          <p:cNvPr id="42" name="CustomShape 1"/>
           <p:cNvSpPr/>
           <p:nvPr/>
         </p:nvSpPr>
         <p:spPr>
           <a:xfrm>
             <a:off x="0" y="0"/>
-            <a:ext cx="9143640" cy="487440"/>
+            <a:ext cx="9143280" cy="487080"/>
           </a:xfrm>
           <a:prstGeom prst="rect">
             <a:avLst/>
@@ -3420,28 +3143,28 @@
       </p:sp>
       <p:grpSp>
         <p:nvGrpSpPr>
-          <p:cNvPr id="44" name="Group 2"/>
+          <p:cNvPr id="43" name="Group 2"/>
           <p:cNvGrpSpPr/>
           <p:nvPr/>
         </p:nvGrpSpPr>
         <p:grpSpPr>
           <a:xfrm>
             <a:off x="830520" y="1191600"/>
-            <a:ext cx="745200" cy="45360"/>
+            <a:ext cx="744840" cy="45000"/>
             <a:chOff x="830520" y="1191600"/>
-            <a:chExt cx="745200" cy="45360"/>
+            <a:chExt cx="744840" cy="45000"/>
           </a:xfrm>
         </p:grpSpPr>
         <p:sp>
           <p:nvSpPr>
-            <p:cNvPr id="45" name="CustomShape 3"/>
+            <p:cNvPr id="44" name="CustomShape 3"/>
             <p:cNvSpPr/>
             <p:nvPr/>
           </p:nvSpPr>
           <p:spPr>
             <a:xfrm rot="16200000">
               <a:off x="1366560" y="1027800"/>
-              <a:ext cx="45360" cy="372600"/>
+              <a:ext cx="45000" cy="372240"/>
             </a:xfrm>
             <a:prstGeom prst="rect">
               <a:avLst/>
@@ -3462,14 +3185,14 @@
         </p:sp>
         <p:sp>
           <p:nvSpPr>
-            <p:cNvPr id="46" name="CustomShape 4"/>
+            <p:cNvPr id="45" name="CustomShape 4"/>
             <p:cNvSpPr/>
             <p:nvPr/>
           </p:nvSpPr>
           <p:spPr>
             <a:xfrm rot="16200000">
               <a:off x="995400" y="1026360"/>
-              <a:ext cx="45360" cy="375480"/>
+              <a:ext cx="45000" cy="375120"/>
             </a:xfrm>
             <a:prstGeom prst="rect">
               <a:avLst/>
@@ -3491,7 +3214,7 @@
       </p:grpSp>
       <p:sp>
         <p:nvSpPr>
-          <p:cNvPr id="47" name="PlaceHolder 5"/>
+          <p:cNvPr id="46" name="PlaceHolder 5"/>
           <p:cNvSpPr>
             <a:spLocks noGrp="1"/>
           </p:cNvSpPr>
@@ -3501,39 +3224,33 @@
         </p:nvSpPr>
         <p:spPr>
           <a:xfrm>
-            <a:off x="729360" y="1318680"/>
-            <a:ext cx="7688520" cy="534960"/>
-          </a:xfrm>
-          <a:prstGeom prst="rect">
-            <a:avLst/>
-          </a:prstGeom>
-        </p:spPr>
-        <p:txBody>
-          <a:bodyPr tIns="91440" bIns="91440">
-            <a:noAutofit/>
+            <a:off x="729360" y="1156680"/>
+            <a:ext cx="7688160" cy="858960"/>
+          </a:xfrm>
+          <a:prstGeom prst="rect">
+            <a:avLst/>
+          </a:prstGeom>
+        </p:spPr>
+        <p:txBody>
+          <a:bodyPr lIns="0" rIns="0" tIns="0" bIns="0" anchor="ctr">
+            <a:spAutoFit/>
           </a:bodyPr>
           <a:p>
             <a:r>
-              <a:rPr b="0" lang="en-US" sz="2600" spc="-1" strike="noStrike">
-                <a:solidFill>
-                  <a:srgbClr val="000000"/>
-                </a:solidFill>
+              <a:rPr b="0" lang="en-US" sz="1800" spc="-1" strike="noStrike">
                 <a:latin typeface="Arial"/>
               </a:rPr>
               <a:t>Click to edit the title text format</a:t>
             </a:r>
-            <a:endParaRPr b="0" lang="en-US" sz="2600" spc="-1" strike="noStrike">
-              <a:solidFill>
-                <a:srgbClr val="000000"/>
-              </a:solidFill>
-              <a:latin typeface="Arial"/>
-            </a:endParaRPr>
-          </a:p>
-        </p:txBody>
-      </p:sp>
-      <p:sp>
-        <p:nvSpPr>
-          <p:cNvPr id="48" name="PlaceHolder 6"/>
+            <a:endParaRPr b="0" lang="en-US" sz="1800" spc="-1" strike="noStrike">
+              <a:latin typeface="Arial"/>
+            </a:endParaRPr>
+          </a:p>
+        </p:txBody>
+      </p:sp>
+      <p:sp>
+        <p:nvSpPr>
+          <p:cNvPr id="47" name="PlaceHolder 6"/>
           <p:cNvSpPr>
             <a:spLocks noGrp="1"/>
           </p:cNvSpPr>
@@ -3544,15 +3261,15 @@
         <p:spPr>
           <a:xfrm>
             <a:off x="729360" y="2079000"/>
-            <a:ext cx="7688520" cy="2260800"/>
-          </a:xfrm>
-          <a:prstGeom prst="rect">
-            <a:avLst/>
-          </a:prstGeom>
-        </p:spPr>
-        <p:txBody>
-          <a:bodyPr tIns="91440" bIns="91440">
-            <a:noAutofit/>
+            <a:ext cx="7688160" cy="2260440"/>
+          </a:xfrm>
+          <a:prstGeom prst="rect">
+            <a:avLst/>
+          </a:prstGeom>
+        </p:spPr>
+        <p:txBody>
+          <a:bodyPr lIns="0" rIns="0" tIns="0" bIns="0">
+            <a:normAutofit/>
           </a:bodyPr>
           <a:p>
             <a:pPr marL="432000" indent="-324000">
@@ -3567,18 +3284,12 @@
               <a:buChar char=""/>
             </a:pPr>
             <a:r>
-              <a:rPr b="0" lang="en-US" sz="1300" spc="-1" strike="noStrike">
-                <a:solidFill>
-                  <a:srgbClr val="000000"/>
-                </a:solidFill>
+              <a:rPr b="0" lang="en-US" sz="1800" spc="-1" strike="noStrike">
                 <a:latin typeface="Arial"/>
               </a:rPr>
               <a:t>Click to edit the outline text format</a:t>
             </a:r>
-            <a:endParaRPr b="0" lang="en-US" sz="1300" spc="-1" strike="noStrike">
-              <a:solidFill>
-                <a:srgbClr val="000000"/>
-              </a:solidFill>
+            <a:endParaRPr b="0" lang="en-US" sz="1800" spc="-1" strike="noStrike">
               <a:latin typeface="Arial"/>
             </a:endParaRPr>
           </a:p>
@@ -3595,18 +3306,12 @@
               <a:buChar char=""/>
             </a:pPr>
             <a:r>
-              <a:rPr b="0" lang="en-US" sz="1300" spc="-1" strike="noStrike">
-                <a:solidFill>
-                  <a:srgbClr val="000000"/>
-                </a:solidFill>
+              <a:rPr b="0" lang="en-US" sz="1800" spc="-1" strike="noStrike">
                 <a:latin typeface="Arial"/>
               </a:rPr>
               <a:t>Second Outline Level</a:t>
             </a:r>
-            <a:endParaRPr b="0" lang="en-US" sz="1300" spc="-1" strike="noStrike">
-              <a:solidFill>
-                <a:srgbClr val="000000"/>
-              </a:solidFill>
+            <a:endParaRPr b="0" lang="en-US" sz="1800" spc="-1" strike="noStrike">
               <a:latin typeface="Arial"/>
             </a:endParaRPr>
           </a:p>
@@ -3623,18 +3328,12 @@
               <a:buChar char=""/>
             </a:pPr>
             <a:r>
-              <a:rPr b="0" lang="en-US" sz="1300" spc="-1" strike="noStrike">
-                <a:solidFill>
-                  <a:srgbClr val="000000"/>
-                </a:solidFill>
+              <a:rPr b="0" lang="en-US" sz="1800" spc="-1" strike="noStrike">
                 <a:latin typeface="Arial"/>
               </a:rPr>
               <a:t>Third Outline Level</a:t>
             </a:r>
-            <a:endParaRPr b="0" lang="en-US" sz="1300" spc="-1" strike="noStrike">
-              <a:solidFill>
-                <a:srgbClr val="000000"/>
-              </a:solidFill>
+            <a:endParaRPr b="0" lang="en-US" sz="1800" spc="-1" strike="noStrike">
               <a:latin typeface="Arial"/>
             </a:endParaRPr>
           </a:p>
@@ -3651,18 +3350,12 @@
               <a:buChar char=""/>
             </a:pPr>
             <a:r>
-              <a:rPr b="0" lang="en-US" sz="1300" spc="-1" strike="noStrike">
-                <a:solidFill>
-                  <a:srgbClr val="000000"/>
-                </a:solidFill>
+              <a:rPr b="0" lang="en-US" sz="1800" spc="-1" strike="noStrike">
                 <a:latin typeface="Arial"/>
               </a:rPr>
               <a:t>Fourth Outline Level</a:t>
             </a:r>
-            <a:endParaRPr b="0" lang="en-US" sz="1300" spc="-1" strike="noStrike">
-              <a:solidFill>
-                <a:srgbClr val="000000"/>
-              </a:solidFill>
+            <a:endParaRPr b="0" lang="en-US" sz="1800" spc="-1" strike="noStrike">
               <a:latin typeface="Arial"/>
             </a:endParaRPr>
           </a:p>
@@ -3679,18 +3372,12 @@
               <a:buChar char=""/>
             </a:pPr>
             <a:r>
-              <a:rPr b="0" lang="en-US" sz="1300" spc="-1" strike="noStrike">
-                <a:solidFill>
-                  <a:srgbClr val="000000"/>
-                </a:solidFill>
+              <a:rPr b="0" lang="en-US" sz="1800" spc="-1" strike="noStrike">
                 <a:latin typeface="Arial"/>
               </a:rPr>
               <a:t>Fifth Outline Level</a:t>
             </a:r>
-            <a:endParaRPr b="0" lang="en-US" sz="1300" spc="-1" strike="noStrike">
-              <a:solidFill>
-                <a:srgbClr val="000000"/>
-              </a:solidFill>
+            <a:endParaRPr b="0" lang="en-US" sz="1800" spc="-1" strike="noStrike">
               <a:latin typeface="Arial"/>
             </a:endParaRPr>
           </a:p>
@@ -3707,18 +3394,12 @@
               <a:buChar char=""/>
             </a:pPr>
             <a:r>
-              <a:rPr b="0" lang="en-US" sz="1300" spc="-1" strike="noStrike">
-                <a:solidFill>
-                  <a:srgbClr val="000000"/>
-                </a:solidFill>
+              <a:rPr b="0" lang="en-US" sz="1800" spc="-1" strike="noStrike">
                 <a:latin typeface="Arial"/>
               </a:rPr>
               <a:t>Sixth Outline Level</a:t>
             </a:r>
-            <a:endParaRPr b="0" lang="en-US" sz="1300" spc="-1" strike="noStrike">
-              <a:solidFill>
-                <a:srgbClr val="000000"/>
-              </a:solidFill>
+            <a:endParaRPr b="0" lang="en-US" sz="1800" spc="-1" strike="noStrike">
               <a:latin typeface="Arial"/>
             </a:endParaRPr>
           </a:p>
@@ -3735,64 +3416,13 @@
               <a:buChar char=""/>
             </a:pPr>
             <a:r>
-              <a:rPr b="0" lang="en-US" sz="1300" spc="-1" strike="noStrike">
-                <a:solidFill>
-                  <a:srgbClr val="000000"/>
-                </a:solidFill>
+              <a:rPr b="0" lang="en-US" sz="1800" spc="-1" strike="noStrike">
                 <a:latin typeface="Arial"/>
               </a:rPr>
               <a:t>Seventh Outline Level</a:t>
             </a:r>
-            <a:endParaRPr b="0" lang="en-US" sz="1300" spc="-1" strike="noStrike">
-              <a:solidFill>
-                <a:srgbClr val="000000"/>
-              </a:solidFill>
-              <a:latin typeface="Arial"/>
-            </a:endParaRPr>
-          </a:p>
-        </p:txBody>
-      </p:sp>
-      <p:sp>
-        <p:nvSpPr>
-          <p:cNvPr id="49" name="PlaceHolder 7"/>
-          <p:cNvSpPr>
-            <a:spLocks noGrp="1"/>
-          </p:cNvSpPr>
-          <p:nvPr>
-            <p:ph type="sldNum"/>
-          </p:nvPr>
-        </p:nvSpPr>
-        <p:spPr>
-          <a:xfrm>
-            <a:off x="8536320" y="4749840"/>
-            <a:ext cx="548280" cy="393120"/>
-          </a:xfrm>
-          <a:prstGeom prst="rect">
-            <a:avLst/>
-          </a:prstGeom>
-        </p:spPr>
-        <p:txBody>
-          <a:bodyPr tIns="91440" bIns="91440" anchor="ctr">
-            <a:noAutofit/>
-          </a:bodyPr>
-          <a:p>
-            <a:pPr algn="r">
-              <a:lnSpc>
-                <a:spcPct val="100000"/>
-              </a:lnSpc>
-            </a:pPr>
-            <a:fld id="{8026BF80-5B13-4425-ACD0-A3CA9B17315A}" type="slidenum">
-              <a:rPr b="0" lang="en-US" sz="1000" spc="-1" strike="noStrike">
-                <a:solidFill>
-                  <a:srgbClr val="595959"/>
-                </a:solidFill>
-                <a:latin typeface="Lato"/>
-                <a:ea typeface="Lato"/>
-              </a:rPr>
-              <a:t>1</a:t>
-            </a:fld>
-            <a:endParaRPr b="0" lang="en-US" sz="1000" spc="-1" strike="noStrike">
-              <a:latin typeface="Times New Roman"/>
+            <a:endParaRPr b="0" lang="en-US" sz="1800" spc="-1" strike="noStrike">
+              <a:latin typeface="Arial"/>
             </a:endParaRPr>
           </a:p>
         </p:txBody>
@@ -3836,14 +3466,14 @@
       </p:grpSpPr>
       <p:sp>
         <p:nvSpPr>
-          <p:cNvPr id="86" name="TextShape 1"/>
-          <p:cNvSpPr txBox="1"/>
+          <p:cNvPr id="84" name="CustomShape 1"/>
+          <p:cNvSpPr/>
           <p:nvPr/>
         </p:nvSpPr>
         <p:spPr>
           <a:xfrm>
             <a:off x="729360" y="1322280"/>
-            <a:ext cx="7687800" cy="1664280"/>
+            <a:ext cx="7687440" cy="1663920"/>
           </a:xfrm>
           <a:prstGeom prst="rect">
             <a:avLst/>
@@ -3853,8 +3483,14 @@
             <a:noFill/>
           </a:ln>
         </p:spPr>
-        <p:txBody>
-          <a:bodyPr tIns="91440" bIns="91440">
+        <p:style>
+          <a:lnRef idx="0"/>
+          <a:fillRef idx="0"/>
+          <a:effectRef idx="0"/>
+          <a:fontRef idx="minor"/>
+        </p:style>
+        <p:txBody>
+          <a:bodyPr lIns="90000" rIns="90000" tIns="91440" bIns="91440">
             <a:noAutofit/>
           </a:bodyPr>
           <a:p>
@@ -3874,24 +3510,21 @@
               <a:t>The Banking App</a:t>
             </a:r>
             <a:endParaRPr b="0" lang="en-US" sz="4200" spc="-1" strike="noStrike">
-              <a:solidFill>
-                <a:srgbClr val="000000"/>
-              </a:solidFill>
-              <a:latin typeface="Arial"/>
-            </a:endParaRPr>
-          </a:p>
-        </p:txBody>
-      </p:sp>
-      <p:sp>
-        <p:nvSpPr>
-          <p:cNvPr id="87" name="TextShape 2"/>
-          <p:cNvSpPr txBox="1"/>
+              <a:latin typeface="Arial"/>
+            </a:endParaRPr>
+          </a:p>
+        </p:txBody>
+      </p:sp>
+      <p:sp>
+        <p:nvSpPr>
+          <p:cNvPr id="85" name="CustomShape 2"/>
+          <p:cNvSpPr/>
           <p:nvPr/>
         </p:nvSpPr>
         <p:spPr>
           <a:xfrm>
             <a:off x="729720" y="3173040"/>
-            <a:ext cx="7687800" cy="540720"/>
+            <a:ext cx="7687440" cy="540360"/>
           </a:xfrm>
           <a:prstGeom prst="rect">
             <a:avLst/>
@@ -3901,8 +3534,14 @@
             <a:noFill/>
           </a:ln>
         </p:spPr>
-        <p:txBody>
-          <a:bodyPr tIns="91440" bIns="91440">
+        <p:style>
+          <a:lnRef idx="0"/>
+          <a:fillRef idx="0"/>
+          <a:effectRef idx="0"/>
+          <a:fontRef idx="minor"/>
+        </p:style>
+        <p:txBody>
+          <a:bodyPr lIns="90000" rIns="90000" tIns="91440" bIns="91440">
             <a:noAutofit/>
           </a:bodyPr>
           <a:p>
@@ -3959,14 +3598,14 @@
       </p:grpSpPr>
       <p:sp>
         <p:nvSpPr>
-          <p:cNvPr id="88" name="TextShape 1"/>
-          <p:cNvSpPr txBox="1"/>
+          <p:cNvPr id="86" name="CustomShape 1"/>
+          <p:cNvSpPr/>
           <p:nvPr/>
         </p:nvSpPr>
         <p:spPr>
           <a:xfrm>
             <a:off x="729360" y="1318680"/>
-            <a:ext cx="7688520" cy="534960"/>
+            <a:ext cx="7688160" cy="534600"/>
           </a:xfrm>
           <a:prstGeom prst="rect">
             <a:avLst/>
@@ -3976,8 +3615,14 @@
             <a:noFill/>
           </a:ln>
         </p:spPr>
-        <p:txBody>
-          <a:bodyPr tIns="91440" bIns="91440">
+        <p:style>
+          <a:lnRef idx="0"/>
+          <a:fillRef idx="0"/>
+          <a:effectRef idx="0"/>
+          <a:fontRef idx="minor"/>
+        </p:style>
+        <p:txBody>
+          <a:bodyPr lIns="90000" rIns="90000" tIns="91440" bIns="91440">
             <a:noAutofit/>
           </a:bodyPr>
           <a:p>
@@ -3997,24 +3642,21 @@
               <a:t>What is this?</a:t>
             </a:r>
             <a:endParaRPr b="0" lang="en-US" sz="2600" spc="-1" strike="noStrike">
-              <a:solidFill>
-                <a:srgbClr val="000000"/>
-              </a:solidFill>
-              <a:latin typeface="Arial"/>
-            </a:endParaRPr>
-          </a:p>
-        </p:txBody>
-      </p:sp>
-      <p:sp>
-        <p:nvSpPr>
-          <p:cNvPr id="89" name="TextShape 2"/>
-          <p:cNvSpPr txBox="1"/>
+              <a:latin typeface="Arial"/>
+            </a:endParaRPr>
+          </a:p>
+        </p:txBody>
+      </p:sp>
+      <p:sp>
+        <p:nvSpPr>
+          <p:cNvPr id="87" name="CustomShape 2"/>
+          <p:cNvSpPr/>
           <p:nvPr/>
         </p:nvSpPr>
         <p:spPr>
           <a:xfrm>
             <a:off x="729360" y="2079000"/>
-            <a:ext cx="7688520" cy="2260800"/>
+            <a:ext cx="7688160" cy="2260440"/>
           </a:xfrm>
           <a:prstGeom prst="rect">
             <a:avLst/>
@@ -4024,12 +3666,18 @@
             <a:noFill/>
           </a:ln>
         </p:spPr>
-        <p:txBody>
-          <a:bodyPr tIns="91440" bIns="91440">
+        <p:style>
+          <a:lnRef idx="0"/>
+          <a:fillRef idx="0"/>
+          <a:effectRef idx="0"/>
+          <a:fontRef idx="minor"/>
+        </p:style>
+        <p:txBody>
+          <a:bodyPr lIns="90000" rIns="90000" tIns="91440" bIns="91440">
             <a:noAutofit/>
           </a:bodyPr>
           <a:p>
-            <a:pPr marL="457200" indent="-310680">
+            <a:pPr marL="457200" indent="-310320">
               <a:lnSpc>
                 <a:spcPct val="115000"/>
               </a:lnSpc>
@@ -4050,14 +3698,11 @@
               <a:t>Banking app</a:t>
             </a:r>
             <a:endParaRPr b="0" lang="en-US" sz="1300" spc="-1" strike="noStrike">
-              <a:solidFill>
-                <a:srgbClr val="000000"/>
-              </a:solidFill>
-              <a:latin typeface="Arial"/>
-            </a:endParaRPr>
-          </a:p>
-          <a:p>
-            <a:pPr marL="457200" indent="-310680">
+              <a:latin typeface="Arial"/>
+            </a:endParaRPr>
+          </a:p>
+          <a:p>
+            <a:pPr marL="457200" indent="-310320">
               <a:lnSpc>
                 <a:spcPct val="115000"/>
               </a:lnSpc>
@@ -4078,14 +3723,11 @@
               <a:t>Mainly geared toward mobile/computer use, but ATM capability could be added</a:t>
             </a:r>
             <a:endParaRPr b="0" lang="en-US" sz="1300" spc="-1" strike="noStrike">
-              <a:solidFill>
-                <a:srgbClr val="000000"/>
-              </a:solidFill>
-              <a:latin typeface="Arial"/>
-            </a:endParaRPr>
-          </a:p>
-          <a:p>
-            <a:pPr marL="457200" indent="-310680">
+              <a:latin typeface="Arial"/>
+            </a:endParaRPr>
+          </a:p>
+          <a:p>
+            <a:pPr marL="457200" indent="-310320">
               <a:lnSpc>
                 <a:spcPct val="115000"/>
               </a:lnSpc>
@@ -4106,14 +3748,11 @@
               <a:t>Can check balance and/or credit score, freeze credit card, transfer funds between accounts</a:t>
             </a:r>
             <a:endParaRPr b="0" lang="en-US" sz="1300" spc="-1" strike="noStrike">
-              <a:solidFill>
-                <a:srgbClr val="000000"/>
-              </a:solidFill>
-              <a:latin typeface="Arial"/>
-            </a:endParaRPr>
-          </a:p>
-          <a:p>
-            <a:pPr lvl="1" marL="914400" indent="-298080">
+              <a:latin typeface="Arial"/>
+            </a:endParaRPr>
+          </a:p>
+          <a:p>
+            <a:pPr lvl="1" marL="914400" indent="-297720">
               <a:lnSpc>
                 <a:spcPct val="115000"/>
               </a:lnSpc>
@@ -4134,9 +3773,6 @@
               <a:t>Checking and Savings accounts</a:t>
             </a:r>
             <a:endParaRPr b="0" lang="en-US" sz="1100" spc="-1" strike="noStrike">
-              <a:solidFill>
-                <a:srgbClr val="000000"/>
-              </a:solidFill>
               <a:latin typeface="Arial"/>
             </a:endParaRPr>
           </a:p>
@@ -4174,14 +3810,14 @@
       </p:grpSpPr>
       <p:sp>
         <p:nvSpPr>
-          <p:cNvPr id="90" name="TextShape 1"/>
-          <p:cNvSpPr txBox="1"/>
+          <p:cNvPr id="88" name="CustomShape 1"/>
+          <p:cNvSpPr/>
           <p:nvPr/>
         </p:nvSpPr>
         <p:spPr>
           <a:xfrm>
             <a:off x="729360" y="1318680"/>
-            <a:ext cx="7688520" cy="534960"/>
+            <a:ext cx="7688160" cy="534600"/>
           </a:xfrm>
           <a:prstGeom prst="rect">
             <a:avLst/>
@@ -4191,8 +3827,14 @@
             <a:noFill/>
           </a:ln>
         </p:spPr>
-        <p:txBody>
-          <a:bodyPr tIns="91440" bIns="91440">
+        <p:style>
+          <a:lnRef idx="0"/>
+          <a:fillRef idx="0"/>
+          <a:effectRef idx="0"/>
+          <a:fontRef idx="minor"/>
+        </p:style>
+        <p:txBody>
+          <a:bodyPr lIns="90000" rIns="90000" tIns="91440" bIns="91440">
             <a:noAutofit/>
           </a:bodyPr>
           <a:p>
@@ -4212,24 +3854,21 @@
               <a:t>Where can this be used?</a:t>
             </a:r>
             <a:endParaRPr b="0" lang="en-US" sz="2600" spc="-1" strike="noStrike">
-              <a:solidFill>
-                <a:srgbClr val="000000"/>
-              </a:solidFill>
-              <a:latin typeface="Arial"/>
-            </a:endParaRPr>
-          </a:p>
-        </p:txBody>
-      </p:sp>
-      <p:sp>
-        <p:nvSpPr>
-          <p:cNvPr id="91" name="TextShape 2"/>
-          <p:cNvSpPr txBox="1"/>
+              <a:latin typeface="Arial"/>
+            </a:endParaRPr>
+          </a:p>
+        </p:txBody>
+      </p:sp>
+      <p:sp>
+        <p:nvSpPr>
+          <p:cNvPr id="89" name="CustomShape 2"/>
+          <p:cNvSpPr/>
           <p:nvPr/>
         </p:nvSpPr>
         <p:spPr>
           <a:xfrm>
             <a:off x="729360" y="2079000"/>
-            <a:ext cx="7688520" cy="2260800"/>
+            <a:ext cx="7688160" cy="2260440"/>
           </a:xfrm>
           <a:prstGeom prst="rect">
             <a:avLst/>
@@ -4239,12 +3878,18 @@
             <a:noFill/>
           </a:ln>
         </p:spPr>
-        <p:txBody>
-          <a:bodyPr tIns="91440" bIns="91440">
+        <p:style>
+          <a:lnRef idx="0"/>
+          <a:fillRef idx="0"/>
+          <a:effectRef idx="0"/>
+          <a:fontRef idx="minor"/>
+        </p:style>
+        <p:txBody>
+          <a:bodyPr lIns="90000" rIns="90000" tIns="91440" bIns="91440">
             <a:noAutofit/>
           </a:bodyPr>
           <a:p>
-            <a:pPr marL="457200" indent="-310680">
+            <a:pPr marL="457200" indent="-310320">
               <a:lnSpc>
                 <a:spcPct val="115000"/>
               </a:lnSpc>
@@ -4265,14 +3910,11 @@
               <a:t>Web-based app for banks</a:t>
             </a:r>
             <a:endParaRPr b="0" lang="en-US" sz="1300" spc="-1" strike="noStrike">
-              <a:solidFill>
-                <a:srgbClr val="000000"/>
-              </a:solidFill>
-              <a:latin typeface="Arial"/>
-            </a:endParaRPr>
-          </a:p>
-          <a:p>
-            <a:pPr lvl="1" marL="914400" indent="-298080">
+              <a:latin typeface="Arial"/>
+            </a:endParaRPr>
+          </a:p>
+          <a:p>
+            <a:pPr lvl="1" marL="914400" indent="-297720">
               <a:lnSpc>
                 <a:spcPct val="115000"/>
               </a:lnSpc>
@@ -4293,14 +3935,11 @@
               <a:t>Only on a local network for this project, but if it is able to work online, could be used for banks</a:t>
             </a:r>
             <a:endParaRPr b="0" lang="en-US" sz="1100" spc="-1" strike="noStrike">
-              <a:solidFill>
-                <a:srgbClr val="000000"/>
-              </a:solidFill>
-              <a:latin typeface="Arial"/>
-            </a:endParaRPr>
-          </a:p>
-          <a:p>
-            <a:pPr marL="457200" indent="-310680">
+              <a:latin typeface="Arial"/>
+            </a:endParaRPr>
+          </a:p>
+          <a:p>
+            <a:pPr marL="457200" indent="-310320">
               <a:lnSpc>
                 <a:spcPct val="115000"/>
               </a:lnSpc>
@@ -4321,14 +3960,11 @@
               <a:t>On ATM’s</a:t>
             </a:r>
             <a:endParaRPr b="0" lang="en-US" sz="1300" spc="-1" strike="noStrike">
-              <a:solidFill>
-                <a:srgbClr val="000000"/>
-              </a:solidFill>
-              <a:latin typeface="Arial"/>
-            </a:endParaRPr>
-          </a:p>
-          <a:p>
-            <a:pPr lvl="1" marL="914400" indent="-298080">
+              <a:latin typeface="Arial"/>
+            </a:endParaRPr>
+          </a:p>
+          <a:p>
+            <a:pPr lvl="1" marL="914400" indent="-297720">
               <a:lnSpc>
                 <a:spcPct val="115000"/>
               </a:lnSpc>
@@ -4346,12 +3982,9 @@
                 <a:latin typeface="Lato"/>
                 <a:ea typeface="Lato"/>
               </a:rPr>
-              <a:t>With transfer and deposit functions, could be used to get money at an ATM</a:t>
+              <a:t>With transfer and withdraw functions, could be used to get money at an ATM</a:t>
             </a:r>
             <a:endParaRPr b="0" lang="en-US" sz="1100" spc="-1" strike="noStrike">
-              <a:solidFill>
-                <a:srgbClr val="000000"/>
-              </a:solidFill>
               <a:latin typeface="Arial"/>
             </a:endParaRPr>
           </a:p>
@@ -4389,14 +4022,14 @@
       </p:grpSpPr>
       <p:sp>
         <p:nvSpPr>
-          <p:cNvPr id="92" name="TextShape 1"/>
-          <p:cNvSpPr txBox="1"/>
+          <p:cNvPr id="90" name="CustomShape 1"/>
+          <p:cNvSpPr/>
           <p:nvPr/>
         </p:nvSpPr>
         <p:spPr>
           <a:xfrm>
             <a:off x="729360" y="1318680"/>
-            <a:ext cx="7688520" cy="534960"/>
+            <a:ext cx="7688160" cy="534600"/>
           </a:xfrm>
           <a:prstGeom prst="rect">
             <a:avLst/>
@@ -4406,8 +4039,14 @@
             <a:noFill/>
           </a:ln>
         </p:spPr>
-        <p:txBody>
-          <a:bodyPr tIns="91440" bIns="91440">
+        <p:style>
+          <a:lnRef idx="0"/>
+          <a:fillRef idx="0"/>
+          <a:effectRef idx="0"/>
+          <a:fontRef idx="minor"/>
+        </p:style>
+        <p:txBody>
+          <a:bodyPr lIns="90000" rIns="90000" tIns="91440" bIns="91440">
             <a:noAutofit/>
           </a:bodyPr>
           <a:p>
@@ -4427,9 +4066,6 @@
               <a:t>GUI</a:t>
             </a:r>
             <a:endParaRPr b="0" lang="en-US" sz="2600" spc="-1" strike="noStrike">
-              <a:solidFill>
-                <a:srgbClr val="000000"/>
-              </a:solidFill>
               <a:latin typeface="Arial"/>
             </a:endParaRPr>
           </a:p>
@@ -4437,7 +4073,7 @@
       </p:sp>
       <p:pic>
         <p:nvPicPr>
-          <p:cNvPr id="93" name="Google Shape;106;p16" descr=""/>
+          <p:cNvPr id="91" name="Google Shape;106;p16" descr=""/>
           <p:cNvPicPr/>
           <p:nvPr/>
         </p:nvPicPr>
@@ -4449,7 +4085,7 @@
         <p:spPr>
           <a:xfrm>
             <a:off x="2780280" y="807120"/>
-            <a:ext cx="3582720" cy="3528720"/>
+            <a:ext cx="3582360" cy="3528360"/>
           </a:xfrm>
           <a:prstGeom prst="rect">
             <a:avLst/>
@@ -4491,7 +4127,7 @@
       </p:grpSpPr>
       <p:pic>
         <p:nvPicPr>
-          <p:cNvPr id="94" name="Google Shape;113;p17" descr=""/>
+          <p:cNvPr id="92" name="Google Shape;113;p17" descr=""/>
           <p:cNvPicPr/>
           <p:nvPr/>
         </p:nvPicPr>
@@ -4503,7 +4139,7 @@
         <p:spPr>
           <a:xfrm>
             <a:off x="1710720" y="842040"/>
-            <a:ext cx="5833440" cy="4128840"/>
+            <a:ext cx="5833080" cy="4128480"/>
           </a:xfrm>
           <a:prstGeom prst="rect">
             <a:avLst/>
@@ -4545,14 +4181,14 @@
       </p:grpSpPr>
       <p:sp>
         <p:nvSpPr>
-          <p:cNvPr id="95" name="TextShape 1"/>
-          <p:cNvSpPr txBox="1"/>
+          <p:cNvPr id="93" name="CustomShape 1"/>
+          <p:cNvSpPr/>
           <p:nvPr/>
         </p:nvSpPr>
         <p:spPr>
           <a:xfrm>
             <a:off x="729360" y="1318680"/>
-            <a:ext cx="7688520" cy="534960"/>
+            <a:ext cx="7688160" cy="534600"/>
           </a:xfrm>
           <a:prstGeom prst="rect">
             <a:avLst/>
@@ -4562,8 +4198,14 @@
             <a:noFill/>
           </a:ln>
         </p:spPr>
-        <p:txBody>
-          <a:bodyPr tIns="91440" bIns="91440">
+        <p:style>
+          <a:lnRef idx="0"/>
+          <a:fillRef idx="0"/>
+          <a:effectRef idx="0"/>
+          <a:fontRef idx="minor"/>
+        </p:style>
+        <p:txBody>
+          <a:bodyPr lIns="90000" rIns="90000" tIns="91440" bIns="91440">
             <a:noAutofit/>
           </a:bodyPr>
           <a:p>
@@ -4583,24 +4225,21 @@
               <a:t>Step-by-step</a:t>
             </a:r>
             <a:endParaRPr b="0" lang="en-US" sz="2600" spc="-1" strike="noStrike">
-              <a:solidFill>
-                <a:srgbClr val="000000"/>
-              </a:solidFill>
-              <a:latin typeface="Arial"/>
-            </a:endParaRPr>
-          </a:p>
-        </p:txBody>
-      </p:sp>
-      <p:sp>
-        <p:nvSpPr>
-          <p:cNvPr id="96" name="TextShape 2"/>
-          <p:cNvSpPr txBox="1"/>
+              <a:latin typeface="Arial"/>
+            </a:endParaRPr>
+          </a:p>
+        </p:txBody>
+      </p:sp>
+      <p:sp>
+        <p:nvSpPr>
+          <p:cNvPr id="94" name="CustomShape 2"/>
+          <p:cNvSpPr/>
           <p:nvPr/>
         </p:nvSpPr>
         <p:spPr>
           <a:xfrm>
             <a:off x="731520" y="1945440"/>
-            <a:ext cx="7688520" cy="2260800"/>
+            <a:ext cx="7688160" cy="2260440"/>
           </a:xfrm>
           <a:prstGeom prst="rect">
             <a:avLst/>
@@ -4610,12 +4249,18 @@
             <a:noFill/>
           </a:ln>
         </p:spPr>
-        <p:txBody>
-          <a:bodyPr tIns="91440" bIns="91440">
+        <p:style>
+          <a:lnRef idx="0"/>
+          <a:fillRef idx="0"/>
+          <a:effectRef idx="0"/>
+          <a:fontRef idx="minor"/>
+        </p:style>
+        <p:txBody>
+          <a:bodyPr lIns="90000" rIns="90000" tIns="91440" bIns="91440">
             <a:noAutofit/>
           </a:bodyPr>
           <a:p>
-            <a:pPr marL="457200" indent="-310680">
+            <a:pPr marL="457200" indent="-310320">
               <a:lnSpc>
                 <a:spcPct val="115000"/>
               </a:lnSpc>
@@ -4636,14 +4281,11 @@
               <a:t>Connect to server using a predefined port</a:t>
             </a:r>
             <a:endParaRPr b="0" lang="en-US" sz="1300" spc="-1" strike="noStrike">
-              <a:solidFill>
-                <a:srgbClr val="000000"/>
-              </a:solidFill>
-              <a:latin typeface="Arial"/>
-            </a:endParaRPr>
-          </a:p>
-          <a:p>
-            <a:pPr marL="457200" indent="-310680">
+              <a:latin typeface="Arial"/>
+            </a:endParaRPr>
+          </a:p>
+          <a:p>
+            <a:pPr marL="457200" indent="-310320">
               <a:lnSpc>
                 <a:spcPct val="115000"/>
               </a:lnSpc>
@@ -4664,14 +4306,11 @@
               <a:t>Use username and password fields to enter the respective information</a:t>
             </a:r>
             <a:endParaRPr b="0" lang="en-US" sz="1300" spc="-1" strike="noStrike">
-              <a:solidFill>
-                <a:srgbClr val="000000"/>
-              </a:solidFill>
-              <a:latin typeface="Arial"/>
-            </a:endParaRPr>
-          </a:p>
-          <a:p>
-            <a:pPr lvl="1" marL="914400" indent="-298080">
+              <a:latin typeface="Arial"/>
+            </a:endParaRPr>
+          </a:p>
+          <a:p>
+            <a:pPr lvl="1" marL="914400" indent="-297720">
               <a:lnSpc>
                 <a:spcPct val="115000"/>
               </a:lnSpc>
@@ -4692,14 +4331,11 @@
               <a:t>Message will be displayed saying “Hello [name]. What would you like to do?” when the username and password are recognized from a text file</a:t>
             </a:r>
             <a:endParaRPr b="0" lang="en-US" sz="1100" spc="-1" strike="noStrike">
-              <a:solidFill>
-                <a:srgbClr val="000000"/>
-              </a:solidFill>
-              <a:latin typeface="Arial"/>
-            </a:endParaRPr>
-          </a:p>
-          <a:p>
-            <a:pPr marL="457200" indent="-310680">
+              <a:latin typeface="Arial"/>
+            </a:endParaRPr>
+          </a:p>
+          <a:p>
+            <a:pPr marL="457200" indent="-310320">
               <a:lnSpc>
                 <a:spcPct val="115000"/>
               </a:lnSpc>
@@ -4720,14 +4356,11 @@
               <a:t>Transferring funds will change values in the text file based on the amounts being moved from accounts; allows users to transfer between their Checking and Savings accounts</a:t>
             </a:r>
             <a:endParaRPr b="0" lang="en-US" sz="1300" spc="-1" strike="noStrike">
-              <a:solidFill>
-                <a:srgbClr val="000000"/>
-              </a:solidFill>
-              <a:latin typeface="Arial"/>
-            </a:endParaRPr>
-          </a:p>
-          <a:p>
-            <a:pPr marL="457200" indent="-310680">
+              <a:latin typeface="Arial"/>
+            </a:endParaRPr>
+          </a:p>
+          <a:p>
+            <a:pPr marL="457200" indent="-310320">
               <a:lnSpc>
                 <a:spcPct val="115000"/>
               </a:lnSpc>
@@ -4748,14 +4381,11 @@
               <a:t>Credit Score and Balance will read values from the text file</a:t>
             </a:r>
             <a:endParaRPr b="0" lang="en-US" sz="1300" spc="-1" strike="noStrike">
-              <a:solidFill>
-                <a:srgbClr val="000000"/>
-              </a:solidFill>
-              <a:latin typeface="Arial"/>
-            </a:endParaRPr>
-          </a:p>
-          <a:p>
-            <a:pPr lvl="1" marL="914400" indent="-298080">
+              <a:latin typeface="Arial"/>
+            </a:endParaRPr>
+          </a:p>
+          <a:p>
+            <a:pPr lvl="1" marL="914400" indent="-297720">
               <a:lnSpc>
                 <a:spcPct val="115000"/>
               </a:lnSpc>
@@ -4776,14 +4406,11 @@
               <a:t>Balance reads either the Checking or Savings value</a:t>
             </a:r>
             <a:endParaRPr b="0" lang="en-US" sz="1100" spc="-1" strike="noStrike">
-              <a:solidFill>
-                <a:srgbClr val="000000"/>
-              </a:solidFill>
-              <a:latin typeface="Arial"/>
-            </a:endParaRPr>
-          </a:p>
-          <a:p>
-            <a:pPr marL="457200" indent="-310680">
+              <a:latin typeface="Arial"/>
+            </a:endParaRPr>
+          </a:p>
+          <a:p>
+            <a:pPr marL="457200" indent="-310320">
               <a:lnSpc>
                 <a:spcPct val="115000"/>
               </a:lnSpc>
@@ -4804,14 +4431,11 @@
               <a:t>Freeze will change the status of the credit card in the text file</a:t>
             </a:r>
             <a:endParaRPr b="0" lang="en-US" sz="1300" spc="-1" strike="noStrike">
-              <a:solidFill>
-                <a:srgbClr val="000000"/>
-              </a:solidFill>
-              <a:latin typeface="Arial"/>
-            </a:endParaRPr>
-          </a:p>
-          <a:p>
-            <a:pPr marL="457200" indent="-310680">
+              <a:latin typeface="Arial"/>
+            </a:endParaRPr>
+          </a:p>
+          <a:p>
+            <a:pPr marL="457200" indent="-310320">
               <a:lnSpc>
                 <a:spcPct val="115000"/>
               </a:lnSpc>
@@ -4832,14 +4456,11 @@
               <a:t>All values will be displayed in the text boxes above the respective buttons, and values can be typed in the text boxes when transferring funds</a:t>
             </a:r>
             <a:endParaRPr b="0" lang="en-US" sz="1300" spc="-1" strike="noStrike">
-              <a:solidFill>
-                <a:srgbClr val="000000"/>
-              </a:solidFill>
-              <a:latin typeface="Arial"/>
-            </a:endParaRPr>
-          </a:p>
-          <a:p>
-            <a:pPr marL="457200" indent="-310680">
+              <a:latin typeface="Arial"/>
+            </a:endParaRPr>
+          </a:p>
+          <a:p>
+            <a:pPr marL="457200" indent="-310320">
               <a:lnSpc>
                 <a:spcPct val="115000"/>
               </a:lnSpc>
@@ -4860,9 +4481,6 @@
               <a:t>Disconnect will log the user out of the session</a:t>
             </a:r>
             <a:endParaRPr b="0" lang="en-US" sz="1300" spc="-1" strike="noStrike">
-              <a:solidFill>
-                <a:srgbClr val="000000"/>
-              </a:solidFill>
               <a:latin typeface="Arial"/>
             </a:endParaRPr>
           </a:p>
@@ -4900,14 +4518,14 @@
       </p:grpSpPr>
       <p:sp>
         <p:nvSpPr>
-          <p:cNvPr id="97" name="TextShape 1"/>
-          <p:cNvSpPr txBox="1"/>
+          <p:cNvPr id="95" name="CustomShape 1"/>
+          <p:cNvSpPr/>
           <p:nvPr/>
         </p:nvSpPr>
         <p:spPr>
           <a:xfrm>
             <a:off x="729360" y="1318680"/>
-            <a:ext cx="7688520" cy="534960"/>
+            <a:ext cx="7688160" cy="534600"/>
           </a:xfrm>
           <a:prstGeom prst="rect">
             <a:avLst/>
@@ -4917,8 +4535,14 @@
             <a:noFill/>
           </a:ln>
         </p:spPr>
-        <p:txBody>
-          <a:bodyPr tIns="91440" bIns="91440">
+        <p:style>
+          <a:lnRef idx="0"/>
+          <a:fillRef idx="0"/>
+          <a:effectRef idx="0"/>
+          <a:fontRef idx="minor"/>
+        </p:style>
+        <p:txBody>
+          <a:bodyPr lIns="90000" rIns="90000" tIns="91440" bIns="91440">
             <a:noAutofit/>
           </a:bodyPr>
           <a:p>
@@ -4938,24 +4562,21 @@
               <a:t>Possible Features</a:t>
             </a:r>
             <a:endParaRPr b="0" lang="en-US" sz="2600" spc="-1" strike="noStrike">
-              <a:solidFill>
-                <a:srgbClr val="000000"/>
-              </a:solidFill>
-              <a:latin typeface="Arial"/>
-            </a:endParaRPr>
-          </a:p>
-        </p:txBody>
-      </p:sp>
-      <p:sp>
-        <p:nvSpPr>
-          <p:cNvPr id="98" name="TextShape 2"/>
-          <p:cNvSpPr txBox="1"/>
+              <a:latin typeface="Arial"/>
+            </a:endParaRPr>
+          </a:p>
+        </p:txBody>
+      </p:sp>
+      <p:sp>
+        <p:nvSpPr>
+          <p:cNvPr id="96" name="CustomShape 2"/>
+          <p:cNvSpPr/>
           <p:nvPr/>
         </p:nvSpPr>
         <p:spPr>
           <a:xfrm>
             <a:off x="729360" y="2079000"/>
-            <a:ext cx="7688520" cy="2260800"/>
+            <a:ext cx="7688160" cy="2260440"/>
           </a:xfrm>
           <a:prstGeom prst="rect">
             <a:avLst/>
@@ -4965,12 +4586,18 @@
             <a:noFill/>
           </a:ln>
         </p:spPr>
-        <p:txBody>
-          <a:bodyPr tIns="91440" bIns="91440">
+        <p:style>
+          <a:lnRef idx="0"/>
+          <a:fillRef idx="0"/>
+          <a:effectRef idx="0"/>
+          <a:fontRef idx="minor"/>
+        </p:style>
+        <p:txBody>
+          <a:bodyPr lIns="90000" rIns="90000" tIns="91440" bIns="91440">
             <a:noAutofit/>
           </a:bodyPr>
           <a:p>
-            <a:pPr marL="457200" indent="-310680">
+            <a:pPr marL="457200" indent="-310320">
               <a:lnSpc>
                 <a:spcPct val="115000"/>
               </a:lnSpc>
@@ -4991,14 +4618,11 @@
               <a:t>Different options depending on whether user is at ATM or on mobile/computer app</a:t>
             </a:r>
             <a:endParaRPr b="0" lang="en-US" sz="1300" spc="-1" strike="noStrike">
-              <a:solidFill>
-                <a:srgbClr val="000000"/>
-              </a:solidFill>
-              <a:latin typeface="Arial"/>
-            </a:endParaRPr>
-          </a:p>
-          <a:p>
-            <a:pPr lvl="1" marL="914400" indent="-298080">
+              <a:latin typeface="Arial"/>
+            </a:endParaRPr>
+          </a:p>
+          <a:p>
+            <a:pPr lvl="1" marL="914400" indent="-297720">
               <a:lnSpc>
                 <a:spcPct val="115000"/>
               </a:lnSpc>
@@ -5019,14 +4643,11 @@
               <a:t>Withdraw for ATM since you cannot withdraw from a phone or computer</a:t>
             </a:r>
             <a:endParaRPr b="0" lang="en-US" sz="1100" spc="-1" strike="noStrike">
-              <a:solidFill>
-                <a:srgbClr val="000000"/>
-              </a:solidFill>
-              <a:latin typeface="Arial"/>
-            </a:endParaRPr>
-          </a:p>
-          <a:p>
-            <a:pPr marL="457200" indent="-310680">
+              <a:latin typeface="Arial"/>
+            </a:endParaRPr>
+          </a:p>
+          <a:p>
+            <a:pPr marL="457200" indent="-310320">
               <a:lnSpc>
                 <a:spcPct val="115000"/>
               </a:lnSpc>
@@ -5047,14 +4668,11 @@
               <a:t>Transfer funds between users</a:t>
             </a:r>
             <a:endParaRPr b="0" lang="en-US" sz="1300" spc="-1" strike="noStrike">
-              <a:solidFill>
-                <a:srgbClr val="000000"/>
-              </a:solidFill>
-              <a:latin typeface="Arial"/>
-            </a:endParaRPr>
-          </a:p>
-          <a:p>
-            <a:pPr lvl="1" marL="914400" indent="-298080">
+              <a:latin typeface="Arial"/>
+            </a:endParaRPr>
+          </a:p>
+          <a:p>
+            <a:pPr lvl="1" marL="914400" indent="-297720">
               <a:lnSpc>
                 <a:spcPct val="115000"/>
               </a:lnSpc>
@@ -5075,9 +4693,6 @@
               <a:t>User can choose what other person to send money to, and the money would be taken out of Checking account from the source user and put into the Checking account of destination user</a:t>
             </a:r>
             <a:endParaRPr b="0" lang="en-US" sz="1100" spc="-1" strike="noStrike">
-              <a:solidFill>
-                <a:srgbClr val="000000"/>
-              </a:solidFill>
               <a:latin typeface="Arial"/>
             </a:endParaRPr>
           </a:p>

</xml_diff>

<commit_message>
Added Create Account proposal
</commit_message>
<xml_diff>
--- a/BankPresentation.pptx
+++ b/BankPresentation.pptx
@@ -70,8 +70,8 @@
         </p:nvSpPr>
         <p:spPr>
           <a:xfrm>
-            <a:off x="729360" y="1156680"/>
-            <a:ext cx="7688160" cy="858960"/>
+            <a:off x="457200" y="205200"/>
+            <a:ext cx="8229240" cy="858600"/>
           </a:xfrm>
           <a:prstGeom prst="rect">
             <a:avLst/>
@@ -101,8 +101,8 @@
         </p:nvSpPr>
         <p:spPr>
           <a:xfrm>
-            <a:off x="729360" y="2079000"/>
-            <a:ext cx="7688160" cy="1078200"/>
+            <a:off x="457200" y="1203480"/>
+            <a:ext cx="8229240" cy="1422720"/>
           </a:xfrm>
           <a:prstGeom prst="rect">
             <a:avLst/>
@@ -131,8 +131,8 @@
         </p:nvSpPr>
         <p:spPr>
           <a:xfrm>
-            <a:off x="729360" y="3260160"/>
-            <a:ext cx="7688160" cy="1078200"/>
+            <a:off x="457200" y="2761920"/>
+            <a:ext cx="8229240" cy="1422720"/>
           </a:xfrm>
           <a:prstGeom prst="rect">
             <a:avLst/>
@@ -183,8 +183,8 @@
         </p:nvSpPr>
         <p:spPr>
           <a:xfrm>
-            <a:off x="729360" y="1156680"/>
-            <a:ext cx="7688160" cy="858960"/>
+            <a:off x="457200" y="205200"/>
+            <a:ext cx="8229240" cy="858600"/>
           </a:xfrm>
           <a:prstGeom prst="rect">
             <a:avLst/>
@@ -214,8 +214,8 @@
         </p:nvSpPr>
         <p:spPr>
           <a:xfrm>
-            <a:off x="729360" y="2079000"/>
-            <a:ext cx="3751560" cy="1078200"/>
+            <a:off x="457200" y="1203480"/>
+            <a:ext cx="4015800" cy="1422720"/>
           </a:xfrm>
           <a:prstGeom prst="rect">
             <a:avLst/>
@@ -244,8 +244,8 @@
         </p:nvSpPr>
         <p:spPr>
           <a:xfrm>
-            <a:off x="4668840" y="2079000"/>
-            <a:ext cx="3751560" cy="1078200"/>
+            <a:off x="4674240" y="1203480"/>
+            <a:ext cx="4015800" cy="1422720"/>
           </a:xfrm>
           <a:prstGeom prst="rect">
             <a:avLst/>
@@ -274,8 +274,8 @@
         </p:nvSpPr>
         <p:spPr>
           <a:xfrm>
-            <a:off x="729360" y="3260160"/>
-            <a:ext cx="3751560" cy="1078200"/>
+            <a:off x="457200" y="2761920"/>
+            <a:ext cx="4015800" cy="1422720"/>
           </a:xfrm>
           <a:prstGeom prst="rect">
             <a:avLst/>
@@ -304,8 +304,8 @@
         </p:nvSpPr>
         <p:spPr>
           <a:xfrm>
-            <a:off x="4668840" y="3260160"/>
-            <a:ext cx="3751560" cy="1078200"/>
+            <a:off x="4674240" y="2761920"/>
+            <a:ext cx="4015800" cy="1422720"/>
           </a:xfrm>
           <a:prstGeom prst="rect">
             <a:avLst/>
@@ -356,8 +356,8 @@
         </p:nvSpPr>
         <p:spPr>
           <a:xfrm>
-            <a:off x="729360" y="1156680"/>
-            <a:ext cx="7688160" cy="858960"/>
+            <a:off x="457200" y="205200"/>
+            <a:ext cx="8229240" cy="858600"/>
           </a:xfrm>
           <a:prstGeom prst="rect">
             <a:avLst/>
@@ -387,8 +387,8 @@
         </p:nvSpPr>
         <p:spPr>
           <a:xfrm>
-            <a:off x="729360" y="2079000"/>
-            <a:ext cx="2475360" cy="1078200"/>
+            <a:off x="457200" y="1203480"/>
+            <a:ext cx="2649600" cy="1422720"/>
           </a:xfrm>
           <a:prstGeom prst="rect">
             <a:avLst/>
@@ -417,8 +417,8 @@
         </p:nvSpPr>
         <p:spPr>
           <a:xfrm>
-            <a:off x="3328920" y="2079000"/>
-            <a:ext cx="2475360" cy="1078200"/>
+            <a:off x="3239640" y="1203480"/>
+            <a:ext cx="2649600" cy="1422720"/>
           </a:xfrm>
           <a:prstGeom prst="rect">
             <a:avLst/>
@@ -447,8 +447,8 @@
         </p:nvSpPr>
         <p:spPr>
           <a:xfrm>
-            <a:off x="5928480" y="2079000"/>
-            <a:ext cx="2475360" cy="1078200"/>
+            <a:off x="6022080" y="1203480"/>
+            <a:ext cx="2649600" cy="1422720"/>
           </a:xfrm>
           <a:prstGeom prst="rect">
             <a:avLst/>
@@ -477,8 +477,8 @@
         </p:nvSpPr>
         <p:spPr>
           <a:xfrm>
-            <a:off x="729360" y="3260160"/>
-            <a:ext cx="2475360" cy="1078200"/>
+            <a:off x="457200" y="2761920"/>
+            <a:ext cx="2649600" cy="1422720"/>
           </a:xfrm>
           <a:prstGeom prst="rect">
             <a:avLst/>
@@ -507,8 +507,8 @@
         </p:nvSpPr>
         <p:spPr>
           <a:xfrm>
-            <a:off x="3328920" y="3260160"/>
-            <a:ext cx="2475360" cy="1078200"/>
+            <a:off x="3239640" y="2761920"/>
+            <a:ext cx="2649600" cy="1422720"/>
           </a:xfrm>
           <a:prstGeom prst="rect">
             <a:avLst/>
@@ -537,8 +537,8 @@
         </p:nvSpPr>
         <p:spPr>
           <a:xfrm>
-            <a:off x="5928480" y="3260160"/>
-            <a:ext cx="2475360" cy="1078200"/>
+            <a:off x="6022080" y="2761920"/>
+            <a:ext cx="2649600" cy="1422720"/>
           </a:xfrm>
           <a:prstGeom prst="rect">
             <a:avLst/>
@@ -611,8 +611,8 @@
         </p:nvSpPr>
         <p:spPr>
           <a:xfrm>
-            <a:off x="729360" y="1156680"/>
-            <a:ext cx="7688160" cy="858960"/>
+            <a:off x="457200" y="205200"/>
+            <a:ext cx="8229240" cy="858600"/>
           </a:xfrm>
           <a:prstGeom prst="rect">
             <a:avLst/>
@@ -642,8 +642,8 @@
         </p:nvSpPr>
         <p:spPr>
           <a:xfrm>
-            <a:off x="729360" y="2079000"/>
-            <a:ext cx="7688160" cy="2260440"/>
+            <a:off x="457200" y="1203480"/>
+            <a:ext cx="8229240" cy="2982960"/>
           </a:xfrm>
           <a:prstGeom prst="rect">
             <a:avLst/>
@@ -695,8 +695,8 @@
         </p:nvSpPr>
         <p:spPr>
           <a:xfrm>
-            <a:off x="729360" y="1156680"/>
-            <a:ext cx="7688160" cy="858960"/>
+            <a:off x="457200" y="205200"/>
+            <a:ext cx="8229240" cy="858600"/>
           </a:xfrm>
           <a:prstGeom prst="rect">
             <a:avLst/>
@@ -726,8 +726,8 @@
         </p:nvSpPr>
         <p:spPr>
           <a:xfrm>
-            <a:off x="729360" y="2079000"/>
-            <a:ext cx="7688160" cy="2260440"/>
+            <a:off x="457200" y="1203480"/>
+            <a:ext cx="8229240" cy="2982960"/>
           </a:xfrm>
           <a:prstGeom prst="rect">
             <a:avLst/>
@@ -778,8 +778,8 @@
         </p:nvSpPr>
         <p:spPr>
           <a:xfrm>
-            <a:off x="729360" y="1156680"/>
-            <a:ext cx="7688160" cy="858960"/>
+            <a:off x="457200" y="205200"/>
+            <a:ext cx="8229240" cy="858600"/>
           </a:xfrm>
           <a:prstGeom prst="rect">
             <a:avLst/>
@@ -809,8 +809,8 @@
         </p:nvSpPr>
         <p:spPr>
           <a:xfrm>
-            <a:off x="729360" y="2079000"/>
-            <a:ext cx="3751560" cy="2260440"/>
+            <a:off x="457200" y="1203480"/>
+            <a:ext cx="4015800" cy="2982960"/>
           </a:xfrm>
           <a:prstGeom prst="rect">
             <a:avLst/>
@@ -839,8 +839,8 @@
         </p:nvSpPr>
         <p:spPr>
           <a:xfrm>
-            <a:off x="4668840" y="2079000"/>
-            <a:ext cx="3751560" cy="2260440"/>
+            <a:off x="4674240" y="1203480"/>
+            <a:ext cx="4015800" cy="2982960"/>
           </a:xfrm>
           <a:prstGeom prst="rect">
             <a:avLst/>
@@ -891,8 +891,8 @@
         </p:nvSpPr>
         <p:spPr>
           <a:xfrm>
-            <a:off x="729360" y="1156680"/>
-            <a:ext cx="7688160" cy="858960"/>
+            <a:off x="457200" y="205200"/>
+            <a:ext cx="8229240" cy="858600"/>
           </a:xfrm>
           <a:prstGeom prst="rect">
             <a:avLst/>
@@ -944,8 +944,8 @@
         </p:nvSpPr>
         <p:spPr>
           <a:xfrm>
-            <a:off x="729360" y="1156680"/>
-            <a:ext cx="7688160" cy="3983040"/>
+            <a:off x="457200" y="205200"/>
+            <a:ext cx="8229240" cy="3981240"/>
           </a:xfrm>
           <a:prstGeom prst="rect">
             <a:avLst/>
@@ -997,8 +997,8 @@
         </p:nvSpPr>
         <p:spPr>
           <a:xfrm>
-            <a:off x="729360" y="1156680"/>
-            <a:ext cx="7688160" cy="858960"/>
+            <a:off x="457200" y="205200"/>
+            <a:ext cx="8229240" cy="858600"/>
           </a:xfrm>
           <a:prstGeom prst="rect">
             <a:avLst/>
@@ -1028,8 +1028,8 @@
         </p:nvSpPr>
         <p:spPr>
           <a:xfrm>
-            <a:off x="729360" y="2079000"/>
-            <a:ext cx="3751560" cy="1078200"/>
+            <a:off x="457200" y="1203480"/>
+            <a:ext cx="4015800" cy="1422720"/>
           </a:xfrm>
           <a:prstGeom prst="rect">
             <a:avLst/>
@@ -1058,8 +1058,8 @@
         </p:nvSpPr>
         <p:spPr>
           <a:xfrm>
-            <a:off x="4668840" y="2079000"/>
-            <a:ext cx="3751560" cy="2260440"/>
+            <a:off x="4674240" y="1203480"/>
+            <a:ext cx="4015800" cy="2982960"/>
           </a:xfrm>
           <a:prstGeom prst="rect">
             <a:avLst/>
@@ -1088,8 +1088,8 @@
         </p:nvSpPr>
         <p:spPr>
           <a:xfrm>
-            <a:off x="729360" y="3260160"/>
-            <a:ext cx="3751560" cy="1078200"/>
+            <a:off x="457200" y="2761920"/>
+            <a:ext cx="4015800" cy="1422720"/>
           </a:xfrm>
           <a:prstGeom prst="rect">
             <a:avLst/>
@@ -1140,8 +1140,8 @@
         </p:nvSpPr>
         <p:spPr>
           <a:xfrm>
-            <a:off x="729360" y="1156680"/>
-            <a:ext cx="7688160" cy="858960"/>
+            <a:off x="457200" y="205200"/>
+            <a:ext cx="8229240" cy="858600"/>
           </a:xfrm>
           <a:prstGeom prst="rect">
             <a:avLst/>
@@ -1171,8 +1171,8 @@
         </p:nvSpPr>
         <p:spPr>
           <a:xfrm>
-            <a:off x="729360" y="2079000"/>
-            <a:ext cx="7688160" cy="2260440"/>
+            <a:off x="457200" y="1203480"/>
+            <a:ext cx="8229240" cy="2982960"/>
           </a:xfrm>
           <a:prstGeom prst="rect">
             <a:avLst/>
@@ -1224,8 +1224,8 @@
         </p:nvSpPr>
         <p:spPr>
           <a:xfrm>
-            <a:off x="729360" y="1156680"/>
-            <a:ext cx="7688160" cy="858960"/>
+            <a:off x="457200" y="205200"/>
+            <a:ext cx="8229240" cy="858600"/>
           </a:xfrm>
           <a:prstGeom prst="rect">
             <a:avLst/>
@@ -1255,8 +1255,8 @@
         </p:nvSpPr>
         <p:spPr>
           <a:xfrm>
-            <a:off x="729360" y="2079000"/>
-            <a:ext cx="3751560" cy="2260440"/>
+            <a:off x="457200" y="1203480"/>
+            <a:ext cx="4015800" cy="2982960"/>
           </a:xfrm>
           <a:prstGeom prst="rect">
             <a:avLst/>
@@ -1285,8 +1285,8 @@
         </p:nvSpPr>
         <p:spPr>
           <a:xfrm>
-            <a:off x="4668840" y="2079000"/>
-            <a:ext cx="3751560" cy="1078200"/>
+            <a:off x="4674240" y="1203480"/>
+            <a:ext cx="4015800" cy="1422720"/>
           </a:xfrm>
           <a:prstGeom prst="rect">
             <a:avLst/>
@@ -1315,8 +1315,8 @@
         </p:nvSpPr>
         <p:spPr>
           <a:xfrm>
-            <a:off x="4668840" y="3260160"/>
-            <a:ext cx="3751560" cy="1078200"/>
+            <a:off x="4674240" y="2761920"/>
+            <a:ext cx="4015800" cy="1422720"/>
           </a:xfrm>
           <a:prstGeom prst="rect">
             <a:avLst/>
@@ -1367,8 +1367,8 @@
         </p:nvSpPr>
         <p:spPr>
           <a:xfrm>
-            <a:off x="729360" y="1156680"/>
-            <a:ext cx="7688160" cy="858960"/>
+            <a:off x="457200" y="205200"/>
+            <a:ext cx="8229240" cy="858600"/>
           </a:xfrm>
           <a:prstGeom prst="rect">
             <a:avLst/>
@@ -1398,8 +1398,8 @@
         </p:nvSpPr>
         <p:spPr>
           <a:xfrm>
-            <a:off x="729360" y="2079000"/>
-            <a:ext cx="3751560" cy="1078200"/>
+            <a:off x="457200" y="1203480"/>
+            <a:ext cx="4015800" cy="1422720"/>
           </a:xfrm>
           <a:prstGeom prst="rect">
             <a:avLst/>
@@ -1428,8 +1428,8 @@
         </p:nvSpPr>
         <p:spPr>
           <a:xfrm>
-            <a:off x="4668840" y="2079000"/>
-            <a:ext cx="3751560" cy="1078200"/>
+            <a:off x="4674240" y="1203480"/>
+            <a:ext cx="4015800" cy="1422720"/>
           </a:xfrm>
           <a:prstGeom prst="rect">
             <a:avLst/>
@@ -1458,8 +1458,8 @@
         </p:nvSpPr>
         <p:spPr>
           <a:xfrm>
-            <a:off x="729360" y="3260160"/>
-            <a:ext cx="7688160" cy="1078200"/>
+            <a:off x="457200" y="2761920"/>
+            <a:ext cx="8229240" cy="1422720"/>
           </a:xfrm>
           <a:prstGeom prst="rect">
             <a:avLst/>
@@ -1510,8 +1510,8 @@
         </p:nvSpPr>
         <p:spPr>
           <a:xfrm>
-            <a:off x="729360" y="1156680"/>
-            <a:ext cx="7688160" cy="858960"/>
+            <a:off x="457200" y="205200"/>
+            <a:ext cx="8229240" cy="858600"/>
           </a:xfrm>
           <a:prstGeom prst="rect">
             <a:avLst/>
@@ -1541,8 +1541,8 @@
         </p:nvSpPr>
         <p:spPr>
           <a:xfrm>
-            <a:off x="729360" y="2079000"/>
-            <a:ext cx="7688160" cy="1078200"/>
+            <a:off x="457200" y="1203480"/>
+            <a:ext cx="8229240" cy="1422720"/>
           </a:xfrm>
           <a:prstGeom prst="rect">
             <a:avLst/>
@@ -1571,8 +1571,8 @@
         </p:nvSpPr>
         <p:spPr>
           <a:xfrm>
-            <a:off x="729360" y="3260160"/>
-            <a:ext cx="7688160" cy="1078200"/>
+            <a:off x="457200" y="2761920"/>
+            <a:ext cx="8229240" cy="1422720"/>
           </a:xfrm>
           <a:prstGeom prst="rect">
             <a:avLst/>
@@ -1623,8 +1623,8 @@
         </p:nvSpPr>
         <p:spPr>
           <a:xfrm>
-            <a:off x="729360" y="1156680"/>
-            <a:ext cx="7688160" cy="858960"/>
+            <a:off x="457200" y="205200"/>
+            <a:ext cx="8229240" cy="858600"/>
           </a:xfrm>
           <a:prstGeom prst="rect">
             <a:avLst/>
@@ -1654,8 +1654,8 @@
         </p:nvSpPr>
         <p:spPr>
           <a:xfrm>
-            <a:off x="729360" y="2079000"/>
-            <a:ext cx="3751560" cy="1078200"/>
+            <a:off x="457200" y="1203480"/>
+            <a:ext cx="4015800" cy="1422720"/>
           </a:xfrm>
           <a:prstGeom prst="rect">
             <a:avLst/>
@@ -1684,8 +1684,8 @@
         </p:nvSpPr>
         <p:spPr>
           <a:xfrm>
-            <a:off x="4668840" y="2079000"/>
-            <a:ext cx="3751560" cy="1078200"/>
+            <a:off x="4674240" y="1203480"/>
+            <a:ext cx="4015800" cy="1422720"/>
           </a:xfrm>
           <a:prstGeom prst="rect">
             <a:avLst/>
@@ -1714,8 +1714,8 @@
         </p:nvSpPr>
         <p:spPr>
           <a:xfrm>
-            <a:off x="729360" y="3260160"/>
-            <a:ext cx="3751560" cy="1078200"/>
+            <a:off x="457200" y="2761920"/>
+            <a:ext cx="4015800" cy="1422720"/>
           </a:xfrm>
           <a:prstGeom prst="rect">
             <a:avLst/>
@@ -1744,8 +1744,8 @@
         </p:nvSpPr>
         <p:spPr>
           <a:xfrm>
-            <a:off x="4668840" y="3260160"/>
-            <a:ext cx="3751560" cy="1078200"/>
+            <a:off x="4674240" y="2761920"/>
+            <a:ext cx="4015800" cy="1422720"/>
           </a:xfrm>
           <a:prstGeom prst="rect">
             <a:avLst/>
@@ -1796,8 +1796,8 @@
         </p:nvSpPr>
         <p:spPr>
           <a:xfrm>
-            <a:off x="729360" y="1156680"/>
-            <a:ext cx="7688160" cy="858960"/>
+            <a:off x="457200" y="205200"/>
+            <a:ext cx="8229240" cy="858600"/>
           </a:xfrm>
           <a:prstGeom prst="rect">
             <a:avLst/>
@@ -1827,8 +1827,8 @@
         </p:nvSpPr>
         <p:spPr>
           <a:xfrm>
-            <a:off x="729360" y="2079000"/>
-            <a:ext cx="2475360" cy="1078200"/>
+            <a:off x="457200" y="1203480"/>
+            <a:ext cx="2649600" cy="1422720"/>
           </a:xfrm>
           <a:prstGeom prst="rect">
             <a:avLst/>
@@ -1857,8 +1857,8 @@
         </p:nvSpPr>
         <p:spPr>
           <a:xfrm>
-            <a:off x="3328920" y="2079000"/>
-            <a:ext cx="2475360" cy="1078200"/>
+            <a:off x="3239640" y="1203480"/>
+            <a:ext cx="2649600" cy="1422720"/>
           </a:xfrm>
           <a:prstGeom prst="rect">
             <a:avLst/>
@@ -1887,8 +1887,8 @@
         </p:nvSpPr>
         <p:spPr>
           <a:xfrm>
-            <a:off x="5928480" y="2079000"/>
-            <a:ext cx="2475360" cy="1078200"/>
+            <a:off x="6022080" y="1203480"/>
+            <a:ext cx="2649600" cy="1422720"/>
           </a:xfrm>
           <a:prstGeom prst="rect">
             <a:avLst/>
@@ -1917,8 +1917,8 @@
         </p:nvSpPr>
         <p:spPr>
           <a:xfrm>
-            <a:off x="729360" y="3260160"/>
-            <a:ext cx="2475360" cy="1078200"/>
+            <a:off x="457200" y="2761920"/>
+            <a:ext cx="2649600" cy="1422720"/>
           </a:xfrm>
           <a:prstGeom prst="rect">
             <a:avLst/>
@@ -1947,8 +1947,8 @@
         </p:nvSpPr>
         <p:spPr>
           <a:xfrm>
-            <a:off x="3328920" y="3260160"/>
-            <a:ext cx="2475360" cy="1078200"/>
+            <a:off x="3239640" y="2761920"/>
+            <a:ext cx="2649600" cy="1422720"/>
           </a:xfrm>
           <a:prstGeom prst="rect">
             <a:avLst/>
@@ -1977,8 +1977,8 @@
         </p:nvSpPr>
         <p:spPr>
           <a:xfrm>
-            <a:off x="5928480" y="3260160"/>
-            <a:ext cx="2475360" cy="1078200"/>
+            <a:off x="6022080" y="2761920"/>
+            <a:ext cx="2649600" cy="1422720"/>
           </a:xfrm>
           <a:prstGeom prst="rect">
             <a:avLst/>
@@ -2029,8 +2029,8 @@
         </p:nvSpPr>
         <p:spPr>
           <a:xfrm>
-            <a:off x="729360" y="1156680"/>
-            <a:ext cx="7688160" cy="858960"/>
+            <a:off x="457200" y="205200"/>
+            <a:ext cx="8229240" cy="858600"/>
           </a:xfrm>
           <a:prstGeom prst="rect">
             <a:avLst/>
@@ -2060,8 +2060,8 @@
         </p:nvSpPr>
         <p:spPr>
           <a:xfrm>
-            <a:off x="729360" y="2079000"/>
-            <a:ext cx="7688160" cy="2260440"/>
+            <a:off x="457200" y="1203480"/>
+            <a:ext cx="8229240" cy="2982960"/>
           </a:xfrm>
           <a:prstGeom prst="rect">
             <a:avLst/>
@@ -2112,8 +2112,8 @@
         </p:nvSpPr>
         <p:spPr>
           <a:xfrm>
-            <a:off x="729360" y="1156680"/>
-            <a:ext cx="7688160" cy="858960"/>
+            <a:off x="457200" y="205200"/>
+            <a:ext cx="8229240" cy="858600"/>
           </a:xfrm>
           <a:prstGeom prst="rect">
             <a:avLst/>
@@ -2143,8 +2143,8 @@
         </p:nvSpPr>
         <p:spPr>
           <a:xfrm>
-            <a:off x="729360" y="2079000"/>
-            <a:ext cx="3751560" cy="2260440"/>
+            <a:off x="457200" y="1203480"/>
+            <a:ext cx="4015800" cy="2982960"/>
           </a:xfrm>
           <a:prstGeom prst="rect">
             <a:avLst/>
@@ -2173,8 +2173,8 @@
         </p:nvSpPr>
         <p:spPr>
           <a:xfrm>
-            <a:off x="4668840" y="2079000"/>
-            <a:ext cx="3751560" cy="2260440"/>
+            <a:off x="4674240" y="1203480"/>
+            <a:ext cx="4015800" cy="2982960"/>
           </a:xfrm>
           <a:prstGeom prst="rect">
             <a:avLst/>
@@ -2225,8 +2225,8 @@
         </p:nvSpPr>
         <p:spPr>
           <a:xfrm>
-            <a:off x="729360" y="1156680"/>
-            <a:ext cx="7688160" cy="858960"/>
+            <a:off x="457200" y="205200"/>
+            <a:ext cx="8229240" cy="858600"/>
           </a:xfrm>
           <a:prstGeom prst="rect">
             <a:avLst/>
@@ -2278,8 +2278,8 @@
         </p:nvSpPr>
         <p:spPr>
           <a:xfrm>
-            <a:off x="729360" y="1156680"/>
-            <a:ext cx="7688160" cy="3983040"/>
+            <a:off x="457200" y="205200"/>
+            <a:ext cx="8229240" cy="3981240"/>
           </a:xfrm>
           <a:prstGeom prst="rect">
             <a:avLst/>
@@ -2331,8 +2331,8 @@
         </p:nvSpPr>
         <p:spPr>
           <a:xfrm>
-            <a:off x="729360" y="1156680"/>
-            <a:ext cx="7688160" cy="858960"/>
+            <a:off x="457200" y="205200"/>
+            <a:ext cx="8229240" cy="858600"/>
           </a:xfrm>
           <a:prstGeom prst="rect">
             <a:avLst/>
@@ -2362,8 +2362,8 @@
         </p:nvSpPr>
         <p:spPr>
           <a:xfrm>
-            <a:off x="729360" y="2079000"/>
-            <a:ext cx="3751560" cy="1078200"/>
+            <a:off x="457200" y="1203480"/>
+            <a:ext cx="4015800" cy="1422720"/>
           </a:xfrm>
           <a:prstGeom prst="rect">
             <a:avLst/>
@@ -2392,8 +2392,8 @@
         </p:nvSpPr>
         <p:spPr>
           <a:xfrm>
-            <a:off x="4668840" y="2079000"/>
-            <a:ext cx="3751560" cy="2260440"/>
+            <a:off x="4674240" y="1203480"/>
+            <a:ext cx="4015800" cy="2982960"/>
           </a:xfrm>
           <a:prstGeom prst="rect">
             <a:avLst/>
@@ -2422,8 +2422,8 @@
         </p:nvSpPr>
         <p:spPr>
           <a:xfrm>
-            <a:off x="729360" y="3260160"/>
-            <a:ext cx="3751560" cy="1078200"/>
+            <a:off x="457200" y="2761920"/>
+            <a:ext cx="4015800" cy="1422720"/>
           </a:xfrm>
           <a:prstGeom prst="rect">
             <a:avLst/>
@@ -2474,8 +2474,8 @@
         </p:nvSpPr>
         <p:spPr>
           <a:xfrm>
-            <a:off x="729360" y="1156680"/>
-            <a:ext cx="7688160" cy="858960"/>
+            <a:off x="457200" y="205200"/>
+            <a:ext cx="8229240" cy="858600"/>
           </a:xfrm>
           <a:prstGeom prst="rect">
             <a:avLst/>
@@ -2505,8 +2505,8 @@
         </p:nvSpPr>
         <p:spPr>
           <a:xfrm>
-            <a:off x="729360" y="2079000"/>
-            <a:ext cx="3751560" cy="2260440"/>
+            <a:off x="457200" y="1203480"/>
+            <a:ext cx="4015800" cy="2982960"/>
           </a:xfrm>
           <a:prstGeom prst="rect">
             <a:avLst/>
@@ -2535,8 +2535,8 @@
         </p:nvSpPr>
         <p:spPr>
           <a:xfrm>
-            <a:off x="4668840" y="2079000"/>
-            <a:ext cx="3751560" cy="1078200"/>
+            <a:off x="4674240" y="1203480"/>
+            <a:ext cx="4015800" cy="1422720"/>
           </a:xfrm>
           <a:prstGeom prst="rect">
             <a:avLst/>
@@ -2565,8 +2565,8 @@
         </p:nvSpPr>
         <p:spPr>
           <a:xfrm>
-            <a:off x="4668840" y="3260160"/>
-            <a:ext cx="3751560" cy="1078200"/>
+            <a:off x="4674240" y="2761920"/>
+            <a:ext cx="4015800" cy="1422720"/>
           </a:xfrm>
           <a:prstGeom prst="rect">
             <a:avLst/>
@@ -2617,8 +2617,8 @@
         </p:nvSpPr>
         <p:spPr>
           <a:xfrm>
-            <a:off x="729360" y="1156680"/>
-            <a:ext cx="7688160" cy="858960"/>
+            <a:off x="457200" y="205200"/>
+            <a:ext cx="8229240" cy="858600"/>
           </a:xfrm>
           <a:prstGeom prst="rect">
             <a:avLst/>
@@ -2648,8 +2648,8 @@
         </p:nvSpPr>
         <p:spPr>
           <a:xfrm>
-            <a:off x="729360" y="2079000"/>
-            <a:ext cx="3751560" cy="1078200"/>
+            <a:off x="457200" y="1203480"/>
+            <a:ext cx="4015800" cy="1422720"/>
           </a:xfrm>
           <a:prstGeom prst="rect">
             <a:avLst/>
@@ -2678,8 +2678,8 @@
         </p:nvSpPr>
         <p:spPr>
           <a:xfrm>
-            <a:off x="4668840" y="2079000"/>
-            <a:ext cx="3751560" cy="1078200"/>
+            <a:off x="4674240" y="1203480"/>
+            <a:ext cx="4015800" cy="1422720"/>
           </a:xfrm>
           <a:prstGeom prst="rect">
             <a:avLst/>
@@ -2708,8 +2708,8 @@
         </p:nvSpPr>
         <p:spPr>
           <a:xfrm>
-            <a:off x="729360" y="3260160"/>
-            <a:ext cx="7688160" cy="1078200"/>
+            <a:off x="457200" y="2761920"/>
+            <a:ext cx="8229240" cy="1422720"/>
           </a:xfrm>
           <a:prstGeom prst="rect">
             <a:avLst/>
@@ -2764,7 +2764,7 @@
         <p:spPr>
           <a:xfrm>
             <a:off x="0" y="0"/>
-            <a:ext cx="9143280" cy="487080"/>
+            <a:ext cx="9142920" cy="486720"/>
           </a:xfrm>
           <a:prstGeom prst="rect">
             <a:avLst/>
@@ -2791,10 +2791,10 @@
         </p:nvGrpSpPr>
         <p:grpSpPr>
           <a:xfrm>
-            <a:off x="830520" y="1191600"/>
-            <a:ext cx="744840" cy="45000"/>
-            <a:chOff x="830520" y="1191600"/>
-            <a:chExt cx="744840" cy="45000"/>
+            <a:off x="830520" y="1191960"/>
+            <a:ext cx="744480" cy="44640"/>
+            <a:chOff x="830520" y="1191960"/>
+            <a:chExt cx="744480" cy="44640"/>
           </a:xfrm>
         </p:grpSpPr>
         <p:sp>
@@ -2805,8 +2805,8 @@
           </p:nvSpPr>
           <p:spPr>
             <a:xfrm rot="16200000">
-              <a:off x="1366560" y="1027800"/>
-              <a:ext cx="45000" cy="372240"/>
+              <a:off x="1366560" y="1028160"/>
+              <a:ext cx="44640" cy="371880"/>
             </a:xfrm>
             <a:prstGeom prst="rect">
               <a:avLst/>
@@ -2833,8 +2833,8 @@
           </p:nvSpPr>
           <p:spPr>
             <a:xfrm rot="16200000">
-              <a:off x="995400" y="1026360"/>
-              <a:ext cx="45000" cy="375120"/>
+              <a:off x="995400" y="1026720"/>
+              <a:ext cx="44640" cy="374760"/>
             </a:xfrm>
             <a:prstGeom prst="rect">
               <a:avLst/>
@@ -2867,7 +2867,7 @@
         <p:spPr>
           <a:xfrm>
             <a:off x="729360" y="1156680"/>
-            <a:ext cx="7688160" cy="858960"/>
+            <a:ext cx="7687800" cy="858960"/>
           </a:xfrm>
           <a:prstGeom prst="rect">
             <a:avLst/>
@@ -2902,8 +2902,8 @@
         </p:nvSpPr>
         <p:spPr>
           <a:xfrm>
-            <a:off x="457200" y="1203480"/>
-            <a:ext cx="8229240" cy="2982960"/>
+            <a:off x="729360" y="2079000"/>
+            <a:ext cx="7687800" cy="2260080"/>
           </a:xfrm>
           <a:prstGeom prst="rect">
             <a:avLst/>
@@ -2911,7 +2911,7 @@
         </p:spPr>
         <p:txBody>
           <a:bodyPr lIns="0" rIns="0" tIns="0" bIns="0">
-            <a:normAutofit/>
+            <a:normAutofit fontScale="94000"/>
           </a:bodyPr>
           <a:p>
             <a:pPr marL="432000" indent="-324000">
@@ -2926,12 +2926,12 @@
               <a:buChar char=""/>
             </a:pPr>
             <a:r>
-              <a:rPr b="0" lang="en-US" sz="3200" spc="-1" strike="noStrike">
+              <a:rPr b="0" lang="en-US" sz="1800" spc="-1" strike="noStrike">
                 <a:latin typeface="Arial"/>
               </a:rPr>
               <a:t>Click to edit the outline text format</a:t>
             </a:r>
-            <a:endParaRPr b="0" lang="en-US" sz="3200" spc="-1" strike="noStrike">
+            <a:endParaRPr b="0" lang="en-US" sz="1800" spc="-1" strike="noStrike">
               <a:latin typeface="Arial"/>
             </a:endParaRPr>
           </a:p>
@@ -2948,12 +2948,12 @@
               <a:buChar char=""/>
             </a:pPr>
             <a:r>
-              <a:rPr b="0" lang="en-US" sz="2800" spc="-1" strike="noStrike">
+              <a:rPr b="0" lang="en-US" sz="1800" spc="-1" strike="noStrike">
                 <a:latin typeface="Arial"/>
               </a:rPr>
               <a:t>Second Outline Level</a:t>
             </a:r>
-            <a:endParaRPr b="0" lang="en-US" sz="2800" spc="-1" strike="noStrike">
+            <a:endParaRPr b="0" lang="en-US" sz="1800" spc="-1" strike="noStrike">
               <a:latin typeface="Arial"/>
             </a:endParaRPr>
           </a:p>
@@ -2970,12 +2970,12 @@
               <a:buChar char=""/>
             </a:pPr>
             <a:r>
-              <a:rPr b="0" lang="en-US" sz="2400" spc="-1" strike="noStrike">
+              <a:rPr b="0" lang="en-US" sz="1800" spc="-1" strike="noStrike">
                 <a:latin typeface="Arial"/>
               </a:rPr>
               <a:t>Third Outline Level</a:t>
             </a:r>
-            <a:endParaRPr b="0" lang="en-US" sz="2400" spc="-1" strike="noStrike">
+            <a:endParaRPr b="0" lang="en-US" sz="1800" spc="-1" strike="noStrike">
               <a:latin typeface="Arial"/>
             </a:endParaRPr>
           </a:p>
@@ -2992,12 +2992,12 @@
               <a:buChar char=""/>
             </a:pPr>
             <a:r>
-              <a:rPr b="0" lang="en-US" sz="2000" spc="-1" strike="noStrike">
+              <a:rPr b="0" lang="en-US" sz="1800" spc="-1" strike="noStrike">
                 <a:latin typeface="Arial"/>
               </a:rPr>
               <a:t>Fourth Outline Level</a:t>
             </a:r>
-            <a:endParaRPr b="0" lang="en-US" sz="2000" spc="-1" strike="noStrike">
+            <a:endParaRPr b="0" lang="en-US" sz="1800" spc="-1" strike="noStrike">
               <a:latin typeface="Arial"/>
             </a:endParaRPr>
           </a:p>
@@ -3014,12 +3014,12 @@
               <a:buChar char=""/>
             </a:pPr>
             <a:r>
-              <a:rPr b="0" lang="en-US" sz="2000" spc="-1" strike="noStrike">
+              <a:rPr b="0" lang="en-US" sz="1800" spc="-1" strike="noStrike">
                 <a:latin typeface="Arial"/>
               </a:rPr>
               <a:t>Fifth Outline Level</a:t>
             </a:r>
-            <a:endParaRPr b="0" lang="en-US" sz="2000" spc="-1" strike="noStrike">
+            <a:endParaRPr b="0" lang="en-US" sz="1800" spc="-1" strike="noStrike">
               <a:latin typeface="Arial"/>
             </a:endParaRPr>
           </a:p>
@@ -3036,12 +3036,12 @@
               <a:buChar char=""/>
             </a:pPr>
             <a:r>
-              <a:rPr b="0" lang="en-US" sz="2000" spc="-1" strike="noStrike">
+              <a:rPr b="0" lang="en-US" sz="1800" spc="-1" strike="noStrike">
                 <a:latin typeface="Arial"/>
               </a:rPr>
               <a:t>Sixth Outline Level</a:t>
             </a:r>
-            <a:endParaRPr b="0" lang="en-US" sz="2000" spc="-1" strike="noStrike">
+            <a:endParaRPr b="0" lang="en-US" sz="1800" spc="-1" strike="noStrike">
               <a:latin typeface="Arial"/>
             </a:endParaRPr>
           </a:p>
@@ -3058,12 +3058,12 @@
               <a:buChar char=""/>
             </a:pPr>
             <a:r>
-              <a:rPr b="0" lang="en-US" sz="2000" spc="-1" strike="noStrike">
+              <a:rPr b="0" lang="en-US" sz="1800" spc="-1" strike="noStrike">
                 <a:latin typeface="Arial"/>
               </a:rPr>
               <a:t>Seventh Outline Level</a:t>
             </a:r>
-            <a:endParaRPr b="0" lang="en-US" sz="2000" spc="-1" strike="noStrike">
+            <a:endParaRPr b="0" lang="en-US" sz="1800" spc="-1" strike="noStrike">
               <a:latin typeface="Arial"/>
             </a:endParaRPr>
           </a:p>
@@ -3122,7 +3122,7 @@
         <p:spPr>
           <a:xfrm>
             <a:off x="0" y="0"/>
-            <a:ext cx="9143280" cy="487080"/>
+            <a:ext cx="9142920" cy="486720"/>
           </a:xfrm>
           <a:prstGeom prst="rect">
             <a:avLst/>
@@ -3149,10 +3149,10 @@
         </p:nvGrpSpPr>
         <p:grpSpPr>
           <a:xfrm>
-            <a:off x="830520" y="1191600"/>
-            <a:ext cx="744840" cy="45000"/>
-            <a:chOff x="830520" y="1191600"/>
-            <a:chExt cx="744840" cy="45000"/>
+            <a:off x="830520" y="1191960"/>
+            <a:ext cx="744480" cy="44640"/>
+            <a:chOff x="830520" y="1191960"/>
+            <a:chExt cx="744480" cy="44640"/>
           </a:xfrm>
         </p:grpSpPr>
         <p:sp>
@@ -3163,8 +3163,8 @@
           </p:nvSpPr>
           <p:spPr>
             <a:xfrm rot="16200000">
-              <a:off x="1366560" y="1027800"/>
-              <a:ext cx="45000" cy="372240"/>
+              <a:off x="1366560" y="1028160"/>
+              <a:ext cx="44640" cy="371880"/>
             </a:xfrm>
             <a:prstGeom prst="rect">
               <a:avLst/>
@@ -3191,8 +3191,8 @@
           </p:nvSpPr>
           <p:spPr>
             <a:xfrm rot="16200000">
-              <a:off x="995400" y="1026360"/>
-              <a:ext cx="45000" cy="375120"/>
+              <a:off x="995400" y="1026720"/>
+              <a:ext cx="44640" cy="374760"/>
             </a:xfrm>
             <a:prstGeom prst="rect">
               <a:avLst/>
@@ -3224,8 +3224,8 @@
         </p:nvSpPr>
         <p:spPr>
           <a:xfrm>
-            <a:off x="729360" y="1156680"/>
-            <a:ext cx="7688160" cy="858960"/>
+            <a:off x="457200" y="205200"/>
+            <a:ext cx="8229240" cy="858600"/>
           </a:xfrm>
           <a:prstGeom prst="rect">
             <a:avLst/>
@@ -3233,16 +3233,17 @@
         </p:spPr>
         <p:txBody>
           <a:bodyPr lIns="0" rIns="0" tIns="0" bIns="0" anchor="ctr">
-            <a:spAutoFit/>
-          </a:bodyPr>
-          <a:p>
+            <a:noAutofit/>
+          </a:bodyPr>
+          <a:p>
+            <a:pPr algn="ctr"/>
             <a:r>
-              <a:rPr b="0" lang="en-US" sz="1800" spc="-1" strike="noStrike">
+              <a:rPr b="0" lang="en-US" sz="4400" spc="-1" strike="noStrike">
                 <a:latin typeface="Arial"/>
               </a:rPr>
               <a:t>Click to edit the title text format</a:t>
             </a:r>
-            <a:endParaRPr b="0" lang="en-US" sz="1800" spc="-1" strike="noStrike">
+            <a:endParaRPr b="0" lang="en-US" sz="4400" spc="-1" strike="noStrike">
               <a:latin typeface="Arial"/>
             </a:endParaRPr>
           </a:p>
@@ -3260,8 +3261,8 @@
         </p:nvSpPr>
         <p:spPr>
           <a:xfrm>
-            <a:off x="729360" y="2079000"/>
-            <a:ext cx="7688160" cy="2260440"/>
+            <a:off x="457200" y="1203480"/>
+            <a:ext cx="8229240" cy="2982960"/>
           </a:xfrm>
           <a:prstGeom prst="rect">
             <a:avLst/>
@@ -3284,12 +3285,12 @@
               <a:buChar char=""/>
             </a:pPr>
             <a:r>
-              <a:rPr b="0" lang="en-US" sz="1800" spc="-1" strike="noStrike">
+              <a:rPr b="0" lang="en-US" sz="3200" spc="-1" strike="noStrike">
                 <a:latin typeface="Arial"/>
               </a:rPr>
               <a:t>Click to edit the outline text format</a:t>
             </a:r>
-            <a:endParaRPr b="0" lang="en-US" sz="1800" spc="-1" strike="noStrike">
+            <a:endParaRPr b="0" lang="en-US" sz="3200" spc="-1" strike="noStrike">
               <a:latin typeface="Arial"/>
             </a:endParaRPr>
           </a:p>
@@ -3306,12 +3307,12 @@
               <a:buChar char=""/>
             </a:pPr>
             <a:r>
-              <a:rPr b="0" lang="en-US" sz="1800" spc="-1" strike="noStrike">
+              <a:rPr b="0" lang="en-US" sz="2800" spc="-1" strike="noStrike">
                 <a:latin typeface="Arial"/>
               </a:rPr>
               <a:t>Second Outline Level</a:t>
             </a:r>
-            <a:endParaRPr b="0" lang="en-US" sz="1800" spc="-1" strike="noStrike">
+            <a:endParaRPr b="0" lang="en-US" sz="2800" spc="-1" strike="noStrike">
               <a:latin typeface="Arial"/>
             </a:endParaRPr>
           </a:p>
@@ -3328,12 +3329,12 @@
               <a:buChar char=""/>
             </a:pPr>
             <a:r>
-              <a:rPr b="0" lang="en-US" sz="1800" spc="-1" strike="noStrike">
+              <a:rPr b="0" lang="en-US" sz="2400" spc="-1" strike="noStrike">
                 <a:latin typeface="Arial"/>
               </a:rPr>
               <a:t>Third Outline Level</a:t>
             </a:r>
-            <a:endParaRPr b="0" lang="en-US" sz="1800" spc="-1" strike="noStrike">
+            <a:endParaRPr b="0" lang="en-US" sz="2400" spc="-1" strike="noStrike">
               <a:latin typeface="Arial"/>
             </a:endParaRPr>
           </a:p>
@@ -3350,12 +3351,12 @@
               <a:buChar char=""/>
             </a:pPr>
             <a:r>
-              <a:rPr b="0" lang="en-US" sz="1800" spc="-1" strike="noStrike">
+              <a:rPr b="0" lang="en-US" sz="2000" spc="-1" strike="noStrike">
                 <a:latin typeface="Arial"/>
               </a:rPr>
               <a:t>Fourth Outline Level</a:t>
             </a:r>
-            <a:endParaRPr b="0" lang="en-US" sz="1800" spc="-1" strike="noStrike">
+            <a:endParaRPr b="0" lang="en-US" sz="2000" spc="-1" strike="noStrike">
               <a:latin typeface="Arial"/>
             </a:endParaRPr>
           </a:p>
@@ -3372,12 +3373,12 @@
               <a:buChar char=""/>
             </a:pPr>
             <a:r>
-              <a:rPr b="0" lang="en-US" sz="1800" spc="-1" strike="noStrike">
+              <a:rPr b="0" lang="en-US" sz="2000" spc="-1" strike="noStrike">
                 <a:latin typeface="Arial"/>
               </a:rPr>
               <a:t>Fifth Outline Level</a:t>
             </a:r>
-            <a:endParaRPr b="0" lang="en-US" sz="1800" spc="-1" strike="noStrike">
+            <a:endParaRPr b="0" lang="en-US" sz="2000" spc="-1" strike="noStrike">
               <a:latin typeface="Arial"/>
             </a:endParaRPr>
           </a:p>
@@ -3394,12 +3395,12 @@
               <a:buChar char=""/>
             </a:pPr>
             <a:r>
-              <a:rPr b="0" lang="en-US" sz="1800" spc="-1" strike="noStrike">
+              <a:rPr b="0" lang="en-US" sz="2000" spc="-1" strike="noStrike">
                 <a:latin typeface="Arial"/>
               </a:rPr>
               <a:t>Sixth Outline Level</a:t>
             </a:r>
-            <a:endParaRPr b="0" lang="en-US" sz="1800" spc="-1" strike="noStrike">
+            <a:endParaRPr b="0" lang="en-US" sz="2000" spc="-1" strike="noStrike">
               <a:latin typeface="Arial"/>
             </a:endParaRPr>
           </a:p>
@@ -3416,12 +3417,12 @@
               <a:buChar char=""/>
             </a:pPr>
             <a:r>
-              <a:rPr b="0" lang="en-US" sz="1800" spc="-1" strike="noStrike">
+              <a:rPr b="0" lang="en-US" sz="2000" spc="-1" strike="noStrike">
                 <a:latin typeface="Arial"/>
               </a:rPr>
               <a:t>Seventh Outline Level</a:t>
             </a:r>
-            <a:endParaRPr b="0" lang="en-US" sz="1800" spc="-1" strike="noStrike">
+            <a:endParaRPr b="0" lang="en-US" sz="2000" spc="-1" strike="noStrike">
               <a:latin typeface="Arial"/>
             </a:endParaRPr>
           </a:p>
@@ -3473,7 +3474,7 @@
         <p:spPr>
           <a:xfrm>
             <a:off x="729360" y="1322280"/>
-            <a:ext cx="7687440" cy="1663920"/>
+            <a:ext cx="7687080" cy="1663560"/>
           </a:xfrm>
           <a:prstGeom prst="rect">
             <a:avLst/>
@@ -3524,7 +3525,7 @@
         <p:spPr>
           <a:xfrm>
             <a:off x="729720" y="3173040"/>
-            <a:ext cx="7687440" cy="540360"/>
+            <a:ext cx="7687080" cy="540000"/>
           </a:xfrm>
           <a:prstGeom prst="rect">
             <a:avLst/>
@@ -3605,7 +3606,7 @@
         <p:spPr>
           <a:xfrm>
             <a:off x="729360" y="1318680"/>
-            <a:ext cx="7688160" cy="534600"/>
+            <a:ext cx="7687800" cy="534240"/>
           </a:xfrm>
           <a:prstGeom prst="rect">
             <a:avLst/>
@@ -3656,7 +3657,7 @@
         <p:spPr>
           <a:xfrm>
             <a:off x="729360" y="2079000"/>
-            <a:ext cx="7688160" cy="2260440"/>
+            <a:ext cx="7687800" cy="2260080"/>
           </a:xfrm>
           <a:prstGeom prst="rect">
             <a:avLst/>
@@ -3677,7 +3678,7 @@
             <a:noAutofit/>
           </a:bodyPr>
           <a:p>
-            <a:pPr marL="457200" indent="-310320">
+            <a:pPr marL="457200" indent="-309960">
               <a:lnSpc>
                 <a:spcPct val="115000"/>
               </a:lnSpc>
@@ -3702,7 +3703,7 @@
             </a:endParaRPr>
           </a:p>
           <a:p>
-            <a:pPr marL="457200" indent="-310320">
+            <a:pPr marL="457200" indent="-309960">
               <a:lnSpc>
                 <a:spcPct val="115000"/>
               </a:lnSpc>
@@ -3727,7 +3728,7 @@
             </a:endParaRPr>
           </a:p>
           <a:p>
-            <a:pPr marL="457200" indent="-310320">
+            <a:pPr marL="457200" indent="-309960">
               <a:lnSpc>
                 <a:spcPct val="115000"/>
               </a:lnSpc>
@@ -3752,7 +3753,7 @@
             </a:endParaRPr>
           </a:p>
           <a:p>
-            <a:pPr lvl="1" marL="914400" indent="-297720">
+            <a:pPr lvl="1" marL="914400" indent="-297360">
               <a:lnSpc>
                 <a:spcPct val="115000"/>
               </a:lnSpc>
@@ -3817,7 +3818,7 @@
         <p:spPr>
           <a:xfrm>
             <a:off x="729360" y="1318680"/>
-            <a:ext cx="7688160" cy="534600"/>
+            <a:ext cx="7687800" cy="534240"/>
           </a:xfrm>
           <a:prstGeom prst="rect">
             <a:avLst/>
@@ -3868,7 +3869,7 @@
         <p:spPr>
           <a:xfrm>
             <a:off x="729360" y="2079000"/>
-            <a:ext cx="7688160" cy="2260440"/>
+            <a:ext cx="7687800" cy="2260080"/>
           </a:xfrm>
           <a:prstGeom prst="rect">
             <a:avLst/>
@@ -3889,7 +3890,7 @@
             <a:noAutofit/>
           </a:bodyPr>
           <a:p>
-            <a:pPr marL="457200" indent="-310320">
+            <a:pPr marL="457200" indent="-309960">
               <a:lnSpc>
                 <a:spcPct val="115000"/>
               </a:lnSpc>
@@ -3914,7 +3915,7 @@
             </a:endParaRPr>
           </a:p>
           <a:p>
-            <a:pPr lvl="1" marL="914400" indent="-297720">
+            <a:pPr lvl="1" marL="914400" indent="-297360">
               <a:lnSpc>
                 <a:spcPct val="115000"/>
               </a:lnSpc>
@@ -3939,7 +3940,7 @@
             </a:endParaRPr>
           </a:p>
           <a:p>
-            <a:pPr marL="457200" indent="-310320">
+            <a:pPr marL="457200" indent="-309960">
               <a:lnSpc>
                 <a:spcPct val="115000"/>
               </a:lnSpc>
@@ -3964,7 +3965,7 @@
             </a:endParaRPr>
           </a:p>
           <a:p>
-            <a:pPr lvl="1" marL="914400" indent="-297720">
+            <a:pPr lvl="1" marL="914400" indent="-297360">
               <a:lnSpc>
                 <a:spcPct val="115000"/>
               </a:lnSpc>
@@ -4029,7 +4030,7 @@
         <p:spPr>
           <a:xfrm>
             <a:off x="729360" y="1318680"/>
-            <a:ext cx="7688160" cy="534600"/>
+            <a:ext cx="7687800" cy="534240"/>
           </a:xfrm>
           <a:prstGeom prst="rect">
             <a:avLst/>
@@ -4085,7 +4086,7 @@
         <p:spPr>
           <a:xfrm>
             <a:off x="2780280" y="807120"/>
-            <a:ext cx="3582360" cy="3528360"/>
+            <a:ext cx="3582000" cy="3528000"/>
           </a:xfrm>
           <a:prstGeom prst="rect">
             <a:avLst/>
@@ -4139,7 +4140,7 @@
         <p:spPr>
           <a:xfrm>
             <a:off x="1710720" y="842040"/>
-            <a:ext cx="5833080" cy="4128480"/>
+            <a:ext cx="5832720" cy="4128120"/>
           </a:xfrm>
           <a:prstGeom prst="rect">
             <a:avLst/>
@@ -4188,7 +4189,7 @@
         <p:spPr>
           <a:xfrm>
             <a:off x="729360" y="1318680"/>
-            <a:ext cx="7688160" cy="534600"/>
+            <a:ext cx="7687800" cy="534240"/>
           </a:xfrm>
           <a:prstGeom prst="rect">
             <a:avLst/>
@@ -4239,7 +4240,7 @@
         <p:spPr>
           <a:xfrm>
             <a:off x="731520" y="1945440"/>
-            <a:ext cx="7688160" cy="2260440"/>
+            <a:ext cx="7687800" cy="2260080"/>
           </a:xfrm>
           <a:prstGeom prst="rect">
             <a:avLst/>
@@ -4260,7 +4261,7 @@
             <a:noAutofit/>
           </a:bodyPr>
           <a:p>
-            <a:pPr marL="457200" indent="-310320">
+            <a:pPr marL="457200" indent="-309960">
               <a:lnSpc>
                 <a:spcPct val="115000"/>
               </a:lnSpc>
@@ -4285,7 +4286,7 @@
             </a:endParaRPr>
           </a:p>
           <a:p>
-            <a:pPr marL="457200" indent="-310320">
+            <a:pPr marL="457200" indent="-309960">
               <a:lnSpc>
                 <a:spcPct val="115000"/>
               </a:lnSpc>
@@ -4310,7 +4311,7 @@
             </a:endParaRPr>
           </a:p>
           <a:p>
-            <a:pPr lvl="1" marL="914400" indent="-297720">
+            <a:pPr lvl="1" marL="914400" indent="-297360">
               <a:lnSpc>
                 <a:spcPct val="115000"/>
               </a:lnSpc>
@@ -4335,7 +4336,7 @@
             </a:endParaRPr>
           </a:p>
           <a:p>
-            <a:pPr marL="457200" indent="-310320">
+            <a:pPr marL="457200" indent="-309960">
               <a:lnSpc>
                 <a:spcPct val="115000"/>
               </a:lnSpc>
@@ -4360,7 +4361,7 @@
             </a:endParaRPr>
           </a:p>
           <a:p>
-            <a:pPr marL="457200" indent="-310320">
+            <a:pPr marL="457200" indent="-309960">
               <a:lnSpc>
                 <a:spcPct val="115000"/>
               </a:lnSpc>
@@ -4385,7 +4386,7 @@
             </a:endParaRPr>
           </a:p>
           <a:p>
-            <a:pPr lvl="1" marL="914400" indent="-297720">
+            <a:pPr lvl="1" marL="914400" indent="-297360">
               <a:lnSpc>
                 <a:spcPct val="115000"/>
               </a:lnSpc>
@@ -4410,7 +4411,7 @@
             </a:endParaRPr>
           </a:p>
           <a:p>
-            <a:pPr marL="457200" indent="-310320">
+            <a:pPr marL="457200" indent="-309960">
               <a:lnSpc>
                 <a:spcPct val="115000"/>
               </a:lnSpc>
@@ -4435,7 +4436,7 @@
             </a:endParaRPr>
           </a:p>
           <a:p>
-            <a:pPr marL="457200" indent="-310320">
+            <a:pPr marL="457200" indent="-309960">
               <a:lnSpc>
                 <a:spcPct val="115000"/>
               </a:lnSpc>
@@ -4460,7 +4461,7 @@
             </a:endParaRPr>
           </a:p>
           <a:p>
-            <a:pPr marL="457200" indent="-310320">
+            <a:pPr marL="457200" indent="-309960">
               <a:lnSpc>
                 <a:spcPct val="115000"/>
               </a:lnSpc>
@@ -4525,7 +4526,7 @@
         <p:spPr>
           <a:xfrm>
             <a:off x="729360" y="1318680"/>
-            <a:ext cx="7688160" cy="534600"/>
+            <a:ext cx="7687800" cy="534240"/>
           </a:xfrm>
           <a:prstGeom prst="rect">
             <a:avLst/>
@@ -4576,7 +4577,7 @@
         <p:spPr>
           <a:xfrm>
             <a:off x="729360" y="2079000"/>
-            <a:ext cx="7688160" cy="2260440"/>
+            <a:ext cx="7687800" cy="2260080"/>
           </a:xfrm>
           <a:prstGeom prst="rect">
             <a:avLst/>
@@ -4597,7 +4598,7 @@
             <a:noAutofit/>
           </a:bodyPr>
           <a:p>
-            <a:pPr marL="457200" indent="-310320">
+            <a:pPr marL="457200" indent="-309960">
               <a:lnSpc>
                 <a:spcPct val="115000"/>
               </a:lnSpc>
@@ -4622,7 +4623,7 @@
             </a:endParaRPr>
           </a:p>
           <a:p>
-            <a:pPr lvl="1" marL="914400" indent="-297720">
+            <a:pPr lvl="1" marL="914400" indent="-297360">
               <a:lnSpc>
                 <a:spcPct val="115000"/>
               </a:lnSpc>
@@ -4647,7 +4648,7 @@
             </a:endParaRPr>
           </a:p>
           <a:p>
-            <a:pPr marL="457200" indent="-310320">
+            <a:pPr marL="457200" indent="-309960">
               <a:lnSpc>
                 <a:spcPct val="115000"/>
               </a:lnSpc>
@@ -4672,7 +4673,7 @@
             </a:endParaRPr>
           </a:p>
           <a:p>
-            <a:pPr lvl="1" marL="914400" indent="-297720">
+            <a:pPr lvl="1" marL="914400" indent="-297360">
               <a:lnSpc>
                 <a:spcPct val="115000"/>
               </a:lnSpc>
@@ -4691,6 +4692,31 @@
                 <a:ea typeface="Lato"/>
               </a:rPr>
               <a:t>User can choose what other person to send money to, and the money would be taken out of Checking account from the source user and put into the Checking account of destination user</a:t>
+            </a:r>
+            <a:endParaRPr b="0" lang="en-US" sz="1100" spc="-1" strike="noStrike">
+              <a:latin typeface="Arial"/>
+            </a:endParaRPr>
+          </a:p>
+          <a:p>
+            <a:pPr marL="457200" indent="-309960">
+              <a:lnSpc>
+                <a:spcPct val="115000"/>
+              </a:lnSpc>
+              <a:buClr>
+                <a:srgbClr val="595959"/>
+              </a:buClr>
+              <a:buFont typeface="Lato"/>
+              <a:buChar char="●"/>
+            </a:pPr>
+            <a:r>
+              <a:rPr b="0" lang="en-US" sz="1100" spc="-1" strike="noStrike">
+                <a:solidFill>
+                  <a:srgbClr val="595959"/>
+                </a:solidFill>
+                <a:latin typeface="Lato"/>
+                <a:ea typeface="Lato"/>
+              </a:rPr>
+              <a:t>Creation of user account</a:t>
             </a:r>
             <a:endParaRPr b="0" lang="en-US" sz="1100" spc="-1" strike="noStrike">
               <a:latin typeface="Arial"/>

</xml_diff>